<commit_message>
Making Changes to Section 4
</commit_message>
<xml_diff>
--- a/Final Submission/FTR images v1.pptx
+++ b/Final Submission/FTR images v1.pptx
@@ -5,9 +5,12 @@
     <p:sldMasterId id="2147483684" r:id="rId1"/>
   </p:sldMasterIdLst>
   <p:sldIdLst>
-    <p:sldId id="258" r:id="rId2"/>
-    <p:sldId id="256" r:id="rId3"/>
-    <p:sldId id="257" r:id="rId4"/>
+    <p:sldId id="261" r:id="rId2"/>
+    <p:sldId id="260" r:id="rId3"/>
+    <p:sldId id="258" r:id="rId4"/>
+    <p:sldId id="256" r:id="rId5"/>
+    <p:sldId id="257" r:id="rId6"/>
+    <p:sldId id="259" r:id="rId7"/>
   </p:sldIdLst>
   <p:sldSz cx="12192000" cy="11887200"/>
   <p:notesSz cx="6858000" cy="9144000"/>
@@ -106,6 +109,22 @@
       </a:defRPr>
     </a:lvl9pPr>
   </p:defaultTextStyle>
+  <p:extLst>
+    <p:ext uri="{EFAFB233-063F-42B5-8137-9DF3F51BA10A}">
+      <p15:sldGuideLst xmlns:p15="http://schemas.microsoft.com/office/powerpoint/2012/main">
+        <p15:guide id="1" orient="horz" pos="3744" userDrawn="1">
+          <p15:clr>
+            <a:srgbClr val="A4A3A4"/>
+          </p15:clr>
+        </p15:guide>
+        <p15:guide id="2" pos="3840" userDrawn="1">
+          <p15:clr>
+            <a:srgbClr val="A4A3A4"/>
+          </p15:clr>
+        </p15:guide>
+      </p15:sldGuideLst>
+    </p:ext>
+  </p:extLst>
 </p:presentation>
 </file>
 
@@ -240,7 +259,7 @@
           <a:p>
             <a:fld id="{8EADFB48-D288-4E49-9720-234B31A154B5}" type="datetimeFigureOut">
               <a:rPr lang="en-US" smtClean="0"/>
-              <a:t>16-May-21</a:t>
+              <a:t>17-May-21</a:t>
             </a:fld>
             <a:endParaRPr lang="en-US"/>
           </a:p>
@@ -410,7 +429,7 @@
           <a:p>
             <a:fld id="{8EADFB48-D288-4E49-9720-234B31A154B5}" type="datetimeFigureOut">
               <a:rPr lang="en-US" smtClean="0"/>
-              <a:t>16-May-21</a:t>
+              <a:t>17-May-21</a:t>
             </a:fld>
             <a:endParaRPr lang="en-US"/>
           </a:p>
@@ -590,7 +609,7 @@
           <a:p>
             <a:fld id="{8EADFB48-D288-4E49-9720-234B31A154B5}" type="datetimeFigureOut">
               <a:rPr lang="en-US" smtClean="0"/>
-              <a:t>16-May-21</a:t>
+              <a:t>17-May-21</a:t>
             </a:fld>
             <a:endParaRPr lang="en-US"/>
           </a:p>
@@ -760,7 +779,7 @@
           <a:p>
             <a:fld id="{8EADFB48-D288-4E49-9720-234B31A154B5}" type="datetimeFigureOut">
               <a:rPr lang="en-US" smtClean="0"/>
-              <a:t>16-May-21</a:t>
+              <a:t>17-May-21</a:t>
             </a:fld>
             <a:endParaRPr lang="en-US"/>
           </a:p>
@@ -1004,7 +1023,7 @@
           <a:p>
             <a:fld id="{8EADFB48-D288-4E49-9720-234B31A154B5}" type="datetimeFigureOut">
               <a:rPr lang="en-US" smtClean="0"/>
-              <a:t>16-May-21</a:t>
+              <a:t>17-May-21</a:t>
             </a:fld>
             <a:endParaRPr lang="en-US"/>
           </a:p>
@@ -1236,7 +1255,7 @@
           <a:p>
             <a:fld id="{8EADFB48-D288-4E49-9720-234B31A154B5}" type="datetimeFigureOut">
               <a:rPr lang="en-US" smtClean="0"/>
-              <a:t>16-May-21</a:t>
+              <a:t>17-May-21</a:t>
             </a:fld>
             <a:endParaRPr lang="en-US"/>
           </a:p>
@@ -1603,7 +1622,7 @@
           <a:p>
             <a:fld id="{8EADFB48-D288-4E49-9720-234B31A154B5}" type="datetimeFigureOut">
               <a:rPr lang="en-US" smtClean="0"/>
-              <a:t>16-May-21</a:t>
+              <a:t>17-May-21</a:t>
             </a:fld>
             <a:endParaRPr lang="en-US"/>
           </a:p>
@@ -1721,7 +1740,7 @@
           <a:p>
             <a:fld id="{8EADFB48-D288-4E49-9720-234B31A154B5}" type="datetimeFigureOut">
               <a:rPr lang="en-US" smtClean="0"/>
-              <a:t>16-May-21</a:t>
+              <a:t>17-May-21</a:t>
             </a:fld>
             <a:endParaRPr lang="en-US"/>
           </a:p>
@@ -1816,7 +1835,7 @@
           <a:p>
             <a:fld id="{8EADFB48-D288-4E49-9720-234B31A154B5}" type="datetimeFigureOut">
               <a:rPr lang="en-US" smtClean="0"/>
-              <a:t>16-May-21</a:t>
+              <a:t>17-May-21</a:t>
             </a:fld>
             <a:endParaRPr lang="en-US"/>
           </a:p>
@@ -2093,7 +2112,7 @@
           <a:p>
             <a:fld id="{8EADFB48-D288-4E49-9720-234B31A154B5}" type="datetimeFigureOut">
               <a:rPr lang="en-US" smtClean="0"/>
-              <a:t>16-May-21</a:t>
+              <a:t>17-May-21</a:t>
             </a:fld>
             <a:endParaRPr lang="en-US"/>
           </a:p>
@@ -2350,7 +2369,7 @@
           <a:p>
             <a:fld id="{8EADFB48-D288-4E49-9720-234B31A154B5}" type="datetimeFigureOut">
               <a:rPr lang="en-US" smtClean="0"/>
-              <a:t>16-May-21</a:t>
+              <a:t>17-May-21</a:t>
             </a:fld>
             <a:endParaRPr lang="en-US"/>
           </a:p>
@@ -2563,7 +2582,7 @@
           <a:p>
             <a:fld id="{8EADFB48-D288-4E49-9720-234B31A154B5}" type="datetimeFigureOut">
               <a:rPr lang="en-US" smtClean="0"/>
-              <a:t>16-May-21</a:t>
+              <a:t>17-May-21</a:t>
             </a:fld>
             <a:endParaRPr lang="en-US"/>
           </a:p>
@@ -2970,6 +2989,276 @@
       </p:grpSpPr>
       <p:pic>
         <p:nvPicPr>
+          <p:cNvPr id="3" name="Picture 2">
+            <a:extLst>
+              <a:ext uri="{FF2B5EF4-FFF2-40B4-BE49-F238E27FC236}">
+                <a16:creationId xmlns:a16="http://schemas.microsoft.com/office/drawing/2014/main" id="{A8AFAA09-E73A-4589-ACE1-D531CFA943A4}"/>
+              </a:ext>
+            </a:extLst>
+          </p:cNvPr>
+          <p:cNvPicPr>
+            <a:picLocks noChangeAspect="1"/>
+          </p:cNvPicPr>
+          <p:nvPr/>
+        </p:nvPicPr>
+        <p:blipFill>
+          <a:blip r:embed="rId2"/>
+          <a:stretch>
+            <a:fillRect/>
+          </a:stretch>
+        </p:blipFill>
+        <p:spPr>
+          <a:xfrm>
+            <a:off x="1516187" y="3216034"/>
+            <a:ext cx="8789864" cy="2687652"/>
+          </a:xfrm>
+          <a:prstGeom prst="rect">
+            <a:avLst/>
+          </a:prstGeom>
+        </p:spPr>
+      </p:pic>
+      <p:pic>
+        <p:nvPicPr>
+          <p:cNvPr id="4" name="Picture 3">
+            <a:extLst>
+              <a:ext uri="{FF2B5EF4-FFF2-40B4-BE49-F238E27FC236}">
+                <a16:creationId xmlns:a16="http://schemas.microsoft.com/office/drawing/2014/main" id="{9ACF1285-CBE1-4116-967E-2310214EE3B8}"/>
+              </a:ext>
+            </a:extLst>
+          </p:cNvPr>
+          <p:cNvPicPr>
+            <a:picLocks noChangeAspect="1"/>
+          </p:cNvPicPr>
+          <p:nvPr/>
+        </p:nvPicPr>
+        <p:blipFill>
+          <a:blip r:embed="rId3"/>
+          <a:stretch>
+            <a:fillRect/>
+          </a:stretch>
+        </p:blipFill>
+        <p:spPr>
+          <a:xfrm>
+            <a:off x="1516187" y="8979521"/>
+            <a:ext cx="8789863" cy="2630901"/>
+          </a:xfrm>
+          <a:prstGeom prst="rect">
+            <a:avLst/>
+          </a:prstGeom>
+        </p:spPr>
+      </p:pic>
+      <p:pic>
+        <p:nvPicPr>
+          <p:cNvPr id="5" name="Picture 4">
+            <a:extLst>
+              <a:ext uri="{FF2B5EF4-FFF2-40B4-BE49-F238E27FC236}">
+                <a16:creationId xmlns:a16="http://schemas.microsoft.com/office/drawing/2014/main" id="{D102C20D-A647-45BA-A23C-037EA4183BE8}"/>
+              </a:ext>
+            </a:extLst>
+          </p:cNvPr>
+          <p:cNvPicPr>
+            <a:picLocks noChangeAspect="1"/>
+          </p:cNvPicPr>
+          <p:nvPr/>
+        </p:nvPicPr>
+        <p:blipFill>
+          <a:blip r:embed="rId4"/>
+          <a:stretch>
+            <a:fillRect/>
+          </a:stretch>
+        </p:blipFill>
+        <p:spPr>
+          <a:xfrm>
+            <a:off x="1516186" y="6097778"/>
+            <a:ext cx="8789864" cy="2687651"/>
+          </a:xfrm>
+          <a:prstGeom prst="rect">
+            <a:avLst/>
+          </a:prstGeom>
+        </p:spPr>
+      </p:pic>
+      <p:pic>
+        <p:nvPicPr>
+          <p:cNvPr id="6" name="Picture 5">
+            <a:extLst>
+              <a:ext uri="{FF2B5EF4-FFF2-40B4-BE49-F238E27FC236}">
+                <a16:creationId xmlns:a16="http://schemas.microsoft.com/office/drawing/2014/main" id="{DDE280C8-AE46-4D44-8CFE-D49AFCCD842C}"/>
+              </a:ext>
+            </a:extLst>
+          </p:cNvPr>
+          <p:cNvPicPr>
+            <a:picLocks noChangeAspect="1"/>
+          </p:cNvPicPr>
+          <p:nvPr/>
+        </p:nvPicPr>
+        <p:blipFill>
+          <a:blip r:embed="rId5"/>
+          <a:stretch>
+            <a:fillRect/>
+          </a:stretch>
+        </p:blipFill>
+        <p:spPr>
+          <a:xfrm>
+            <a:off x="1516187" y="244080"/>
+            <a:ext cx="8789863" cy="2687651"/>
+          </a:xfrm>
+          <a:prstGeom prst="rect">
+            <a:avLst/>
+          </a:prstGeom>
+        </p:spPr>
+      </p:pic>
+    </p:spTree>
+    <p:extLst>
+      <p:ext uri="{BB962C8B-B14F-4D97-AF65-F5344CB8AC3E}">
+        <p14:creationId xmlns:p14="http://schemas.microsoft.com/office/powerpoint/2010/main" val="1417333963"/>
+      </p:ext>
+    </p:extLst>
+  </p:cSld>
+  <p:clrMapOvr>
+    <a:masterClrMapping/>
+  </p:clrMapOvr>
+</p:sld>
+</file>
+
+<file path=ppt/slides/slide2.xml><?xml version="1.0" encoding="utf-8"?>
+<p:sld xmlns:a="http://schemas.openxmlformats.org/drawingml/2006/main" xmlns:r="http://schemas.openxmlformats.org/officeDocument/2006/relationships" xmlns:p="http://schemas.openxmlformats.org/presentationml/2006/main">
+  <p:cSld>
+    <p:spTree>
+      <p:nvGrpSpPr>
+        <p:cNvPr id="1" name=""/>
+        <p:cNvGrpSpPr/>
+        <p:nvPr/>
+      </p:nvGrpSpPr>
+      <p:grpSpPr>
+        <a:xfrm>
+          <a:off x="0" y="0"/>
+          <a:ext cx="0" cy="0"/>
+          <a:chOff x="0" y="0"/>
+          <a:chExt cx="0" cy="0"/>
+        </a:xfrm>
+      </p:grpSpPr>
+      <p:pic>
+        <p:nvPicPr>
+          <p:cNvPr id="18" name="Picture 17">
+            <a:extLst>
+              <a:ext uri="{FF2B5EF4-FFF2-40B4-BE49-F238E27FC236}">
+                <a16:creationId xmlns:a16="http://schemas.microsoft.com/office/drawing/2014/main" id="{877FC9A4-FF47-497B-8085-00A164127C23}"/>
+              </a:ext>
+            </a:extLst>
+          </p:cNvPr>
+          <p:cNvPicPr>
+            <a:picLocks noChangeAspect="1"/>
+          </p:cNvPicPr>
+          <p:nvPr/>
+        </p:nvPicPr>
+        <p:blipFill>
+          <a:blip r:embed="rId2"/>
+          <a:stretch>
+            <a:fillRect/>
+          </a:stretch>
+        </p:blipFill>
+        <p:spPr>
+          <a:xfrm>
+            <a:off x="0" y="704851"/>
+            <a:ext cx="5772151" cy="2641386"/>
+          </a:xfrm>
+          <a:prstGeom prst="rect">
+            <a:avLst/>
+          </a:prstGeom>
+        </p:spPr>
+      </p:pic>
+      <p:pic>
+        <p:nvPicPr>
+          <p:cNvPr id="19" name="Picture 18">
+            <a:extLst>
+              <a:ext uri="{FF2B5EF4-FFF2-40B4-BE49-F238E27FC236}">
+                <a16:creationId xmlns:a16="http://schemas.microsoft.com/office/drawing/2014/main" id="{AFD2394A-D791-485C-AFBC-594C16C6FF0F}"/>
+              </a:ext>
+            </a:extLst>
+          </p:cNvPr>
+          <p:cNvPicPr>
+            <a:picLocks noChangeAspect="1"/>
+          </p:cNvPicPr>
+          <p:nvPr/>
+        </p:nvPicPr>
+        <p:blipFill>
+          <a:blip r:embed="rId3"/>
+          <a:stretch>
+            <a:fillRect/>
+          </a:stretch>
+        </p:blipFill>
+        <p:spPr>
+          <a:xfrm>
+            <a:off x="6419849" y="704851"/>
+            <a:ext cx="5772151" cy="2628838"/>
+          </a:xfrm>
+          <a:prstGeom prst="rect">
+            <a:avLst/>
+          </a:prstGeom>
+        </p:spPr>
+      </p:pic>
+      <p:pic>
+        <p:nvPicPr>
+          <p:cNvPr id="20" name="Picture 19">
+            <a:extLst>
+              <a:ext uri="{FF2B5EF4-FFF2-40B4-BE49-F238E27FC236}">
+                <a16:creationId xmlns:a16="http://schemas.microsoft.com/office/drawing/2014/main" id="{D2CE30D4-2AA5-41DB-B172-DA1CF09CDFF4}"/>
+              </a:ext>
+            </a:extLst>
+          </p:cNvPr>
+          <p:cNvPicPr>
+            <a:picLocks noChangeAspect="1"/>
+          </p:cNvPicPr>
+          <p:nvPr/>
+        </p:nvPicPr>
+        <p:blipFill>
+          <a:blip r:embed="rId4"/>
+          <a:stretch>
+            <a:fillRect/>
+          </a:stretch>
+        </p:blipFill>
+        <p:spPr>
+          <a:xfrm>
+            <a:off x="3028975" y="3479587"/>
+            <a:ext cx="6134052" cy="2806996"/>
+          </a:xfrm>
+          <a:prstGeom prst="rect">
+            <a:avLst/>
+          </a:prstGeom>
+        </p:spPr>
+      </p:pic>
+    </p:spTree>
+    <p:extLst>
+      <p:ext uri="{BB962C8B-B14F-4D97-AF65-F5344CB8AC3E}">
+        <p14:creationId xmlns:p14="http://schemas.microsoft.com/office/powerpoint/2010/main" val="2582423852"/>
+      </p:ext>
+    </p:extLst>
+  </p:cSld>
+  <p:clrMapOvr>
+    <a:masterClrMapping/>
+  </p:clrMapOvr>
+</p:sld>
+</file>
+
+<file path=ppt/slides/slide3.xml><?xml version="1.0" encoding="utf-8"?>
+<p:sld xmlns:a="http://schemas.openxmlformats.org/drawingml/2006/main" xmlns:r="http://schemas.openxmlformats.org/officeDocument/2006/relationships" xmlns:p="http://schemas.openxmlformats.org/presentationml/2006/main">
+  <p:cSld>
+    <p:spTree>
+      <p:nvGrpSpPr>
+        <p:cNvPr id="1" name=""/>
+        <p:cNvGrpSpPr/>
+        <p:nvPr/>
+      </p:nvGrpSpPr>
+      <p:grpSpPr>
+        <a:xfrm>
+          <a:off x="0" y="0"/>
+          <a:ext cx="0" cy="0"/>
+          <a:chOff x="0" y="0"/>
+          <a:chExt cx="0" cy="0"/>
+        </a:xfrm>
+      </p:grpSpPr>
+      <p:pic>
+        <p:nvPicPr>
           <p:cNvPr id="5" name="Picture 4">
             <a:extLst>
               <a:ext uri="{FF2B5EF4-FFF2-40B4-BE49-F238E27FC236}">
@@ -3410,7 +3699,7 @@
         </p:blipFill>
         <p:spPr>
           <a:xfrm>
-            <a:off x="6095992" y="6709761"/>
+            <a:off x="6107207" y="6961191"/>
             <a:ext cx="6084789" cy="858794"/>
           </a:xfrm>
           <a:prstGeom prst="rect">
@@ -3440,7 +3729,7 @@
         </p:blipFill>
         <p:spPr>
           <a:xfrm>
-            <a:off x="6095992" y="7565981"/>
+            <a:off x="6095992" y="7819985"/>
             <a:ext cx="6078134" cy="858794"/>
           </a:xfrm>
           <a:prstGeom prst="rect">
@@ -3470,7 +3759,7 @@
         </p:blipFill>
         <p:spPr>
           <a:xfrm>
-            <a:off x="6095992" y="8424775"/>
+            <a:off x="6095992" y="8634069"/>
             <a:ext cx="5986597" cy="886904"/>
           </a:xfrm>
           <a:prstGeom prst="rect">
@@ -3611,7 +3900,7 @@
 </p:sld>
 </file>
 
-<file path=ppt/slides/slide2.xml><?xml version="1.0" encoding="utf-8"?>
+<file path=ppt/slides/slide4.xml><?xml version="1.0" encoding="utf-8"?>
 <p:sld xmlns:a="http://schemas.openxmlformats.org/drawingml/2006/main" xmlns:r="http://schemas.openxmlformats.org/officeDocument/2006/relationships" xmlns:p="http://schemas.openxmlformats.org/presentationml/2006/main">
   <p:cSld>
     <p:spTree>
@@ -3696,7 +3985,7 @@
 </p:sld>
 </file>
 
-<file path=ppt/slides/slide3.xml><?xml version="1.0" encoding="utf-8"?>
+<file path=ppt/slides/slide5.xml><?xml version="1.0" encoding="utf-8"?>
 <p:sld xmlns:a="http://schemas.openxmlformats.org/drawingml/2006/main" xmlns:r="http://schemas.openxmlformats.org/officeDocument/2006/relationships" xmlns:p="http://schemas.openxmlformats.org/presentationml/2006/main">
   <p:cSld>
     <p:spTree>
@@ -3777,6 +4066,94 @@
     <p:extLst>
       <p:ext uri="{BB962C8B-B14F-4D97-AF65-F5344CB8AC3E}">
         <p14:creationId xmlns:p14="http://schemas.microsoft.com/office/powerpoint/2010/main" val="3434115848"/>
+      </p:ext>
+    </p:extLst>
+  </p:cSld>
+  <p:clrMapOvr>
+    <a:masterClrMapping/>
+  </p:clrMapOvr>
+</p:sld>
+</file>
+
+<file path=ppt/slides/slide6.xml><?xml version="1.0" encoding="utf-8"?>
+<p:sld xmlns:a="http://schemas.openxmlformats.org/drawingml/2006/main" xmlns:r="http://schemas.openxmlformats.org/officeDocument/2006/relationships" xmlns:p="http://schemas.openxmlformats.org/presentationml/2006/main">
+  <p:cSld>
+    <p:spTree>
+      <p:nvGrpSpPr>
+        <p:cNvPr id="1" name=""/>
+        <p:cNvGrpSpPr/>
+        <p:nvPr/>
+      </p:nvGrpSpPr>
+      <p:grpSpPr>
+        <a:xfrm>
+          <a:off x="0" y="0"/>
+          <a:ext cx="0" cy="0"/>
+          <a:chOff x="0" y="0"/>
+          <a:chExt cx="0" cy="0"/>
+        </a:xfrm>
+      </p:grpSpPr>
+      <p:pic>
+        <p:nvPicPr>
+          <p:cNvPr id="4" name="Picture 3">
+            <a:extLst>
+              <a:ext uri="{FF2B5EF4-FFF2-40B4-BE49-F238E27FC236}">
+                <a16:creationId xmlns:a16="http://schemas.microsoft.com/office/drawing/2014/main" id="{7877EC8B-5387-409A-8268-54A21E2C42EF}"/>
+              </a:ext>
+            </a:extLst>
+          </p:cNvPr>
+          <p:cNvPicPr>
+            <a:picLocks noChangeAspect="1"/>
+          </p:cNvPicPr>
+          <p:nvPr/>
+        </p:nvPicPr>
+        <p:blipFill rotWithShape="1">
+          <a:blip r:embed="rId2"/>
+          <a:srcRect r="50078"/>
+          <a:stretch/>
+        </p:blipFill>
+        <p:spPr>
+          <a:xfrm>
+            <a:off x="417631" y="1876584"/>
+            <a:ext cx="3750332" cy="5463578"/>
+          </a:xfrm>
+          <a:prstGeom prst="rect">
+            <a:avLst/>
+          </a:prstGeom>
+        </p:spPr>
+      </p:pic>
+      <p:pic>
+        <p:nvPicPr>
+          <p:cNvPr id="5" name="Picture 4">
+            <a:extLst>
+              <a:ext uri="{FF2B5EF4-FFF2-40B4-BE49-F238E27FC236}">
+                <a16:creationId xmlns:a16="http://schemas.microsoft.com/office/drawing/2014/main" id="{42FA51E6-585A-4DDA-873C-2C0D46579CC8}"/>
+              </a:ext>
+            </a:extLst>
+          </p:cNvPr>
+          <p:cNvPicPr>
+            <a:picLocks noChangeAspect="1"/>
+          </p:cNvPicPr>
+          <p:nvPr/>
+        </p:nvPicPr>
+        <p:blipFill rotWithShape="1">
+          <a:blip r:embed="rId2"/>
+          <a:srcRect l="51391"/>
+          <a:stretch/>
+        </p:blipFill>
+        <p:spPr>
+          <a:xfrm>
+            <a:off x="7422305" y="1876584"/>
+            <a:ext cx="3750332" cy="5611099"/>
+          </a:xfrm>
+          <a:prstGeom prst="rect">
+            <a:avLst/>
+          </a:prstGeom>
+        </p:spPr>
+      </p:pic>
+    </p:spTree>
+    <p:extLst>
+      <p:ext uri="{BB962C8B-B14F-4D97-AF65-F5344CB8AC3E}">
+        <p14:creationId xmlns:p14="http://schemas.microsoft.com/office/powerpoint/2010/main" val="1099660500"/>
       </p:ext>
     </p:extLst>
   </p:cSld>

</xml_diff>

<commit_message>
Finished 12 pages in Section 4
</commit_message>
<xml_diff>
--- a/Final Submission/FTR images v1.pptx
+++ b/Final Submission/FTR images v1.pptx
@@ -5,12 +5,13 @@
     <p:sldMasterId id="2147483684" r:id="rId1"/>
   </p:sldMasterIdLst>
   <p:sldIdLst>
-    <p:sldId id="261" r:id="rId2"/>
-    <p:sldId id="260" r:id="rId3"/>
-    <p:sldId id="258" r:id="rId4"/>
-    <p:sldId id="256" r:id="rId5"/>
-    <p:sldId id="257" r:id="rId6"/>
-    <p:sldId id="259" r:id="rId7"/>
+    <p:sldId id="262" r:id="rId2"/>
+    <p:sldId id="261" r:id="rId3"/>
+    <p:sldId id="260" r:id="rId4"/>
+    <p:sldId id="258" r:id="rId5"/>
+    <p:sldId id="256" r:id="rId6"/>
+    <p:sldId id="257" r:id="rId7"/>
+    <p:sldId id="259" r:id="rId8"/>
   </p:sldIdLst>
   <p:sldSz cx="12192000" cy="11887200"/>
   <p:notesSz cx="6858000" cy="9144000"/>
@@ -259,7 +260,7 @@
           <a:p>
             <a:fld id="{8EADFB48-D288-4E49-9720-234B31A154B5}" type="datetimeFigureOut">
               <a:rPr lang="en-US" smtClean="0"/>
-              <a:t>18-May-21</a:t>
+              <a:t>19-May-21</a:t>
             </a:fld>
             <a:endParaRPr lang="en-US"/>
           </a:p>
@@ -429,7 +430,7 @@
           <a:p>
             <a:fld id="{8EADFB48-D288-4E49-9720-234B31A154B5}" type="datetimeFigureOut">
               <a:rPr lang="en-US" smtClean="0"/>
-              <a:t>18-May-21</a:t>
+              <a:t>19-May-21</a:t>
             </a:fld>
             <a:endParaRPr lang="en-US"/>
           </a:p>
@@ -609,7 +610,7 @@
           <a:p>
             <a:fld id="{8EADFB48-D288-4E49-9720-234B31A154B5}" type="datetimeFigureOut">
               <a:rPr lang="en-US" smtClean="0"/>
-              <a:t>18-May-21</a:t>
+              <a:t>19-May-21</a:t>
             </a:fld>
             <a:endParaRPr lang="en-US"/>
           </a:p>
@@ -779,7 +780,7 @@
           <a:p>
             <a:fld id="{8EADFB48-D288-4E49-9720-234B31A154B5}" type="datetimeFigureOut">
               <a:rPr lang="en-US" smtClean="0"/>
-              <a:t>18-May-21</a:t>
+              <a:t>19-May-21</a:t>
             </a:fld>
             <a:endParaRPr lang="en-US"/>
           </a:p>
@@ -1023,7 +1024,7 @@
           <a:p>
             <a:fld id="{8EADFB48-D288-4E49-9720-234B31A154B5}" type="datetimeFigureOut">
               <a:rPr lang="en-US" smtClean="0"/>
-              <a:t>18-May-21</a:t>
+              <a:t>19-May-21</a:t>
             </a:fld>
             <a:endParaRPr lang="en-US"/>
           </a:p>
@@ -1255,7 +1256,7 @@
           <a:p>
             <a:fld id="{8EADFB48-D288-4E49-9720-234B31A154B5}" type="datetimeFigureOut">
               <a:rPr lang="en-US" smtClean="0"/>
-              <a:t>18-May-21</a:t>
+              <a:t>19-May-21</a:t>
             </a:fld>
             <a:endParaRPr lang="en-US"/>
           </a:p>
@@ -1622,7 +1623,7 @@
           <a:p>
             <a:fld id="{8EADFB48-D288-4E49-9720-234B31A154B5}" type="datetimeFigureOut">
               <a:rPr lang="en-US" smtClean="0"/>
-              <a:t>18-May-21</a:t>
+              <a:t>19-May-21</a:t>
             </a:fld>
             <a:endParaRPr lang="en-US"/>
           </a:p>
@@ -1740,7 +1741,7 @@
           <a:p>
             <a:fld id="{8EADFB48-D288-4E49-9720-234B31A154B5}" type="datetimeFigureOut">
               <a:rPr lang="en-US" smtClean="0"/>
-              <a:t>18-May-21</a:t>
+              <a:t>19-May-21</a:t>
             </a:fld>
             <a:endParaRPr lang="en-US"/>
           </a:p>
@@ -1835,7 +1836,7 @@
           <a:p>
             <a:fld id="{8EADFB48-D288-4E49-9720-234B31A154B5}" type="datetimeFigureOut">
               <a:rPr lang="en-US" smtClean="0"/>
-              <a:t>18-May-21</a:t>
+              <a:t>19-May-21</a:t>
             </a:fld>
             <a:endParaRPr lang="en-US"/>
           </a:p>
@@ -2112,7 +2113,7 @@
           <a:p>
             <a:fld id="{8EADFB48-D288-4E49-9720-234B31A154B5}" type="datetimeFigureOut">
               <a:rPr lang="en-US" smtClean="0"/>
-              <a:t>18-May-21</a:t>
+              <a:t>19-May-21</a:t>
             </a:fld>
             <a:endParaRPr lang="en-US"/>
           </a:p>
@@ -2369,7 +2370,7 @@
           <a:p>
             <a:fld id="{8EADFB48-D288-4E49-9720-234B31A154B5}" type="datetimeFigureOut">
               <a:rPr lang="en-US" smtClean="0"/>
-              <a:t>18-May-21</a:t>
+              <a:t>19-May-21</a:t>
             </a:fld>
             <a:endParaRPr lang="en-US"/>
           </a:p>
@@ -2582,7 +2583,7 @@
           <a:p>
             <a:fld id="{8EADFB48-D288-4E49-9720-234B31A154B5}" type="datetimeFigureOut">
               <a:rPr lang="en-US" smtClean="0"/>
-              <a:t>18-May-21</a:t>
+              <a:t>19-May-21</a:t>
             </a:fld>
             <a:endParaRPr lang="en-US"/>
           </a:p>
@@ -2989,10 +2990,10 @@
       </p:grpSpPr>
       <p:pic>
         <p:nvPicPr>
-          <p:cNvPr id="2" name="Picture 1">
-            <a:extLst>
-              <a:ext uri="{FF2B5EF4-FFF2-40B4-BE49-F238E27FC236}">
-                <a16:creationId xmlns:a16="http://schemas.microsoft.com/office/drawing/2014/main" id="{579D8CAB-BC2B-413F-870D-FB7F02970406}"/>
+          <p:cNvPr id="5" name="Picture 4">
+            <a:extLst>
+              <a:ext uri="{FF2B5EF4-FFF2-40B4-BE49-F238E27FC236}">
+                <a16:creationId xmlns:a16="http://schemas.microsoft.com/office/drawing/2014/main" id="{CA7DF210-ED84-4569-AB35-D7D13316FA68}"/>
               </a:ext>
             </a:extLst>
           </p:cNvPr>
@@ -3009,8 +3010,8 @@
         </p:blipFill>
         <p:spPr>
           <a:xfrm>
-            <a:off x="1733964" y="327982"/>
-            <a:ext cx="8724072" cy="2652269"/>
+            <a:off x="399255" y="382884"/>
+            <a:ext cx="11393490" cy="2238687"/>
           </a:xfrm>
           <a:prstGeom prst="rect">
             <a:avLst/>
@@ -3019,10 +3020,10 @@
       </p:pic>
       <p:pic>
         <p:nvPicPr>
-          <p:cNvPr id="8" name="Picture 7">
-            <a:extLst>
-              <a:ext uri="{FF2B5EF4-FFF2-40B4-BE49-F238E27FC236}">
-                <a16:creationId xmlns:a16="http://schemas.microsoft.com/office/drawing/2014/main" id="{4FFD5FA7-21DE-4FA9-894E-2F02E5BB6F61}"/>
+          <p:cNvPr id="6" name="Picture 5">
+            <a:extLst>
+              <a:ext uri="{FF2B5EF4-FFF2-40B4-BE49-F238E27FC236}">
+                <a16:creationId xmlns:a16="http://schemas.microsoft.com/office/drawing/2014/main" id="{580CBA4D-1CEF-47F4-AA99-21BCADEF99C6}"/>
               </a:ext>
             </a:extLst>
           </p:cNvPr>
@@ -3039,8 +3040,8 @@
         </p:blipFill>
         <p:spPr>
           <a:xfrm>
-            <a:off x="1733964" y="3237936"/>
-            <a:ext cx="8724072" cy="2648320"/>
+            <a:off x="399255" y="3009971"/>
+            <a:ext cx="11374437" cy="2238687"/>
           </a:xfrm>
           <a:prstGeom prst="rect">
             <a:avLst/>
@@ -3049,10 +3050,10 @@
       </p:pic>
       <p:pic>
         <p:nvPicPr>
-          <p:cNvPr id="9" name="Picture 8">
-            <a:extLst>
-              <a:ext uri="{FF2B5EF4-FFF2-40B4-BE49-F238E27FC236}">
-                <a16:creationId xmlns:a16="http://schemas.microsoft.com/office/drawing/2014/main" id="{A02E4B8D-193D-4578-B974-113EBA7EB8D7}"/>
+          <p:cNvPr id="7" name="Picture 6">
+            <a:extLst>
+              <a:ext uri="{FF2B5EF4-FFF2-40B4-BE49-F238E27FC236}">
+                <a16:creationId xmlns:a16="http://schemas.microsoft.com/office/drawing/2014/main" id="{AB7E920E-5017-4E1E-8157-CD732C5D8A13}"/>
               </a:ext>
             </a:extLst>
           </p:cNvPr>
@@ -3069,18 +3070,736 @@
         </p:blipFill>
         <p:spPr>
           <a:xfrm>
-            <a:off x="1733964" y="6000945"/>
-            <a:ext cx="8705020" cy="2648320"/>
+            <a:off x="500855" y="5637058"/>
+            <a:ext cx="11393490" cy="2248214"/>
           </a:xfrm>
           <a:prstGeom prst="rect">
             <a:avLst/>
           </a:prstGeom>
         </p:spPr>
       </p:pic>
+      <p:pic>
+        <p:nvPicPr>
+          <p:cNvPr id="8" name="Picture 7">
+            <a:extLst>
+              <a:ext uri="{FF2B5EF4-FFF2-40B4-BE49-F238E27FC236}">
+                <a16:creationId xmlns:a16="http://schemas.microsoft.com/office/drawing/2014/main" id="{D671D7B9-A1F8-438A-87BA-FE273BF7E705}"/>
+              </a:ext>
+            </a:extLst>
+          </p:cNvPr>
+          <p:cNvPicPr>
+            <a:picLocks noChangeAspect="1"/>
+          </p:cNvPicPr>
+          <p:nvPr/>
+        </p:nvPicPr>
+        <p:blipFill>
+          <a:blip r:embed="rId5"/>
+          <a:stretch>
+            <a:fillRect/>
+          </a:stretch>
+        </p:blipFill>
+        <p:spPr>
+          <a:xfrm>
+            <a:off x="399255" y="8218110"/>
+            <a:ext cx="11393490" cy="2267266"/>
+          </a:xfrm>
+          <a:prstGeom prst="rect">
+            <a:avLst/>
+          </a:prstGeom>
+        </p:spPr>
+      </p:pic>
+      <p:sp>
+        <p:nvSpPr>
+          <p:cNvPr id="9" name="TextBox 8">
+            <a:extLst>
+              <a:ext uri="{FF2B5EF4-FFF2-40B4-BE49-F238E27FC236}">
+                <a16:creationId xmlns:a16="http://schemas.microsoft.com/office/drawing/2014/main" id="{2DBD4E90-A689-4B85-9E3A-23F7510802B8}"/>
+              </a:ext>
+            </a:extLst>
+          </p:cNvPr>
+          <p:cNvSpPr txBox="1"/>
+          <p:nvPr/>
+        </p:nvSpPr>
+        <p:spPr>
+          <a:xfrm>
+            <a:off x="1422400" y="50046"/>
+            <a:ext cx="885179" cy="369332"/>
+          </a:xfrm>
+          <a:prstGeom prst="rect">
+            <a:avLst/>
+          </a:prstGeom>
+          <a:noFill/>
+        </p:spPr>
+        <p:txBody>
+          <a:bodyPr wrap="none" rtlCol="0">
+            <a:spAutoFit/>
+          </a:bodyPr>
+          <a:lstStyle/>
+          <a:p>
+            <a:pPr algn="ctr"/>
+            <a:r>
+              <a:rPr lang="en-US" dirty="0">
+                <a:solidFill>
+                  <a:schemeClr val="tx1">
+                    <a:lumMod val="50000"/>
+                    <a:lumOff val="50000"/>
+                  </a:schemeClr>
+                </a:solidFill>
+              </a:rPr>
+              <a:t>Gender</a:t>
+            </a:r>
+          </a:p>
+        </p:txBody>
+      </p:sp>
+      <p:sp>
+        <p:nvSpPr>
+          <p:cNvPr id="11" name="TextBox 10">
+            <a:extLst>
+              <a:ext uri="{FF2B5EF4-FFF2-40B4-BE49-F238E27FC236}">
+                <a16:creationId xmlns:a16="http://schemas.microsoft.com/office/drawing/2014/main" id="{5688BB2B-D973-409B-9810-2E54D22E3EEA}"/>
+              </a:ext>
+            </a:extLst>
+          </p:cNvPr>
+          <p:cNvSpPr txBox="1"/>
+          <p:nvPr/>
+        </p:nvSpPr>
+        <p:spPr>
+          <a:xfrm>
+            <a:off x="4362637" y="50046"/>
+            <a:ext cx="883447" cy="369332"/>
+          </a:xfrm>
+          <a:prstGeom prst="rect">
+            <a:avLst/>
+          </a:prstGeom>
+          <a:noFill/>
+        </p:spPr>
+        <p:txBody>
+          <a:bodyPr wrap="none" rtlCol="0">
+            <a:spAutoFit/>
+          </a:bodyPr>
+          <a:lstStyle/>
+          <a:p>
+            <a:pPr algn="ctr"/>
+            <a:r>
+              <a:rPr lang="en-US" dirty="0">
+                <a:solidFill>
+                  <a:schemeClr val="tx1">
+                    <a:lumMod val="50000"/>
+                    <a:lumOff val="50000"/>
+                  </a:schemeClr>
+                </a:solidFill>
+              </a:rPr>
+              <a:t>Partner</a:t>
+            </a:r>
+          </a:p>
+        </p:txBody>
+      </p:sp>
+      <p:sp>
+        <p:nvSpPr>
+          <p:cNvPr id="12" name="TextBox 11">
+            <a:extLst>
+              <a:ext uri="{FF2B5EF4-FFF2-40B4-BE49-F238E27FC236}">
+                <a16:creationId xmlns:a16="http://schemas.microsoft.com/office/drawing/2014/main" id="{29A460E5-E59D-46F1-9D36-6CB9D279F91F}"/>
+              </a:ext>
+            </a:extLst>
+          </p:cNvPr>
+          <p:cNvSpPr txBox="1"/>
+          <p:nvPr/>
+        </p:nvSpPr>
+        <p:spPr>
+          <a:xfrm>
+            <a:off x="6973222" y="50046"/>
+            <a:ext cx="1325491" cy="369332"/>
+          </a:xfrm>
+          <a:prstGeom prst="rect">
+            <a:avLst/>
+          </a:prstGeom>
+          <a:noFill/>
+        </p:spPr>
+        <p:txBody>
+          <a:bodyPr wrap="none" rtlCol="0">
+            <a:spAutoFit/>
+          </a:bodyPr>
+          <a:lstStyle/>
+          <a:p>
+            <a:pPr algn="ctr"/>
+            <a:r>
+              <a:rPr lang="en-US" dirty="0">
+                <a:solidFill>
+                  <a:schemeClr val="tx1">
+                    <a:lumMod val="50000"/>
+                    <a:lumOff val="50000"/>
+                  </a:schemeClr>
+                </a:solidFill>
+              </a:rPr>
+              <a:t>Dependents</a:t>
+            </a:r>
+          </a:p>
+        </p:txBody>
+      </p:sp>
+      <p:sp>
+        <p:nvSpPr>
+          <p:cNvPr id="14" name="TextBox 13">
+            <a:extLst>
+              <a:ext uri="{FF2B5EF4-FFF2-40B4-BE49-F238E27FC236}">
+                <a16:creationId xmlns:a16="http://schemas.microsoft.com/office/drawing/2014/main" id="{5010EB06-1ED9-4E15-ADBB-31045862AF28}"/>
+              </a:ext>
+            </a:extLst>
+          </p:cNvPr>
+          <p:cNvSpPr txBox="1"/>
+          <p:nvPr/>
+        </p:nvSpPr>
+        <p:spPr>
+          <a:xfrm>
+            <a:off x="9755954" y="50046"/>
+            <a:ext cx="1510863" cy="369332"/>
+          </a:xfrm>
+          <a:prstGeom prst="rect">
+            <a:avLst/>
+          </a:prstGeom>
+          <a:noFill/>
+        </p:spPr>
+        <p:txBody>
+          <a:bodyPr wrap="none" rtlCol="0">
+            <a:spAutoFit/>
+          </a:bodyPr>
+          <a:lstStyle/>
+          <a:p>
+            <a:pPr algn="ctr"/>
+            <a:r>
+              <a:rPr lang="en-US" dirty="0">
+                <a:solidFill>
+                  <a:schemeClr val="tx1">
+                    <a:lumMod val="50000"/>
+                    <a:lumOff val="50000"/>
+                  </a:schemeClr>
+                </a:solidFill>
+              </a:rPr>
+              <a:t>Phone Service</a:t>
+            </a:r>
+          </a:p>
+        </p:txBody>
+      </p:sp>
+      <p:sp>
+        <p:nvSpPr>
+          <p:cNvPr id="15" name="TextBox 14">
+            <a:extLst>
+              <a:ext uri="{FF2B5EF4-FFF2-40B4-BE49-F238E27FC236}">
+                <a16:creationId xmlns:a16="http://schemas.microsoft.com/office/drawing/2014/main" id="{F5FD9A1D-83CB-4BB8-AF2C-EA13B3F564D7}"/>
+              </a:ext>
+            </a:extLst>
+          </p:cNvPr>
+          <p:cNvSpPr txBox="1"/>
+          <p:nvPr/>
+        </p:nvSpPr>
+        <p:spPr>
+          <a:xfrm>
+            <a:off x="9744861" y="2699478"/>
+            <a:ext cx="1533048" cy="369332"/>
+          </a:xfrm>
+          <a:prstGeom prst="rect">
+            <a:avLst/>
+          </a:prstGeom>
+          <a:noFill/>
+        </p:spPr>
+        <p:txBody>
+          <a:bodyPr wrap="none" rtlCol="0">
+            <a:spAutoFit/>
+          </a:bodyPr>
+          <a:lstStyle/>
+          <a:p>
+            <a:pPr algn="ctr"/>
+            <a:r>
+              <a:rPr lang="en-US" dirty="0">
+                <a:solidFill>
+                  <a:schemeClr val="tx1">
+                    <a:lumMod val="50000"/>
+                    <a:lumOff val="50000"/>
+                  </a:schemeClr>
+                </a:solidFill>
+              </a:rPr>
+              <a:t>Online Backup</a:t>
+            </a:r>
+          </a:p>
+        </p:txBody>
+      </p:sp>
+      <p:sp>
+        <p:nvSpPr>
+          <p:cNvPr id="16" name="TextBox 15">
+            <a:extLst>
+              <a:ext uri="{FF2B5EF4-FFF2-40B4-BE49-F238E27FC236}">
+                <a16:creationId xmlns:a16="http://schemas.microsoft.com/office/drawing/2014/main" id="{BE5A0120-0A9B-4D3F-A5BC-EDA432805333}"/>
+              </a:ext>
+            </a:extLst>
+          </p:cNvPr>
+          <p:cNvSpPr txBox="1"/>
+          <p:nvPr/>
+        </p:nvSpPr>
+        <p:spPr>
+          <a:xfrm>
+            <a:off x="6831099" y="2699845"/>
+            <a:ext cx="1609736" cy="369332"/>
+          </a:xfrm>
+          <a:prstGeom prst="rect">
+            <a:avLst/>
+          </a:prstGeom>
+          <a:noFill/>
+        </p:spPr>
+        <p:txBody>
+          <a:bodyPr wrap="none" rtlCol="0">
+            <a:spAutoFit/>
+          </a:bodyPr>
+          <a:lstStyle/>
+          <a:p>
+            <a:pPr algn="ctr"/>
+            <a:r>
+              <a:rPr lang="en-US" dirty="0">
+                <a:solidFill>
+                  <a:schemeClr val="tx1">
+                    <a:lumMod val="50000"/>
+                    <a:lumOff val="50000"/>
+                  </a:schemeClr>
+                </a:solidFill>
+              </a:rPr>
+              <a:t>Online Security</a:t>
+            </a:r>
+          </a:p>
+        </p:txBody>
+      </p:sp>
+      <p:sp>
+        <p:nvSpPr>
+          <p:cNvPr id="17" name="TextBox 16">
+            <a:extLst>
+              <a:ext uri="{FF2B5EF4-FFF2-40B4-BE49-F238E27FC236}">
+                <a16:creationId xmlns:a16="http://schemas.microsoft.com/office/drawing/2014/main" id="{7A7982E2-3543-4769-BCAD-3BF6CB6E407A}"/>
+              </a:ext>
+            </a:extLst>
+          </p:cNvPr>
+          <p:cNvSpPr txBox="1"/>
+          <p:nvPr/>
+        </p:nvSpPr>
+        <p:spPr>
+          <a:xfrm>
+            <a:off x="3968489" y="2699478"/>
+            <a:ext cx="1671741" cy="369332"/>
+          </a:xfrm>
+          <a:prstGeom prst="rect">
+            <a:avLst/>
+          </a:prstGeom>
+          <a:noFill/>
+        </p:spPr>
+        <p:txBody>
+          <a:bodyPr wrap="none" rtlCol="0">
+            <a:spAutoFit/>
+          </a:bodyPr>
+          <a:lstStyle/>
+          <a:p>
+            <a:pPr algn="ctr"/>
+            <a:r>
+              <a:rPr lang="en-US" dirty="0">
+                <a:solidFill>
+                  <a:schemeClr val="tx1">
+                    <a:lumMod val="50000"/>
+                    <a:lumOff val="50000"/>
+                  </a:schemeClr>
+                </a:solidFill>
+              </a:rPr>
+              <a:t>Internet Service</a:t>
+            </a:r>
+          </a:p>
+        </p:txBody>
+      </p:sp>
+      <p:sp>
+        <p:nvSpPr>
+          <p:cNvPr id="18" name="TextBox 17">
+            <a:extLst>
+              <a:ext uri="{FF2B5EF4-FFF2-40B4-BE49-F238E27FC236}">
+                <a16:creationId xmlns:a16="http://schemas.microsoft.com/office/drawing/2014/main" id="{15246788-C13E-4329-B69A-9C06712CAD89}"/>
+              </a:ext>
+            </a:extLst>
+          </p:cNvPr>
+          <p:cNvSpPr txBox="1"/>
+          <p:nvPr/>
+        </p:nvSpPr>
+        <p:spPr>
+          <a:xfrm>
+            <a:off x="1111417" y="2703429"/>
+            <a:ext cx="1507144" cy="369332"/>
+          </a:xfrm>
+          <a:prstGeom prst="rect">
+            <a:avLst/>
+          </a:prstGeom>
+          <a:noFill/>
+        </p:spPr>
+        <p:txBody>
+          <a:bodyPr wrap="none" rtlCol="0">
+            <a:spAutoFit/>
+          </a:bodyPr>
+          <a:lstStyle/>
+          <a:p>
+            <a:pPr algn="ctr"/>
+            <a:r>
+              <a:rPr lang="en-US" dirty="0">
+                <a:solidFill>
+                  <a:schemeClr val="tx1">
+                    <a:lumMod val="50000"/>
+                    <a:lumOff val="50000"/>
+                  </a:schemeClr>
+                </a:solidFill>
+              </a:rPr>
+              <a:t>Multiple Lines</a:t>
+            </a:r>
+          </a:p>
+        </p:txBody>
+      </p:sp>
+      <p:sp>
+        <p:nvSpPr>
+          <p:cNvPr id="19" name="TextBox 18">
+            <a:extLst>
+              <a:ext uri="{FF2B5EF4-FFF2-40B4-BE49-F238E27FC236}">
+                <a16:creationId xmlns:a16="http://schemas.microsoft.com/office/drawing/2014/main" id="{359C9FE3-AAB3-4638-910F-1219CD0BA432}"/>
+              </a:ext>
+            </a:extLst>
+          </p:cNvPr>
+          <p:cNvSpPr txBox="1"/>
+          <p:nvPr/>
+        </p:nvSpPr>
+        <p:spPr>
+          <a:xfrm>
+            <a:off x="943583" y="5330516"/>
+            <a:ext cx="1842812" cy="369332"/>
+          </a:xfrm>
+          <a:prstGeom prst="rect">
+            <a:avLst/>
+          </a:prstGeom>
+          <a:noFill/>
+        </p:spPr>
+        <p:txBody>
+          <a:bodyPr wrap="none" rtlCol="0">
+            <a:spAutoFit/>
+          </a:bodyPr>
+          <a:lstStyle/>
+          <a:p>
+            <a:pPr algn="ctr"/>
+            <a:r>
+              <a:rPr lang="en-US" dirty="0">
+                <a:solidFill>
+                  <a:schemeClr val="tx1">
+                    <a:lumMod val="50000"/>
+                    <a:lumOff val="50000"/>
+                  </a:schemeClr>
+                </a:solidFill>
+              </a:rPr>
+              <a:t>Device Protection</a:t>
+            </a:r>
+          </a:p>
+        </p:txBody>
+      </p:sp>
+      <p:sp>
+        <p:nvSpPr>
+          <p:cNvPr id="20" name="TextBox 19">
+            <a:extLst>
+              <a:ext uri="{FF2B5EF4-FFF2-40B4-BE49-F238E27FC236}">
+                <a16:creationId xmlns:a16="http://schemas.microsoft.com/office/drawing/2014/main" id="{ADAD418F-9A6C-48B4-822F-FB469225734B}"/>
+              </a:ext>
+            </a:extLst>
+          </p:cNvPr>
+          <p:cNvSpPr txBox="1"/>
+          <p:nvPr/>
+        </p:nvSpPr>
+        <p:spPr>
+          <a:xfrm>
+            <a:off x="9575488" y="5330516"/>
+            <a:ext cx="1871794" cy="369332"/>
+          </a:xfrm>
+          <a:prstGeom prst="rect">
+            <a:avLst/>
+          </a:prstGeom>
+          <a:noFill/>
+        </p:spPr>
+        <p:txBody>
+          <a:bodyPr wrap="none" rtlCol="0">
+            <a:spAutoFit/>
+          </a:bodyPr>
+          <a:lstStyle/>
+          <a:p>
+            <a:pPr algn="ctr"/>
+            <a:r>
+              <a:rPr lang="en-US" dirty="0">
+                <a:solidFill>
+                  <a:schemeClr val="tx1">
+                    <a:lumMod val="50000"/>
+                    <a:lumOff val="50000"/>
+                  </a:schemeClr>
+                </a:solidFill>
+              </a:rPr>
+              <a:t>Streaming Movies</a:t>
+            </a:r>
+          </a:p>
+        </p:txBody>
+      </p:sp>
+      <p:sp>
+        <p:nvSpPr>
+          <p:cNvPr id="21" name="TextBox 20">
+            <a:extLst>
+              <a:ext uri="{FF2B5EF4-FFF2-40B4-BE49-F238E27FC236}">
+                <a16:creationId xmlns:a16="http://schemas.microsoft.com/office/drawing/2014/main" id="{95ECFB66-D5CD-4BB0-9568-09FEE29BD11D}"/>
+              </a:ext>
+            </a:extLst>
+          </p:cNvPr>
+          <p:cNvSpPr txBox="1"/>
+          <p:nvPr/>
+        </p:nvSpPr>
+        <p:spPr>
+          <a:xfrm>
+            <a:off x="6918366" y="5330516"/>
+            <a:ext cx="1435201" cy="369332"/>
+          </a:xfrm>
+          <a:prstGeom prst="rect">
+            <a:avLst/>
+          </a:prstGeom>
+          <a:noFill/>
+        </p:spPr>
+        <p:txBody>
+          <a:bodyPr wrap="none" rtlCol="0">
+            <a:spAutoFit/>
+          </a:bodyPr>
+          <a:lstStyle/>
+          <a:p>
+            <a:pPr algn="ctr"/>
+            <a:r>
+              <a:rPr lang="en-US" dirty="0">
+                <a:solidFill>
+                  <a:schemeClr val="tx1">
+                    <a:lumMod val="50000"/>
+                    <a:lumOff val="50000"/>
+                  </a:schemeClr>
+                </a:solidFill>
+              </a:rPr>
+              <a:t>Streaming TV</a:t>
+            </a:r>
+          </a:p>
+        </p:txBody>
+      </p:sp>
+      <p:sp>
+        <p:nvSpPr>
+          <p:cNvPr id="22" name="TextBox 21">
+            <a:extLst>
+              <a:ext uri="{FF2B5EF4-FFF2-40B4-BE49-F238E27FC236}">
+                <a16:creationId xmlns:a16="http://schemas.microsoft.com/office/drawing/2014/main" id="{2D76ED64-8856-433E-BE59-1D24EF8EB0EF}"/>
+              </a:ext>
+            </a:extLst>
+          </p:cNvPr>
+          <p:cNvSpPr txBox="1"/>
+          <p:nvPr/>
+        </p:nvSpPr>
+        <p:spPr>
+          <a:xfrm>
+            <a:off x="4097114" y="5330516"/>
+            <a:ext cx="1414490" cy="369332"/>
+          </a:xfrm>
+          <a:prstGeom prst="rect">
+            <a:avLst/>
+          </a:prstGeom>
+          <a:noFill/>
+        </p:spPr>
+        <p:txBody>
+          <a:bodyPr wrap="none" rtlCol="0">
+            <a:spAutoFit/>
+          </a:bodyPr>
+          <a:lstStyle/>
+          <a:p>
+            <a:pPr algn="ctr"/>
+            <a:r>
+              <a:rPr lang="en-US" dirty="0">
+                <a:solidFill>
+                  <a:schemeClr val="tx1">
+                    <a:lumMod val="50000"/>
+                    <a:lumOff val="50000"/>
+                  </a:schemeClr>
+                </a:solidFill>
+              </a:rPr>
+              <a:t>Tech Support</a:t>
+            </a:r>
+          </a:p>
+        </p:txBody>
+      </p:sp>
+      <p:sp>
+        <p:nvSpPr>
+          <p:cNvPr id="23" name="TextBox 22">
+            <a:extLst>
+              <a:ext uri="{FF2B5EF4-FFF2-40B4-BE49-F238E27FC236}">
+                <a16:creationId xmlns:a16="http://schemas.microsoft.com/office/drawing/2014/main" id="{2B7DE980-58F0-4F7A-8581-F01ACED23DBA}"/>
+              </a:ext>
+            </a:extLst>
+          </p:cNvPr>
+          <p:cNvSpPr txBox="1"/>
+          <p:nvPr/>
+        </p:nvSpPr>
+        <p:spPr>
+          <a:xfrm>
+            <a:off x="1371328" y="7875925"/>
+            <a:ext cx="987322" cy="369332"/>
+          </a:xfrm>
+          <a:prstGeom prst="rect">
+            <a:avLst/>
+          </a:prstGeom>
+          <a:noFill/>
+        </p:spPr>
+        <p:txBody>
+          <a:bodyPr wrap="none" rtlCol="0">
+            <a:spAutoFit/>
+          </a:bodyPr>
+          <a:lstStyle/>
+          <a:p>
+            <a:pPr algn="ctr"/>
+            <a:r>
+              <a:rPr lang="en-US" dirty="0">
+                <a:solidFill>
+                  <a:schemeClr val="tx1">
+                    <a:lumMod val="50000"/>
+                    <a:lumOff val="50000"/>
+                  </a:schemeClr>
+                </a:solidFill>
+              </a:rPr>
+              <a:t>Contract</a:t>
+            </a:r>
+          </a:p>
+        </p:txBody>
+      </p:sp>
+      <p:sp>
+        <p:nvSpPr>
+          <p:cNvPr id="24" name="TextBox 23">
+            <a:extLst>
+              <a:ext uri="{FF2B5EF4-FFF2-40B4-BE49-F238E27FC236}">
+                <a16:creationId xmlns:a16="http://schemas.microsoft.com/office/drawing/2014/main" id="{72E3288A-3A09-4D17-AC59-C9AD1DF75B10}"/>
+              </a:ext>
+            </a:extLst>
+          </p:cNvPr>
+          <p:cNvSpPr txBox="1"/>
+          <p:nvPr/>
+        </p:nvSpPr>
+        <p:spPr>
+          <a:xfrm>
+            <a:off x="3957076" y="7875925"/>
+            <a:ext cx="1694566" cy="369332"/>
+          </a:xfrm>
+          <a:prstGeom prst="rect">
+            <a:avLst/>
+          </a:prstGeom>
+          <a:noFill/>
+        </p:spPr>
+        <p:txBody>
+          <a:bodyPr wrap="none" rtlCol="0">
+            <a:spAutoFit/>
+          </a:bodyPr>
+          <a:lstStyle/>
+          <a:p>
+            <a:pPr algn="ctr"/>
+            <a:r>
+              <a:rPr lang="en-US" dirty="0">
+                <a:solidFill>
+                  <a:schemeClr val="tx1">
+                    <a:lumMod val="50000"/>
+                    <a:lumOff val="50000"/>
+                  </a:schemeClr>
+                </a:solidFill>
+              </a:rPr>
+              <a:t>Paperless Billing</a:t>
+            </a:r>
+          </a:p>
+        </p:txBody>
+      </p:sp>
+      <p:sp>
+        <p:nvSpPr>
+          <p:cNvPr id="25" name="TextBox 24">
+            <a:extLst>
+              <a:ext uri="{FF2B5EF4-FFF2-40B4-BE49-F238E27FC236}">
+                <a16:creationId xmlns:a16="http://schemas.microsoft.com/office/drawing/2014/main" id="{0D83CF02-B2D9-432D-A963-7024B27FBBF9}"/>
+              </a:ext>
+            </a:extLst>
+          </p:cNvPr>
+          <p:cNvSpPr txBox="1"/>
+          <p:nvPr/>
+        </p:nvSpPr>
+        <p:spPr>
+          <a:xfrm>
+            <a:off x="6729980" y="7875925"/>
+            <a:ext cx="1811971" cy="369332"/>
+          </a:xfrm>
+          <a:prstGeom prst="rect">
+            <a:avLst/>
+          </a:prstGeom>
+          <a:noFill/>
+        </p:spPr>
+        <p:txBody>
+          <a:bodyPr wrap="none" rtlCol="0">
+            <a:spAutoFit/>
+          </a:bodyPr>
+          <a:lstStyle/>
+          <a:p>
+            <a:pPr algn="ctr"/>
+            <a:r>
+              <a:rPr lang="en-US" dirty="0">
+                <a:solidFill>
+                  <a:schemeClr val="tx1">
+                    <a:lumMod val="50000"/>
+                    <a:lumOff val="50000"/>
+                  </a:schemeClr>
+                </a:solidFill>
+              </a:rPr>
+              <a:t>Payment Method</a:t>
+            </a:r>
+          </a:p>
+        </p:txBody>
+      </p:sp>
+      <p:sp>
+        <p:nvSpPr>
+          <p:cNvPr id="26" name="TextBox 25">
+            <a:extLst>
+              <a:ext uri="{FF2B5EF4-FFF2-40B4-BE49-F238E27FC236}">
+                <a16:creationId xmlns:a16="http://schemas.microsoft.com/office/drawing/2014/main" id="{17FF2D6A-C871-4E39-B07B-D60FCF5FB2F0}"/>
+              </a:ext>
+            </a:extLst>
+          </p:cNvPr>
+          <p:cNvSpPr txBox="1"/>
+          <p:nvPr/>
+        </p:nvSpPr>
+        <p:spPr>
+          <a:xfrm>
+            <a:off x="10134519" y="7875925"/>
+            <a:ext cx="753732" cy="369332"/>
+          </a:xfrm>
+          <a:prstGeom prst="rect">
+            <a:avLst/>
+          </a:prstGeom>
+          <a:noFill/>
+        </p:spPr>
+        <p:txBody>
+          <a:bodyPr wrap="none" rtlCol="0">
+            <a:spAutoFit/>
+          </a:bodyPr>
+          <a:lstStyle/>
+          <a:p>
+            <a:pPr algn="ctr"/>
+            <a:r>
+              <a:rPr lang="en-US" dirty="0">
+                <a:solidFill>
+                  <a:schemeClr val="tx1">
+                    <a:lumMod val="50000"/>
+                    <a:lumOff val="50000"/>
+                  </a:schemeClr>
+                </a:solidFill>
+              </a:rPr>
+              <a:t>Churn</a:t>
+            </a:r>
+          </a:p>
+        </p:txBody>
+      </p:sp>
     </p:spTree>
     <p:extLst>
       <p:ext uri="{BB962C8B-B14F-4D97-AF65-F5344CB8AC3E}">
-        <p14:creationId xmlns:p14="http://schemas.microsoft.com/office/powerpoint/2010/main" val="1417333963"/>
+        <p14:creationId xmlns:p14="http://schemas.microsoft.com/office/powerpoint/2010/main" val="905874030"/>
       </p:ext>
     </p:extLst>
   </p:cSld>
@@ -3109,10 +3828,10 @@
       </p:grpSpPr>
       <p:pic>
         <p:nvPicPr>
-          <p:cNvPr id="18" name="Picture 17">
-            <a:extLst>
-              <a:ext uri="{FF2B5EF4-FFF2-40B4-BE49-F238E27FC236}">
-                <a16:creationId xmlns:a16="http://schemas.microsoft.com/office/drawing/2014/main" id="{877FC9A4-FF47-497B-8085-00A164127C23}"/>
+          <p:cNvPr id="2" name="Picture 1">
+            <a:extLst>
+              <a:ext uri="{FF2B5EF4-FFF2-40B4-BE49-F238E27FC236}">
+                <a16:creationId xmlns:a16="http://schemas.microsoft.com/office/drawing/2014/main" id="{579D8CAB-BC2B-413F-870D-FB7F02970406}"/>
               </a:ext>
             </a:extLst>
           </p:cNvPr>
@@ -3129,8 +3848,8 @@
         </p:blipFill>
         <p:spPr>
           <a:xfrm>
-            <a:off x="0" y="704851"/>
-            <a:ext cx="5772151" cy="2641386"/>
+            <a:off x="1743488" y="506355"/>
+            <a:ext cx="8705021" cy="2652269"/>
           </a:xfrm>
           <a:prstGeom prst="rect">
             <a:avLst/>
@@ -3139,10 +3858,10 @@
       </p:pic>
       <p:pic>
         <p:nvPicPr>
-          <p:cNvPr id="19" name="Picture 18">
-            <a:extLst>
-              <a:ext uri="{FF2B5EF4-FFF2-40B4-BE49-F238E27FC236}">
-                <a16:creationId xmlns:a16="http://schemas.microsoft.com/office/drawing/2014/main" id="{AFD2394A-D791-485C-AFBC-594C16C6FF0F}"/>
+          <p:cNvPr id="8" name="Picture 7">
+            <a:extLst>
+              <a:ext uri="{FF2B5EF4-FFF2-40B4-BE49-F238E27FC236}">
+                <a16:creationId xmlns:a16="http://schemas.microsoft.com/office/drawing/2014/main" id="{4FFD5FA7-21DE-4FA9-894E-2F02E5BB6F61}"/>
               </a:ext>
             </a:extLst>
           </p:cNvPr>
@@ -3159,8 +3878,8 @@
         </p:blipFill>
         <p:spPr>
           <a:xfrm>
-            <a:off x="6419849" y="704851"/>
-            <a:ext cx="5772151" cy="2628838"/>
+            <a:off x="1743488" y="3555436"/>
+            <a:ext cx="8705021" cy="2648320"/>
           </a:xfrm>
           <a:prstGeom prst="rect">
             <a:avLst/>
@@ -3169,10 +3888,10 @@
       </p:pic>
       <p:pic>
         <p:nvPicPr>
-          <p:cNvPr id="20" name="Picture 19">
-            <a:extLst>
-              <a:ext uri="{FF2B5EF4-FFF2-40B4-BE49-F238E27FC236}">
-                <a16:creationId xmlns:a16="http://schemas.microsoft.com/office/drawing/2014/main" id="{D2CE30D4-2AA5-41DB-B172-DA1CF09CDFF4}"/>
+          <p:cNvPr id="9" name="Picture 8">
+            <a:extLst>
+              <a:ext uri="{FF2B5EF4-FFF2-40B4-BE49-F238E27FC236}">
+                <a16:creationId xmlns:a16="http://schemas.microsoft.com/office/drawing/2014/main" id="{A02E4B8D-193D-4578-B974-113EBA7EB8D7}"/>
               </a:ext>
             </a:extLst>
           </p:cNvPr>
@@ -3189,18 +3908,123 @@
         </p:blipFill>
         <p:spPr>
           <a:xfrm>
-            <a:off x="3028975" y="3479587"/>
-            <a:ext cx="6134052" cy="2806996"/>
+            <a:off x="1743490" y="6573088"/>
+            <a:ext cx="8705020" cy="2648320"/>
           </a:xfrm>
           <a:prstGeom prst="rect">
             <a:avLst/>
           </a:prstGeom>
         </p:spPr>
       </p:pic>
+      <p:sp>
+        <p:nvSpPr>
+          <p:cNvPr id="5" name="TextBox 4">
+            <a:extLst>
+              <a:ext uri="{FF2B5EF4-FFF2-40B4-BE49-F238E27FC236}">
+                <a16:creationId xmlns:a16="http://schemas.microsoft.com/office/drawing/2014/main" id="{CF7B87C7-497B-4704-A20F-B5E283BC22FF}"/>
+              </a:ext>
+            </a:extLst>
+          </p:cNvPr>
+          <p:cNvSpPr txBox="1"/>
+          <p:nvPr/>
+        </p:nvSpPr>
+        <p:spPr>
+          <a:xfrm>
+            <a:off x="5160103" y="3192728"/>
+            <a:ext cx="1871794" cy="369332"/>
+          </a:xfrm>
+          <a:prstGeom prst="rect">
+            <a:avLst/>
+          </a:prstGeom>
+          <a:noFill/>
+        </p:spPr>
+        <p:txBody>
+          <a:bodyPr wrap="none" rtlCol="0">
+            <a:spAutoFit/>
+          </a:bodyPr>
+          <a:lstStyle/>
+          <a:p>
+            <a:r>
+              <a:rPr lang="en-US" dirty="0"/>
+              <a:t>Streaming Movies</a:t>
+            </a:r>
+          </a:p>
+        </p:txBody>
+      </p:sp>
+      <p:sp>
+        <p:nvSpPr>
+          <p:cNvPr id="6" name="TextBox 5">
+            <a:extLst>
+              <a:ext uri="{FF2B5EF4-FFF2-40B4-BE49-F238E27FC236}">
+                <a16:creationId xmlns:a16="http://schemas.microsoft.com/office/drawing/2014/main" id="{37E0A454-E6A4-4608-9DFA-E29C5542B7F2}"/>
+              </a:ext>
+            </a:extLst>
+          </p:cNvPr>
+          <p:cNvSpPr txBox="1"/>
+          <p:nvPr/>
+        </p:nvSpPr>
+        <p:spPr>
+          <a:xfrm>
+            <a:off x="5260130" y="135482"/>
+            <a:ext cx="1671740" cy="369332"/>
+          </a:xfrm>
+          <a:prstGeom prst="rect">
+            <a:avLst/>
+          </a:prstGeom>
+          <a:noFill/>
+        </p:spPr>
+        <p:txBody>
+          <a:bodyPr wrap="none" rtlCol="0">
+            <a:spAutoFit/>
+          </a:bodyPr>
+          <a:lstStyle/>
+          <a:p>
+            <a:r>
+              <a:rPr lang="en-US" dirty="0"/>
+              <a:t>Internet Service</a:t>
+            </a:r>
+          </a:p>
+        </p:txBody>
+      </p:sp>
+      <p:sp>
+        <p:nvSpPr>
+          <p:cNvPr id="7" name="TextBox 6">
+            <a:extLst>
+              <a:ext uri="{FF2B5EF4-FFF2-40B4-BE49-F238E27FC236}">
+                <a16:creationId xmlns:a16="http://schemas.microsoft.com/office/drawing/2014/main" id="{1549E8BE-E23B-4C31-AEE0-ABF854074955}"/>
+              </a:ext>
+            </a:extLst>
+          </p:cNvPr>
+          <p:cNvSpPr txBox="1"/>
+          <p:nvPr/>
+        </p:nvSpPr>
+        <p:spPr>
+          <a:xfrm>
+            <a:off x="5602339" y="6203756"/>
+            <a:ext cx="987322" cy="369332"/>
+          </a:xfrm>
+          <a:prstGeom prst="rect">
+            <a:avLst/>
+          </a:prstGeom>
+          <a:noFill/>
+        </p:spPr>
+        <p:txBody>
+          <a:bodyPr wrap="none" rtlCol="0">
+            <a:spAutoFit/>
+          </a:bodyPr>
+          <a:lstStyle/>
+          <a:p>
+            <a:r>
+              <a:rPr lang="en-US" dirty="0"/>
+              <a:t>Contract</a:t>
+            </a:r>
+          </a:p>
+        </p:txBody>
+      </p:sp>
     </p:spTree>
     <p:extLst>
       <p:ext uri="{BB962C8B-B14F-4D97-AF65-F5344CB8AC3E}">
-        <p14:creationId xmlns:p14="http://schemas.microsoft.com/office/powerpoint/2010/main" val="2582423852"/>
+        <p14:creationId xmlns:p14="http://schemas.microsoft.com/office/powerpoint/2010/main" val="1417333963"/>
       </p:ext>
     </p:extLst>
   </p:cSld>
@@ -3229,10 +4053,10 @@
       </p:grpSpPr>
       <p:pic>
         <p:nvPicPr>
-          <p:cNvPr id="5" name="Picture 4">
-            <a:extLst>
-              <a:ext uri="{FF2B5EF4-FFF2-40B4-BE49-F238E27FC236}">
-                <a16:creationId xmlns:a16="http://schemas.microsoft.com/office/drawing/2014/main" id="{0D3CBD2D-27C5-4787-B728-0466912C55C5}"/>
+          <p:cNvPr id="18" name="Picture 17">
+            <a:extLst>
+              <a:ext uri="{FF2B5EF4-FFF2-40B4-BE49-F238E27FC236}">
+                <a16:creationId xmlns:a16="http://schemas.microsoft.com/office/drawing/2014/main" id="{877FC9A4-FF47-497B-8085-00A164127C23}"/>
               </a:ext>
             </a:extLst>
           </p:cNvPr>
@@ -3249,8 +4073,8 @@
         </p:blipFill>
         <p:spPr>
           <a:xfrm>
-            <a:off x="1" y="2"/>
-            <a:ext cx="5283200" cy="756393"/>
+            <a:off x="196852" y="704851"/>
+            <a:ext cx="5575300" cy="2551305"/>
           </a:xfrm>
           <a:prstGeom prst="rect">
             <a:avLst/>
@@ -3259,10 +4083,10 @@
       </p:pic>
       <p:pic>
         <p:nvPicPr>
-          <p:cNvPr id="6" name="Picture 5">
-            <a:extLst>
-              <a:ext uri="{FF2B5EF4-FFF2-40B4-BE49-F238E27FC236}">
-                <a16:creationId xmlns:a16="http://schemas.microsoft.com/office/drawing/2014/main" id="{FB9A7486-7CFD-426C-A8AF-2F85C02BD5A1}"/>
+          <p:cNvPr id="19" name="Picture 18">
+            <a:extLst>
+              <a:ext uri="{FF2B5EF4-FFF2-40B4-BE49-F238E27FC236}">
+                <a16:creationId xmlns:a16="http://schemas.microsoft.com/office/drawing/2014/main" id="{AFD2394A-D791-485C-AFBC-594C16C6FF0F}"/>
               </a:ext>
             </a:extLst>
           </p:cNvPr>
@@ -3279,8 +4103,8 @@
         </p:blipFill>
         <p:spPr>
           <a:xfrm>
-            <a:off x="0" y="833439"/>
-            <a:ext cx="5283200" cy="789311"/>
+            <a:off x="6263174" y="704851"/>
+            <a:ext cx="5799703" cy="2641386"/>
           </a:xfrm>
           <a:prstGeom prst="rect">
             <a:avLst/>
@@ -3289,10 +4113,10 @@
       </p:pic>
       <p:pic>
         <p:nvPicPr>
-          <p:cNvPr id="7" name="Picture 6">
-            <a:extLst>
-              <a:ext uri="{FF2B5EF4-FFF2-40B4-BE49-F238E27FC236}">
-                <a16:creationId xmlns:a16="http://schemas.microsoft.com/office/drawing/2014/main" id="{16060771-0BA5-4591-A790-708B2A67B71D}"/>
+          <p:cNvPr id="20" name="Picture 19">
+            <a:extLst>
+              <a:ext uri="{FF2B5EF4-FFF2-40B4-BE49-F238E27FC236}">
+                <a16:creationId xmlns:a16="http://schemas.microsoft.com/office/drawing/2014/main" id="{D2CE30D4-2AA5-41DB-B172-DA1CF09CDFF4}"/>
               </a:ext>
             </a:extLst>
           </p:cNvPr>
@@ -3309,558 +4133,123 @@
         </p:blipFill>
         <p:spPr>
           <a:xfrm>
-            <a:off x="1" y="1699800"/>
-            <a:ext cx="5283200" cy="758849"/>
+            <a:off x="3028974" y="3703021"/>
+            <a:ext cx="6134052" cy="2806996"/>
           </a:xfrm>
           <a:prstGeom prst="rect">
             <a:avLst/>
           </a:prstGeom>
         </p:spPr>
       </p:pic>
-      <p:pic>
-        <p:nvPicPr>
-          <p:cNvPr id="8" name="Picture 7">
-            <a:extLst>
-              <a:ext uri="{FF2B5EF4-FFF2-40B4-BE49-F238E27FC236}">
-                <a16:creationId xmlns:a16="http://schemas.microsoft.com/office/drawing/2014/main" id="{D9B44983-88D0-4699-92C4-6F0A012A50A4}"/>
-              </a:ext>
-            </a:extLst>
-          </p:cNvPr>
-          <p:cNvPicPr>
-            <a:picLocks noChangeAspect="1"/>
-          </p:cNvPicPr>
-          <p:nvPr/>
-        </p:nvPicPr>
-        <p:blipFill>
-          <a:blip r:embed="rId5"/>
-          <a:stretch>
-            <a:fillRect/>
-          </a:stretch>
-        </p:blipFill>
-        <p:spPr>
-          <a:xfrm>
-            <a:off x="1" y="2535695"/>
-            <a:ext cx="5283200" cy="762167"/>
-          </a:xfrm>
-          <a:prstGeom prst="rect">
-            <a:avLst/>
-          </a:prstGeom>
-        </p:spPr>
-      </p:pic>
-      <p:pic>
-        <p:nvPicPr>
-          <p:cNvPr id="9" name="Picture 8">
-            <a:extLst>
-              <a:ext uri="{FF2B5EF4-FFF2-40B4-BE49-F238E27FC236}">
-                <a16:creationId xmlns:a16="http://schemas.microsoft.com/office/drawing/2014/main" id="{608C2047-6E80-4C4E-AEBB-18C795FC9DE8}"/>
-              </a:ext>
-            </a:extLst>
-          </p:cNvPr>
-          <p:cNvPicPr>
-            <a:picLocks noChangeAspect="1"/>
-          </p:cNvPicPr>
-          <p:nvPr/>
-        </p:nvPicPr>
-        <p:blipFill>
-          <a:blip r:embed="rId6"/>
-          <a:stretch>
-            <a:fillRect/>
-          </a:stretch>
-        </p:blipFill>
-        <p:spPr>
-          <a:xfrm>
-            <a:off x="1" y="3374906"/>
-            <a:ext cx="5283200" cy="773714"/>
-          </a:xfrm>
-          <a:prstGeom prst="rect">
-            <a:avLst/>
-          </a:prstGeom>
-        </p:spPr>
-      </p:pic>
-      <p:pic>
-        <p:nvPicPr>
-          <p:cNvPr id="10" name="Picture 9">
-            <a:extLst>
-              <a:ext uri="{FF2B5EF4-FFF2-40B4-BE49-F238E27FC236}">
-                <a16:creationId xmlns:a16="http://schemas.microsoft.com/office/drawing/2014/main" id="{CBE3AC01-C4AB-492E-99C8-93A1BCE688EF}"/>
-              </a:ext>
-            </a:extLst>
-          </p:cNvPr>
-          <p:cNvPicPr>
-            <a:picLocks noChangeAspect="1"/>
-          </p:cNvPicPr>
-          <p:nvPr/>
-        </p:nvPicPr>
-        <p:blipFill>
-          <a:blip r:embed="rId7"/>
-          <a:stretch>
-            <a:fillRect/>
-          </a:stretch>
-        </p:blipFill>
-        <p:spPr>
-          <a:xfrm>
-            <a:off x="0" y="4225669"/>
-            <a:ext cx="5283200" cy="1316393"/>
-          </a:xfrm>
-          <a:prstGeom prst="rect">
-            <a:avLst/>
-          </a:prstGeom>
-        </p:spPr>
-      </p:pic>
-      <p:pic>
-        <p:nvPicPr>
-          <p:cNvPr id="11" name="Picture 10">
-            <a:extLst>
-              <a:ext uri="{FF2B5EF4-FFF2-40B4-BE49-F238E27FC236}">
-                <a16:creationId xmlns:a16="http://schemas.microsoft.com/office/drawing/2014/main" id="{2422F2BA-37CD-473E-BAA0-B96BE915DB8E}"/>
-              </a:ext>
-            </a:extLst>
-          </p:cNvPr>
-          <p:cNvPicPr>
-            <a:picLocks noChangeAspect="1"/>
-          </p:cNvPicPr>
-          <p:nvPr/>
-        </p:nvPicPr>
-        <p:blipFill>
-          <a:blip r:embed="rId8"/>
-          <a:stretch>
-            <a:fillRect/>
-          </a:stretch>
-        </p:blipFill>
-        <p:spPr>
-          <a:xfrm>
-            <a:off x="6095999" y="0"/>
-            <a:ext cx="6095999" cy="886904"/>
-          </a:xfrm>
-          <a:prstGeom prst="rect">
-            <a:avLst/>
-          </a:prstGeom>
-        </p:spPr>
-      </p:pic>
-      <p:pic>
-        <p:nvPicPr>
-          <p:cNvPr id="12" name="Picture 11">
-            <a:extLst>
-              <a:ext uri="{FF2B5EF4-FFF2-40B4-BE49-F238E27FC236}">
-                <a16:creationId xmlns:a16="http://schemas.microsoft.com/office/drawing/2014/main" id="{944C271A-D62C-4887-A9AF-326A6BA36DF6}"/>
-              </a:ext>
-            </a:extLst>
-          </p:cNvPr>
-          <p:cNvPicPr>
-            <a:picLocks noChangeAspect="1"/>
-          </p:cNvPicPr>
-          <p:nvPr/>
-        </p:nvPicPr>
-        <p:blipFill>
-          <a:blip r:embed="rId9"/>
-          <a:stretch>
-            <a:fillRect/>
-          </a:stretch>
-        </p:blipFill>
-        <p:spPr>
-          <a:xfrm>
-            <a:off x="6095997" y="833439"/>
-            <a:ext cx="6095999" cy="925502"/>
-          </a:xfrm>
-          <a:prstGeom prst="rect">
-            <a:avLst/>
-          </a:prstGeom>
-        </p:spPr>
-      </p:pic>
-      <p:pic>
-        <p:nvPicPr>
-          <p:cNvPr id="13" name="Picture 12">
-            <a:extLst>
-              <a:ext uri="{FF2B5EF4-FFF2-40B4-BE49-F238E27FC236}">
-                <a16:creationId xmlns:a16="http://schemas.microsoft.com/office/drawing/2014/main" id="{9412FC29-0263-4FEB-9DF0-635B8E4B8692}"/>
-              </a:ext>
-            </a:extLst>
-          </p:cNvPr>
-          <p:cNvPicPr>
-            <a:picLocks noChangeAspect="1"/>
-          </p:cNvPicPr>
-          <p:nvPr/>
-        </p:nvPicPr>
-        <p:blipFill>
-          <a:blip r:embed="rId10"/>
-          <a:stretch>
-            <a:fillRect/>
-          </a:stretch>
-        </p:blipFill>
-        <p:spPr>
-          <a:xfrm>
-            <a:off x="6095995" y="1726952"/>
-            <a:ext cx="5948394" cy="865428"/>
-          </a:xfrm>
-          <a:prstGeom prst="rect">
-            <a:avLst/>
-          </a:prstGeom>
-        </p:spPr>
-      </p:pic>
-      <p:pic>
-        <p:nvPicPr>
-          <p:cNvPr id="14" name="Picture 13">
-            <a:extLst>
-              <a:ext uri="{FF2B5EF4-FFF2-40B4-BE49-F238E27FC236}">
-                <a16:creationId xmlns:a16="http://schemas.microsoft.com/office/drawing/2014/main" id="{46663BE5-A5F2-4B44-9A36-107F88C2978C}"/>
-              </a:ext>
-            </a:extLst>
-          </p:cNvPr>
-          <p:cNvPicPr>
-            <a:picLocks noChangeAspect="1"/>
-          </p:cNvPicPr>
-          <p:nvPr/>
-        </p:nvPicPr>
-        <p:blipFill>
-          <a:blip r:embed="rId11"/>
-          <a:stretch>
-            <a:fillRect/>
-          </a:stretch>
-        </p:blipFill>
-        <p:spPr>
-          <a:xfrm>
-            <a:off x="6097007" y="2535695"/>
-            <a:ext cx="5947382" cy="865428"/>
-          </a:xfrm>
-          <a:prstGeom prst="rect">
-            <a:avLst/>
-          </a:prstGeom>
-        </p:spPr>
-      </p:pic>
-      <p:pic>
-        <p:nvPicPr>
-          <p:cNvPr id="15" name="Picture 14">
-            <a:extLst>
-              <a:ext uri="{FF2B5EF4-FFF2-40B4-BE49-F238E27FC236}">
-                <a16:creationId xmlns:a16="http://schemas.microsoft.com/office/drawing/2014/main" id="{57E44CBB-0B23-47FA-A80C-FD0FF2332A74}"/>
-              </a:ext>
-            </a:extLst>
-          </p:cNvPr>
-          <p:cNvPicPr>
-            <a:picLocks noChangeAspect="1"/>
-          </p:cNvPicPr>
-          <p:nvPr/>
-        </p:nvPicPr>
-        <p:blipFill>
-          <a:blip r:embed="rId12"/>
-          <a:stretch>
-            <a:fillRect/>
-          </a:stretch>
-        </p:blipFill>
-        <p:spPr>
-          <a:xfrm>
-            <a:off x="6095994" y="3366481"/>
-            <a:ext cx="6056096" cy="886904"/>
-          </a:xfrm>
-          <a:prstGeom prst="rect">
-            <a:avLst/>
-          </a:prstGeom>
-        </p:spPr>
-      </p:pic>
-      <p:pic>
-        <p:nvPicPr>
-          <p:cNvPr id="16" name="Picture 15">
-            <a:extLst>
-              <a:ext uri="{FF2B5EF4-FFF2-40B4-BE49-F238E27FC236}">
-                <a16:creationId xmlns:a16="http://schemas.microsoft.com/office/drawing/2014/main" id="{6274D63D-C7DB-4FFF-83F6-D6E967946B0C}"/>
-              </a:ext>
-            </a:extLst>
-          </p:cNvPr>
-          <p:cNvPicPr>
-            <a:picLocks noChangeAspect="1"/>
-          </p:cNvPicPr>
-          <p:nvPr/>
-        </p:nvPicPr>
-        <p:blipFill>
-          <a:blip r:embed="rId13"/>
-          <a:stretch>
-            <a:fillRect/>
-          </a:stretch>
-        </p:blipFill>
-        <p:spPr>
-          <a:xfrm>
-            <a:off x="6095992" y="4249965"/>
-            <a:ext cx="6075951" cy="886904"/>
-          </a:xfrm>
-          <a:prstGeom prst="rect">
-            <a:avLst/>
-          </a:prstGeom>
-        </p:spPr>
-      </p:pic>
-      <p:pic>
-        <p:nvPicPr>
-          <p:cNvPr id="17" name="Picture 16">
-            <a:extLst>
-              <a:ext uri="{FF2B5EF4-FFF2-40B4-BE49-F238E27FC236}">
-                <a16:creationId xmlns:a16="http://schemas.microsoft.com/office/drawing/2014/main" id="{BB23CCA7-3F1A-4675-8C57-57DE0A4C8D72}"/>
-              </a:ext>
-            </a:extLst>
-          </p:cNvPr>
-          <p:cNvPicPr>
-            <a:picLocks noChangeAspect="1"/>
-          </p:cNvPicPr>
-          <p:nvPr/>
-        </p:nvPicPr>
-        <p:blipFill>
-          <a:blip r:embed="rId14"/>
-          <a:stretch>
-            <a:fillRect/>
-          </a:stretch>
-        </p:blipFill>
-        <p:spPr>
-          <a:xfrm>
-            <a:off x="6095992" y="5136049"/>
-            <a:ext cx="5993735" cy="849662"/>
-          </a:xfrm>
-          <a:prstGeom prst="rect">
-            <a:avLst/>
-          </a:prstGeom>
-        </p:spPr>
-      </p:pic>
-      <p:pic>
-        <p:nvPicPr>
-          <p:cNvPr id="18" name="Picture 17">
-            <a:extLst>
-              <a:ext uri="{FF2B5EF4-FFF2-40B4-BE49-F238E27FC236}">
-                <a16:creationId xmlns:a16="http://schemas.microsoft.com/office/drawing/2014/main" id="{36996910-50B0-4536-A0C8-A9A30A5C83F0}"/>
-              </a:ext>
-            </a:extLst>
-          </p:cNvPr>
-          <p:cNvPicPr>
-            <a:picLocks noChangeAspect="1"/>
-          </p:cNvPicPr>
-          <p:nvPr/>
-        </p:nvPicPr>
-        <p:blipFill>
-          <a:blip r:embed="rId15"/>
-          <a:stretch>
-            <a:fillRect/>
-          </a:stretch>
-        </p:blipFill>
-        <p:spPr>
-          <a:xfrm>
-            <a:off x="6095992" y="5910970"/>
-            <a:ext cx="6039358" cy="883484"/>
-          </a:xfrm>
-          <a:prstGeom prst="rect">
-            <a:avLst/>
-          </a:prstGeom>
-        </p:spPr>
-      </p:pic>
-      <p:pic>
-        <p:nvPicPr>
-          <p:cNvPr id="19" name="Picture 18">
-            <a:extLst>
-              <a:ext uri="{FF2B5EF4-FFF2-40B4-BE49-F238E27FC236}">
-                <a16:creationId xmlns:a16="http://schemas.microsoft.com/office/drawing/2014/main" id="{D2F1BD85-4EB2-487C-93DF-131042C7E093}"/>
-              </a:ext>
-            </a:extLst>
-          </p:cNvPr>
-          <p:cNvPicPr>
-            <a:picLocks noChangeAspect="1"/>
-          </p:cNvPicPr>
-          <p:nvPr/>
-        </p:nvPicPr>
-        <p:blipFill>
-          <a:blip r:embed="rId16"/>
-          <a:stretch>
-            <a:fillRect/>
-          </a:stretch>
-        </p:blipFill>
-        <p:spPr>
-          <a:xfrm>
-            <a:off x="6107207" y="6961191"/>
-            <a:ext cx="6084789" cy="858794"/>
-          </a:xfrm>
-          <a:prstGeom prst="rect">
-            <a:avLst/>
-          </a:prstGeom>
-        </p:spPr>
-      </p:pic>
-      <p:pic>
-        <p:nvPicPr>
-          <p:cNvPr id="20" name="Picture 19">
-            <a:extLst>
-              <a:ext uri="{FF2B5EF4-FFF2-40B4-BE49-F238E27FC236}">
-                <a16:creationId xmlns:a16="http://schemas.microsoft.com/office/drawing/2014/main" id="{6986FFEC-3343-41DC-844E-60163861FC98}"/>
-              </a:ext>
-            </a:extLst>
-          </p:cNvPr>
-          <p:cNvPicPr>
-            <a:picLocks noChangeAspect="1"/>
-          </p:cNvPicPr>
-          <p:nvPr/>
-        </p:nvPicPr>
-        <p:blipFill>
-          <a:blip r:embed="rId17"/>
-          <a:stretch>
-            <a:fillRect/>
-          </a:stretch>
-        </p:blipFill>
-        <p:spPr>
-          <a:xfrm>
-            <a:off x="6095992" y="7819985"/>
-            <a:ext cx="6078134" cy="858794"/>
-          </a:xfrm>
-          <a:prstGeom prst="rect">
-            <a:avLst/>
-          </a:prstGeom>
-        </p:spPr>
-      </p:pic>
-      <p:pic>
-        <p:nvPicPr>
-          <p:cNvPr id="21" name="Picture 20">
-            <a:extLst>
-              <a:ext uri="{FF2B5EF4-FFF2-40B4-BE49-F238E27FC236}">
-                <a16:creationId xmlns:a16="http://schemas.microsoft.com/office/drawing/2014/main" id="{D7919166-4D19-4FCA-B964-44313F736CE9}"/>
-              </a:ext>
-            </a:extLst>
-          </p:cNvPr>
-          <p:cNvPicPr>
-            <a:picLocks noChangeAspect="1"/>
-          </p:cNvPicPr>
-          <p:nvPr/>
-        </p:nvPicPr>
-        <p:blipFill>
-          <a:blip r:embed="rId18"/>
-          <a:stretch>
-            <a:fillRect/>
-          </a:stretch>
-        </p:blipFill>
-        <p:spPr>
-          <a:xfrm>
-            <a:off x="6095992" y="8634069"/>
-            <a:ext cx="5986597" cy="886904"/>
-          </a:xfrm>
-          <a:prstGeom prst="rect">
-            <a:avLst/>
-          </a:prstGeom>
-        </p:spPr>
-      </p:pic>
-      <p:pic>
-        <p:nvPicPr>
-          <p:cNvPr id="22" name="Picture 21">
-            <a:extLst>
-              <a:ext uri="{FF2B5EF4-FFF2-40B4-BE49-F238E27FC236}">
-                <a16:creationId xmlns:a16="http://schemas.microsoft.com/office/drawing/2014/main" id="{E599947A-B421-4913-B0E9-B5C63AB0F47C}"/>
-              </a:ext>
-            </a:extLst>
-          </p:cNvPr>
-          <p:cNvPicPr>
-            <a:picLocks noChangeAspect="1"/>
-          </p:cNvPicPr>
-          <p:nvPr/>
-        </p:nvPicPr>
-        <p:blipFill>
-          <a:blip r:embed="rId19"/>
-          <a:stretch>
-            <a:fillRect/>
-          </a:stretch>
-        </p:blipFill>
-        <p:spPr>
-          <a:xfrm>
-            <a:off x="19108" y="8564706"/>
-            <a:ext cx="5193264" cy="765383"/>
-          </a:xfrm>
-          <a:prstGeom prst="rect">
-            <a:avLst/>
-          </a:prstGeom>
-        </p:spPr>
-      </p:pic>
-      <p:pic>
-        <p:nvPicPr>
-          <p:cNvPr id="23" name="Picture 22">
-            <a:extLst>
-              <a:ext uri="{FF2B5EF4-FFF2-40B4-BE49-F238E27FC236}">
-                <a16:creationId xmlns:a16="http://schemas.microsoft.com/office/drawing/2014/main" id="{5DA03EA8-150C-4524-B854-D11666AFD5B5}"/>
-              </a:ext>
-            </a:extLst>
-          </p:cNvPr>
-          <p:cNvPicPr>
-            <a:picLocks noChangeAspect="1"/>
-          </p:cNvPicPr>
-          <p:nvPr/>
-        </p:nvPicPr>
-        <p:blipFill>
-          <a:blip r:embed="rId20"/>
-          <a:stretch>
-            <a:fillRect/>
-          </a:stretch>
-        </p:blipFill>
-        <p:spPr>
-          <a:xfrm>
-            <a:off x="2" y="5623912"/>
-            <a:ext cx="5341969" cy="1316393"/>
-          </a:xfrm>
-          <a:prstGeom prst="rect">
-            <a:avLst/>
-          </a:prstGeom>
-        </p:spPr>
-      </p:pic>
-      <p:pic>
-        <p:nvPicPr>
-          <p:cNvPr id="24" name="Picture 23">
-            <a:extLst>
-              <a:ext uri="{FF2B5EF4-FFF2-40B4-BE49-F238E27FC236}">
-                <a16:creationId xmlns:a16="http://schemas.microsoft.com/office/drawing/2014/main" id="{AE152FE5-C3ED-4229-8109-6C86D9E51B65}"/>
-              </a:ext>
-            </a:extLst>
-          </p:cNvPr>
-          <p:cNvPicPr>
-            <a:picLocks noChangeAspect="1"/>
-          </p:cNvPicPr>
-          <p:nvPr/>
-        </p:nvPicPr>
-        <p:blipFill>
-          <a:blip r:embed="rId21"/>
-          <a:stretch>
-            <a:fillRect/>
-          </a:stretch>
-        </p:blipFill>
-        <p:spPr>
-          <a:xfrm>
-            <a:off x="19108" y="7024507"/>
-            <a:ext cx="5264092" cy="766726"/>
-          </a:xfrm>
-          <a:prstGeom prst="rect">
-            <a:avLst/>
-          </a:prstGeom>
-        </p:spPr>
-      </p:pic>
-      <p:pic>
-        <p:nvPicPr>
-          <p:cNvPr id="25" name="Picture 24">
-            <a:extLst>
-              <a:ext uri="{FF2B5EF4-FFF2-40B4-BE49-F238E27FC236}">
-                <a16:creationId xmlns:a16="http://schemas.microsoft.com/office/drawing/2014/main" id="{8C1D73B0-74D4-4674-9CAE-95A9823C715D}"/>
-              </a:ext>
-            </a:extLst>
-          </p:cNvPr>
-          <p:cNvPicPr>
-            <a:picLocks noChangeAspect="1"/>
-          </p:cNvPicPr>
-          <p:nvPr/>
-        </p:nvPicPr>
-        <p:blipFill>
-          <a:blip r:embed="rId22"/>
-          <a:stretch>
-            <a:fillRect/>
-          </a:stretch>
-        </p:blipFill>
-        <p:spPr>
-          <a:xfrm>
-            <a:off x="0" y="7864696"/>
-            <a:ext cx="5356470" cy="769373"/>
-          </a:xfrm>
-          <a:prstGeom prst="rect">
-            <a:avLst/>
-          </a:prstGeom>
-        </p:spPr>
-      </p:pic>
+      <p:sp>
+        <p:nvSpPr>
+          <p:cNvPr id="2" name="TextBox 1">
+            <a:extLst>
+              <a:ext uri="{FF2B5EF4-FFF2-40B4-BE49-F238E27FC236}">
+                <a16:creationId xmlns:a16="http://schemas.microsoft.com/office/drawing/2014/main" id="{8C240D69-EFC6-4DEF-BA88-EE5E11E99E00}"/>
+              </a:ext>
+            </a:extLst>
+          </p:cNvPr>
+          <p:cNvSpPr txBox="1"/>
+          <p:nvPr/>
+        </p:nvSpPr>
+        <p:spPr>
+          <a:xfrm>
+            <a:off x="2443485" y="335519"/>
+            <a:ext cx="885179" cy="369332"/>
+          </a:xfrm>
+          <a:prstGeom prst="rect">
+            <a:avLst/>
+          </a:prstGeom>
+          <a:noFill/>
+        </p:spPr>
+        <p:txBody>
+          <a:bodyPr wrap="none" rtlCol="0">
+            <a:spAutoFit/>
+          </a:bodyPr>
+          <a:lstStyle/>
+          <a:p>
+            <a:r>
+              <a:rPr lang="en-US" dirty="0"/>
+              <a:t>Gender</a:t>
+            </a:r>
+          </a:p>
+        </p:txBody>
+      </p:sp>
+      <p:sp>
+        <p:nvSpPr>
+          <p:cNvPr id="6" name="TextBox 5">
+            <a:extLst>
+              <a:ext uri="{FF2B5EF4-FFF2-40B4-BE49-F238E27FC236}">
+                <a16:creationId xmlns:a16="http://schemas.microsoft.com/office/drawing/2014/main" id="{BE66E1ED-D342-42A7-985F-359BB754397E}"/>
+              </a:ext>
+            </a:extLst>
+          </p:cNvPr>
+          <p:cNvSpPr txBox="1"/>
+          <p:nvPr/>
+        </p:nvSpPr>
+        <p:spPr>
+          <a:xfrm>
+            <a:off x="8721301" y="335519"/>
+            <a:ext cx="883447" cy="369332"/>
+          </a:xfrm>
+          <a:prstGeom prst="rect">
+            <a:avLst/>
+          </a:prstGeom>
+          <a:noFill/>
+        </p:spPr>
+        <p:txBody>
+          <a:bodyPr wrap="none" rtlCol="0">
+            <a:spAutoFit/>
+          </a:bodyPr>
+          <a:lstStyle/>
+          <a:p>
+            <a:r>
+              <a:rPr lang="en-US" dirty="0"/>
+              <a:t>Partner</a:t>
+            </a:r>
+          </a:p>
+        </p:txBody>
+      </p:sp>
+      <p:sp>
+        <p:nvSpPr>
+          <p:cNvPr id="7" name="TextBox 6">
+            <a:extLst>
+              <a:ext uri="{FF2B5EF4-FFF2-40B4-BE49-F238E27FC236}">
+                <a16:creationId xmlns:a16="http://schemas.microsoft.com/office/drawing/2014/main" id="{A91DF898-CD9A-4B22-B1AF-2CD2F282F467}"/>
+              </a:ext>
+            </a:extLst>
+          </p:cNvPr>
+          <p:cNvSpPr txBox="1"/>
+          <p:nvPr/>
+        </p:nvSpPr>
+        <p:spPr>
+          <a:xfrm>
+            <a:off x="5433255" y="3346237"/>
+            <a:ext cx="1325491" cy="369332"/>
+          </a:xfrm>
+          <a:prstGeom prst="rect">
+            <a:avLst/>
+          </a:prstGeom>
+          <a:noFill/>
+        </p:spPr>
+        <p:txBody>
+          <a:bodyPr wrap="none" rtlCol="0">
+            <a:spAutoFit/>
+          </a:bodyPr>
+          <a:lstStyle/>
+          <a:p>
+            <a:r>
+              <a:rPr lang="en-US" dirty="0"/>
+              <a:t>Dependents</a:t>
+            </a:r>
+          </a:p>
+        </p:txBody>
+      </p:sp>
     </p:spTree>
     <p:extLst>
       <p:ext uri="{BB962C8B-B14F-4D97-AF65-F5344CB8AC3E}">
-        <p14:creationId xmlns:p14="http://schemas.microsoft.com/office/powerpoint/2010/main" val="863806302"/>
+        <p14:creationId xmlns:p14="http://schemas.microsoft.com/office/powerpoint/2010/main" val="2582423852"/>
       </p:ext>
     </p:extLst>
   </p:cSld>
@@ -3889,14 +4278,16 @@
       </p:grpSpPr>
       <p:pic>
         <p:nvPicPr>
-          <p:cNvPr id="4" name="Picture 3">
-            <a:extLst>
-              <a:ext uri="{FF2B5EF4-FFF2-40B4-BE49-F238E27FC236}">
-                <a16:creationId xmlns:a16="http://schemas.microsoft.com/office/drawing/2014/main" id="{4F37C541-3B5D-4ECC-9680-D81D953C9014}"/>
-              </a:ext>
-            </a:extLst>
-          </p:cNvPr>
-          <p:cNvPicPr/>
+          <p:cNvPr id="5" name="Picture 4">
+            <a:extLst>
+              <a:ext uri="{FF2B5EF4-FFF2-40B4-BE49-F238E27FC236}">
+                <a16:creationId xmlns:a16="http://schemas.microsoft.com/office/drawing/2014/main" id="{0D3CBD2D-27C5-4787-B728-0466912C55C5}"/>
+              </a:ext>
+            </a:extLst>
+          </p:cNvPr>
+          <p:cNvPicPr>
+            <a:picLocks noChangeAspect="1"/>
+          </p:cNvPicPr>
           <p:nvPr/>
         </p:nvPicPr>
         <p:blipFill>
@@ -3907,8 +4298,8 @@
         </p:blipFill>
         <p:spPr>
           <a:xfrm>
-            <a:off x="992431" y="2971800"/>
-            <a:ext cx="7636756" cy="2829154"/>
+            <a:off x="1" y="2"/>
+            <a:ext cx="5283200" cy="756393"/>
           </a:xfrm>
           <a:prstGeom prst="rect">
             <a:avLst/>
@@ -3917,25 +4308,598 @@
       </p:pic>
       <p:pic>
         <p:nvPicPr>
-          <p:cNvPr id="5" name="Picture 4">
-            <a:extLst>
-              <a:ext uri="{FF2B5EF4-FFF2-40B4-BE49-F238E27FC236}">
-                <a16:creationId xmlns:a16="http://schemas.microsoft.com/office/drawing/2014/main" id="{997900C6-EE62-4B9A-A591-F4F18C189053}"/>
-              </a:ext>
-            </a:extLst>
-          </p:cNvPr>
-          <p:cNvPicPr/>
+          <p:cNvPr id="6" name="Picture 5">
+            <a:extLst>
+              <a:ext uri="{FF2B5EF4-FFF2-40B4-BE49-F238E27FC236}">
+                <a16:creationId xmlns:a16="http://schemas.microsoft.com/office/drawing/2014/main" id="{FB9A7486-7CFD-426C-A8AF-2F85C02BD5A1}"/>
+              </a:ext>
+            </a:extLst>
+          </p:cNvPr>
+          <p:cNvPicPr>
+            <a:picLocks noChangeAspect="1"/>
+          </p:cNvPicPr>
           <p:nvPr/>
         </p:nvPicPr>
-        <p:blipFill rotWithShape="1">
+        <p:blipFill>
           <a:blip r:embed="rId3"/>
-          <a:srcRect/>
-          <a:stretch/>
+          <a:stretch>
+            <a:fillRect/>
+          </a:stretch>
         </p:blipFill>
         <p:spPr>
           <a:xfrm>
-            <a:off x="812802" y="5943600"/>
-            <a:ext cx="7816384" cy="2829154"/>
+            <a:off x="0" y="833439"/>
+            <a:ext cx="5283200" cy="789311"/>
+          </a:xfrm>
+          <a:prstGeom prst="rect">
+            <a:avLst/>
+          </a:prstGeom>
+        </p:spPr>
+      </p:pic>
+      <p:pic>
+        <p:nvPicPr>
+          <p:cNvPr id="7" name="Picture 6">
+            <a:extLst>
+              <a:ext uri="{FF2B5EF4-FFF2-40B4-BE49-F238E27FC236}">
+                <a16:creationId xmlns:a16="http://schemas.microsoft.com/office/drawing/2014/main" id="{16060771-0BA5-4591-A790-708B2A67B71D}"/>
+              </a:ext>
+            </a:extLst>
+          </p:cNvPr>
+          <p:cNvPicPr>
+            <a:picLocks noChangeAspect="1"/>
+          </p:cNvPicPr>
+          <p:nvPr/>
+        </p:nvPicPr>
+        <p:blipFill>
+          <a:blip r:embed="rId4"/>
+          <a:stretch>
+            <a:fillRect/>
+          </a:stretch>
+        </p:blipFill>
+        <p:spPr>
+          <a:xfrm>
+            <a:off x="1" y="1699800"/>
+            <a:ext cx="5283200" cy="758849"/>
+          </a:xfrm>
+          <a:prstGeom prst="rect">
+            <a:avLst/>
+          </a:prstGeom>
+        </p:spPr>
+      </p:pic>
+      <p:pic>
+        <p:nvPicPr>
+          <p:cNvPr id="8" name="Picture 7">
+            <a:extLst>
+              <a:ext uri="{FF2B5EF4-FFF2-40B4-BE49-F238E27FC236}">
+                <a16:creationId xmlns:a16="http://schemas.microsoft.com/office/drawing/2014/main" id="{D9B44983-88D0-4699-92C4-6F0A012A50A4}"/>
+              </a:ext>
+            </a:extLst>
+          </p:cNvPr>
+          <p:cNvPicPr>
+            <a:picLocks noChangeAspect="1"/>
+          </p:cNvPicPr>
+          <p:nvPr/>
+        </p:nvPicPr>
+        <p:blipFill>
+          <a:blip r:embed="rId5"/>
+          <a:stretch>
+            <a:fillRect/>
+          </a:stretch>
+        </p:blipFill>
+        <p:spPr>
+          <a:xfrm>
+            <a:off x="1" y="2535695"/>
+            <a:ext cx="5283200" cy="762167"/>
+          </a:xfrm>
+          <a:prstGeom prst="rect">
+            <a:avLst/>
+          </a:prstGeom>
+        </p:spPr>
+      </p:pic>
+      <p:pic>
+        <p:nvPicPr>
+          <p:cNvPr id="9" name="Picture 8">
+            <a:extLst>
+              <a:ext uri="{FF2B5EF4-FFF2-40B4-BE49-F238E27FC236}">
+                <a16:creationId xmlns:a16="http://schemas.microsoft.com/office/drawing/2014/main" id="{608C2047-6E80-4C4E-AEBB-18C795FC9DE8}"/>
+              </a:ext>
+            </a:extLst>
+          </p:cNvPr>
+          <p:cNvPicPr>
+            <a:picLocks noChangeAspect="1"/>
+          </p:cNvPicPr>
+          <p:nvPr/>
+        </p:nvPicPr>
+        <p:blipFill>
+          <a:blip r:embed="rId6"/>
+          <a:stretch>
+            <a:fillRect/>
+          </a:stretch>
+        </p:blipFill>
+        <p:spPr>
+          <a:xfrm>
+            <a:off x="1" y="3374906"/>
+            <a:ext cx="5283200" cy="773714"/>
+          </a:xfrm>
+          <a:prstGeom prst="rect">
+            <a:avLst/>
+          </a:prstGeom>
+        </p:spPr>
+      </p:pic>
+      <p:pic>
+        <p:nvPicPr>
+          <p:cNvPr id="10" name="Picture 9">
+            <a:extLst>
+              <a:ext uri="{FF2B5EF4-FFF2-40B4-BE49-F238E27FC236}">
+                <a16:creationId xmlns:a16="http://schemas.microsoft.com/office/drawing/2014/main" id="{CBE3AC01-C4AB-492E-99C8-93A1BCE688EF}"/>
+              </a:ext>
+            </a:extLst>
+          </p:cNvPr>
+          <p:cNvPicPr>
+            <a:picLocks noChangeAspect="1"/>
+          </p:cNvPicPr>
+          <p:nvPr/>
+        </p:nvPicPr>
+        <p:blipFill>
+          <a:blip r:embed="rId7"/>
+          <a:stretch>
+            <a:fillRect/>
+          </a:stretch>
+        </p:blipFill>
+        <p:spPr>
+          <a:xfrm>
+            <a:off x="0" y="4225669"/>
+            <a:ext cx="5283200" cy="1316393"/>
+          </a:xfrm>
+          <a:prstGeom prst="rect">
+            <a:avLst/>
+          </a:prstGeom>
+        </p:spPr>
+      </p:pic>
+      <p:pic>
+        <p:nvPicPr>
+          <p:cNvPr id="11" name="Picture 10">
+            <a:extLst>
+              <a:ext uri="{FF2B5EF4-FFF2-40B4-BE49-F238E27FC236}">
+                <a16:creationId xmlns:a16="http://schemas.microsoft.com/office/drawing/2014/main" id="{2422F2BA-37CD-473E-BAA0-B96BE915DB8E}"/>
+              </a:ext>
+            </a:extLst>
+          </p:cNvPr>
+          <p:cNvPicPr>
+            <a:picLocks noChangeAspect="1"/>
+          </p:cNvPicPr>
+          <p:nvPr/>
+        </p:nvPicPr>
+        <p:blipFill>
+          <a:blip r:embed="rId8"/>
+          <a:stretch>
+            <a:fillRect/>
+          </a:stretch>
+        </p:blipFill>
+        <p:spPr>
+          <a:xfrm>
+            <a:off x="6095999" y="0"/>
+            <a:ext cx="6095999" cy="886904"/>
+          </a:xfrm>
+          <a:prstGeom prst="rect">
+            <a:avLst/>
+          </a:prstGeom>
+        </p:spPr>
+      </p:pic>
+      <p:pic>
+        <p:nvPicPr>
+          <p:cNvPr id="12" name="Picture 11">
+            <a:extLst>
+              <a:ext uri="{FF2B5EF4-FFF2-40B4-BE49-F238E27FC236}">
+                <a16:creationId xmlns:a16="http://schemas.microsoft.com/office/drawing/2014/main" id="{944C271A-D62C-4887-A9AF-326A6BA36DF6}"/>
+              </a:ext>
+            </a:extLst>
+          </p:cNvPr>
+          <p:cNvPicPr>
+            <a:picLocks noChangeAspect="1"/>
+          </p:cNvPicPr>
+          <p:nvPr/>
+        </p:nvPicPr>
+        <p:blipFill>
+          <a:blip r:embed="rId9"/>
+          <a:stretch>
+            <a:fillRect/>
+          </a:stretch>
+        </p:blipFill>
+        <p:spPr>
+          <a:xfrm>
+            <a:off x="6095997" y="833439"/>
+            <a:ext cx="6095999" cy="925502"/>
+          </a:xfrm>
+          <a:prstGeom prst="rect">
+            <a:avLst/>
+          </a:prstGeom>
+        </p:spPr>
+      </p:pic>
+      <p:pic>
+        <p:nvPicPr>
+          <p:cNvPr id="13" name="Picture 12">
+            <a:extLst>
+              <a:ext uri="{FF2B5EF4-FFF2-40B4-BE49-F238E27FC236}">
+                <a16:creationId xmlns:a16="http://schemas.microsoft.com/office/drawing/2014/main" id="{9412FC29-0263-4FEB-9DF0-635B8E4B8692}"/>
+              </a:ext>
+            </a:extLst>
+          </p:cNvPr>
+          <p:cNvPicPr>
+            <a:picLocks noChangeAspect="1"/>
+          </p:cNvPicPr>
+          <p:nvPr/>
+        </p:nvPicPr>
+        <p:blipFill>
+          <a:blip r:embed="rId10"/>
+          <a:stretch>
+            <a:fillRect/>
+          </a:stretch>
+        </p:blipFill>
+        <p:spPr>
+          <a:xfrm>
+            <a:off x="6095995" y="1726952"/>
+            <a:ext cx="5948394" cy="865428"/>
+          </a:xfrm>
+          <a:prstGeom prst="rect">
+            <a:avLst/>
+          </a:prstGeom>
+        </p:spPr>
+      </p:pic>
+      <p:pic>
+        <p:nvPicPr>
+          <p:cNvPr id="14" name="Picture 13">
+            <a:extLst>
+              <a:ext uri="{FF2B5EF4-FFF2-40B4-BE49-F238E27FC236}">
+                <a16:creationId xmlns:a16="http://schemas.microsoft.com/office/drawing/2014/main" id="{46663BE5-A5F2-4B44-9A36-107F88C2978C}"/>
+              </a:ext>
+            </a:extLst>
+          </p:cNvPr>
+          <p:cNvPicPr>
+            <a:picLocks noChangeAspect="1"/>
+          </p:cNvPicPr>
+          <p:nvPr/>
+        </p:nvPicPr>
+        <p:blipFill>
+          <a:blip r:embed="rId11"/>
+          <a:stretch>
+            <a:fillRect/>
+          </a:stretch>
+        </p:blipFill>
+        <p:spPr>
+          <a:xfrm>
+            <a:off x="6097007" y="2535695"/>
+            <a:ext cx="5947382" cy="865428"/>
+          </a:xfrm>
+          <a:prstGeom prst="rect">
+            <a:avLst/>
+          </a:prstGeom>
+        </p:spPr>
+      </p:pic>
+      <p:pic>
+        <p:nvPicPr>
+          <p:cNvPr id="15" name="Picture 14">
+            <a:extLst>
+              <a:ext uri="{FF2B5EF4-FFF2-40B4-BE49-F238E27FC236}">
+                <a16:creationId xmlns:a16="http://schemas.microsoft.com/office/drawing/2014/main" id="{57E44CBB-0B23-47FA-A80C-FD0FF2332A74}"/>
+              </a:ext>
+            </a:extLst>
+          </p:cNvPr>
+          <p:cNvPicPr>
+            <a:picLocks noChangeAspect="1"/>
+          </p:cNvPicPr>
+          <p:nvPr/>
+        </p:nvPicPr>
+        <p:blipFill>
+          <a:blip r:embed="rId12"/>
+          <a:stretch>
+            <a:fillRect/>
+          </a:stretch>
+        </p:blipFill>
+        <p:spPr>
+          <a:xfrm>
+            <a:off x="6095994" y="3366481"/>
+            <a:ext cx="6056096" cy="886904"/>
+          </a:xfrm>
+          <a:prstGeom prst="rect">
+            <a:avLst/>
+          </a:prstGeom>
+        </p:spPr>
+      </p:pic>
+      <p:pic>
+        <p:nvPicPr>
+          <p:cNvPr id="16" name="Picture 15">
+            <a:extLst>
+              <a:ext uri="{FF2B5EF4-FFF2-40B4-BE49-F238E27FC236}">
+                <a16:creationId xmlns:a16="http://schemas.microsoft.com/office/drawing/2014/main" id="{6274D63D-C7DB-4FFF-83F6-D6E967946B0C}"/>
+              </a:ext>
+            </a:extLst>
+          </p:cNvPr>
+          <p:cNvPicPr>
+            <a:picLocks noChangeAspect="1"/>
+          </p:cNvPicPr>
+          <p:nvPr/>
+        </p:nvPicPr>
+        <p:blipFill>
+          <a:blip r:embed="rId13"/>
+          <a:stretch>
+            <a:fillRect/>
+          </a:stretch>
+        </p:blipFill>
+        <p:spPr>
+          <a:xfrm>
+            <a:off x="6095992" y="4249965"/>
+            <a:ext cx="6075951" cy="886904"/>
+          </a:xfrm>
+          <a:prstGeom prst="rect">
+            <a:avLst/>
+          </a:prstGeom>
+        </p:spPr>
+      </p:pic>
+      <p:pic>
+        <p:nvPicPr>
+          <p:cNvPr id="17" name="Picture 16">
+            <a:extLst>
+              <a:ext uri="{FF2B5EF4-FFF2-40B4-BE49-F238E27FC236}">
+                <a16:creationId xmlns:a16="http://schemas.microsoft.com/office/drawing/2014/main" id="{BB23CCA7-3F1A-4675-8C57-57DE0A4C8D72}"/>
+              </a:ext>
+            </a:extLst>
+          </p:cNvPr>
+          <p:cNvPicPr>
+            <a:picLocks noChangeAspect="1"/>
+          </p:cNvPicPr>
+          <p:nvPr/>
+        </p:nvPicPr>
+        <p:blipFill>
+          <a:blip r:embed="rId14"/>
+          <a:stretch>
+            <a:fillRect/>
+          </a:stretch>
+        </p:blipFill>
+        <p:spPr>
+          <a:xfrm>
+            <a:off x="6095992" y="5136049"/>
+            <a:ext cx="5993735" cy="849662"/>
+          </a:xfrm>
+          <a:prstGeom prst="rect">
+            <a:avLst/>
+          </a:prstGeom>
+        </p:spPr>
+      </p:pic>
+      <p:pic>
+        <p:nvPicPr>
+          <p:cNvPr id="18" name="Picture 17">
+            <a:extLst>
+              <a:ext uri="{FF2B5EF4-FFF2-40B4-BE49-F238E27FC236}">
+                <a16:creationId xmlns:a16="http://schemas.microsoft.com/office/drawing/2014/main" id="{36996910-50B0-4536-A0C8-A9A30A5C83F0}"/>
+              </a:ext>
+            </a:extLst>
+          </p:cNvPr>
+          <p:cNvPicPr>
+            <a:picLocks noChangeAspect="1"/>
+          </p:cNvPicPr>
+          <p:nvPr/>
+        </p:nvPicPr>
+        <p:blipFill>
+          <a:blip r:embed="rId15"/>
+          <a:stretch>
+            <a:fillRect/>
+          </a:stretch>
+        </p:blipFill>
+        <p:spPr>
+          <a:xfrm>
+            <a:off x="6095992" y="5910970"/>
+            <a:ext cx="6039358" cy="883484"/>
+          </a:xfrm>
+          <a:prstGeom prst="rect">
+            <a:avLst/>
+          </a:prstGeom>
+        </p:spPr>
+      </p:pic>
+      <p:pic>
+        <p:nvPicPr>
+          <p:cNvPr id="19" name="Picture 18">
+            <a:extLst>
+              <a:ext uri="{FF2B5EF4-FFF2-40B4-BE49-F238E27FC236}">
+                <a16:creationId xmlns:a16="http://schemas.microsoft.com/office/drawing/2014/main" id="{D2F1BD85-4EB2-487C-93DF-131042C7E093}"/>
+              </a:ext>
+            </a:extLst>
+          </p:cNvPr>
+          <p:cNvPicPr>
+            <a:picLocks noChangeAspect="1"/>
+          </p:cNvPicPr>
+          <p:nvPr/>
+        </p:nvPicPr>
+        <p:blipFill>
+          <a:blip r:embed="rId16"/>
+          <a:stretch>
+            <a:fillRect/>
+          </a:stretch>
+        </p:blipFill>
+        <p:spPr>
+          <a:xfrm>
+            <a:off x="6107207" y="6961191"/>
+            <a:ext cx="6084789" cy="858794"/>
+          </a:xfrm>
+          <a:prstGeom prst="rect">
+            <a:avLst/>
+          </a:prstGeom>
+        </p:spPr>
+      </p:pic>
+      <p:pic>
+        <p:nvPicPr>
+          <p:cNvPr id="20" name="Picture 19">
+            <a:extLst>
+              <a:ext uri="{FF2B5EF4-FFF2-40B4-BE49-F238E27FC236}">
+                <a16:creationId xmlns:a16="http://schemas.microsoft.com/office/drawing/2014/main" id="{6986FFEC-3343-41DC-844E-60163861FC98}"/>
+              </a:ext>
+            </a:extLst>
+          </p:cNvPr>
+          <p:cNvPicPr>
+            <a:picLocks noChangeAspect="1"/>
+          </p:cNvPicPr>
+          <p:nvPr/>
+        </p:nvPicPr>
+        <p:blipFill>
+          <a:blip r:embed="rId17"/>
+          <a:stretch>
+            <a:fillRect/>
+          </a:stretch>
+        </p:blipFill>
+        <p:spPr>
+          <a:xfrm>
+            <a:off x="6095992" y="7819985"/>
+            <a:ext cx="6078134" cy="858794"/>
+          </a:xfrm>
+          <a:prstGeom prst="rect">
+            <a:avLst/>
+          </a:prstGeom>
+        </p:spPr>
+      </p:pic>
+      <p:pic>
+        <p:nvPicPr>
+          <p:cNvPr id="21" name="Picture 20">
+            <a:extLst>
+              <a:ext uri="{FF2B5EF4-FFF2-40B4-BE49-F238E27FC236}">
+                <a16:creationId xmlns:a16="http://schemas.microsoft.com/office/drawing/2014/main" id="{D7919166-4D19-4FCA-B964-44313F736CE9}"/>
+              </a:ext>
+            </a:extLst>
+          </p:cNvPr>
+          <p:cNvPicPr>
+            <a:picLocks noChangeAspect="1"/>
+          </p:cNvPicPr>
+          <p:nvPr/>
+        </p:nvPicPr>
+        <p:blipFill>
+          <a:blip r:embed="rId18"/>
+          <a:stretch>
+            <a:fillRect/>
+          </a:stretch>
+        </p:blipFill>
+        <p:spPr>
+          <a:xfrm>
+            <a:off x="6095992" y="8634069"/>
+            <a:ext cx="5986597" cy="886904"/>
+          </a:xfrm>
+          <a:prstGeom prst="rect">
+            <a:avLst/>
+          </a:prstGeom>
+        </p:spPr>
+      </p:pic>
+      <p:pic>
+        <p:nvPicPr>
+          <p:cNvPr id="22" name="Picture 21">
+            <a:extLst>
+              <a:ext uri="{FF2B5EF4-FFF2-40B4-BE49-F238E27FC236}">
+                <a16:creationId xmlns:a16="http://schemas.microsoft.com/office/drawing/2014/main" id="{E599947A-B421-4913-B0E9-B5C63AB0F47C}"/>
+              </a:ext>
+            </a:extLst>
+          </p:cNvPr>
+          <p:cNvPicPr>
+            <a:picLocks noChangeAspect="1"/>
+          </p:cNvPicPr>
+          <p:nvPr/>
+        </p:nvPicPr>
+        <p:blipFill>
+          <a:blip r:embed="rId19"/>
+          <a:stretch>
+            <a:fillRect/>
+          </a:stretch>
+        </p:blipFill>
+        <p:spPr>
+          <a:xfrm>
+            <a:off x="19108" y="8564706"/>
+            <a:ext cx="5193264" cy="765383"/>
+          </a:xfrm>
+          <a:prstGeom prst="rect">
+            <a:avLst/>
+          </a:prstGeom>
+        </p:spPr>
+      </p:pic>
+      <p:pic>
+        <p:nvPicPr>
+          <p:cNvPr id="23" name="Picture 22">
+            <a:extLst>
+              <a:ext uri="{FF2B5EF4-FFF2-40B4-BE49-F238E27FC236}">
+                <a16:creationId xmlns:a16="http://schemas.microsoft.com/office/drawing/2014/main" id="{5DA03EA8-150C-4524-B854-D11666AFD5B5}"/>
+              </a:ext>
+            </a:extLst>
+          </p:cNvPr>
+          <p:cNvPicPr>
+            <a:picLocks noChangeAspect="1"/>
+          </p:cNvPicPr>
+          <p:nvPr/>
+        </p:nvPicPr>
+        <p:blipFill>
+          <a:blip r:embed="rId20"/>
+          <a:stretch>
+            <a:fillRect/>
+          </a:stretch>
+        </p:blipFill>
+        <p:spPr>
+          <a:xfrm>
+            <a:off x="2" y="5623912"/>
+            <a:ext cx="5341969" cy="1316393"/>
+          </a:xfrm>
+          <a:prstGeom prst="rect">
+            <a:avLst/>
+          </a:prstGeom>
+        </p:spPr>
+      </p:pic>
+      <p:pic>
+        <p:nvPicPr>
+          <p:cNvPr id="24" name="Picture 23">
+            <a:extLst>
+              <a:ext uri="{FF2B5EF4-FFF2-40B4-BE49-F238E27FC236}">
+                <a16:creationId xmlns:a16="http://schemas.microsoft.com/office/drawing/2014/main" id="{AE152FE5-C3ED-4229-8109-6C86D9E51B65}"/>
+              </a:ext>
+            </a:extLst>
+          </p:cNvPr>
+          <p:cNvPicPr>
+            <a:picLocks noChangeAspect="1"/>
+          </p:cNvPicPr>
+          <p:nvPr/>
+        </p:nvPicPr>
+        <p:blipFill>
+          <a:blip r:embed="rId21"/>
+          <a:stretch>
+            <a:fillRect/>
+          </a:stretch>
+        </p:blipFill>
+        <p:spPr>
+          <a:xfrm>
+            <a:off x="19108" y="7024507"/>
+            <a:ext cx="5264092" cy="766726"/>
+          </a:xfrm>
+          <a:prstGeom prst="rect">
+            <a:avLst/>
+          </a:prstGeom>
+        </p:spPr>
+      </p:pic>
+      <p:pic>
+        <p:nvPicPr>
+          <p:cNvPr id="25" name="Picture 24">
+            <a:extLst>
+              <a:ext uri="{FF2B5EF4-FFF2-40B4-BE49-F238E27FC236}">
+                <a16:creationId xmlns:a16="http://schemas.microsoft.com/office/drawing/2014/main" id="{8C1D73B0-74D4-4674-9CAE-95A9823C715D}"/>
+              </a:ext>
+            </a:extLst>
+          </p:cNvPr>
+          <p:cNvPicPr>
+            <a:picLocks noChangeAspect="1"/>
+          </p:cNvPicPr>
+          <p:nvPr/>
+        </p:nvPicPr>
+        <p:blipFill>
+          <a:blip r:embed="rId22"/>
+          <a:stretch>
+            <a:fillRect/>
+          </a:stretch>
+        </p:blipFill>
+        <p:spPr>
+          <a:xfrm>
+            <a:off x="0" y="7864696"/>
+            <a:ext cx="5356470" cy="769373"/>
           </a:xfrm>
           <a:prstGeom prst="rect">
             <a:avLst/>
@@ -3945,7 +4909,7 @@
     </p:spTree>
     <p:extLst>
       <p:ext uri="{BB962C8B-B14F-4D97-AF65-F5344CB8AC3E}">
-        <p14:creationId xmlns:p14="http://schemas.microsoft.com/office/powerpoint/2010/main" val="2895962183"/>
+        <p14:creationId xmlns:p14="http://schemas.microsoft.com/office/powerpoint/2010/main" val="863806302"/>
       </p:ext>
     </p:extLst>
   </p:cSld>
@@ -3974,6 +4938,91 @@
       </p:grpSpPr>
       <p:pic>
         <p:nvPicPr>
+          <p:cNvPr id="4" name="Picture 3">
+            <a:extLst>
+              <a:ext uri="{FF2B5EF4-FFF2-40B4-BE49-F238E27FC236}">
+                <a16:creationId xmlns:a16="http://schemas.microsoft.com/office/drawing/2014/main" id="{4F37C541-3B5D-4ECC-9680-D81D953C9014}"/>
+              </a:ext>
+            </a:extLst>
+          </p:cNvPr>
+          <p:cNvPicPr/>
+          <p:nvPr/>
+        </p:nvPicPr>
+        <p:blipFill>
+          <a:blip r:embed="rId2"/>
+          <a:stretch>
+            <a:fillRect/>
+          </a:stretch>
+        </p:blipFill>
+        <p:spPr>
+          <a:xfrm>
+            <a:off x="992431" y="2971800"/>
+            <a:ext cx="7636756" cy="2829154"/>
+          </a:xfrm>
+          <a:prstGeom prst="rect">
+            <a:avLst/>
+          </a:prstGeom>
+        </p:spPr>
+      </p:pic>
+      <p:pic>
+        <p:nvPicPr>
+          <p:cNvPr id="5" name="Picture 4">
+            <a:extLst>
+              <a:ext uri="{FF2B5EF4-FFF2-40B4-BE49-F238E27FC236}">
+                <a16:creationId xmlns:a16="http://schemas.microsoft.com/office/drawing/2014/main" id="{997900C6-EE62-4B9A-A591-F4F18C189053}"/>
+              </a:ext>
+            </a:extLst>
+          </p:cNvPr>
+          <p:cNvPicPr/>
+          <p:nvPr/>
+        </p:nvPicPr>
+        <p:blipFill rotWithShape="1">
+          <a:blip r:embed="rId3"/>
+          <a:srcRect/>
+          <a:stretch/>
+        </p:blipFill>
+        <p:spPr>
+          <a:xfrm>
+            <a:off x="812802" y="5943600"/>
+            <a:ext cx="7816384" cy="2829154"/>
+          </a:xfrm>
+          <a:prstGeom prst="rect">
+            <a:avLst/>
+          </a:prstGeom>
+        </p:spPr>
+      </p:pic>
+    </p:spTree>
+    <p:extLst>
+      <p:ext uri="{BB962C8B-B14F-4D97-AF65-F5344CB8AC3E}">
+        <p14:creationId xmlns:p14="http://schemas.microsoft.com/office/powerpoint/2010/main" val="2895962183"/>
+      </p:ext>
+    </p:extLst>
+  </p:cSld>
+  <p:clrMapOvr>
+    <a:masterClrMapping/>
+  </p:clrMapOvr>
+</p:sld>
+</file>
+
+<file path=ppt/slides/slide6.xml><?xml version="1.0" encoding="utf-8"?>
+<p:sld xmlns:a="http://schemas.openxmlformats.org/drawingml/2006/main" xmlns:r="http://schemas.openxmlformats.org/officeDocument/2006/relationships" xmlns:p="http://schemas.openxmlformats.org/presentationml/2006/main">
+  <p:cSld>
+    <p:spTree>
+      <p:nvGrpSpPr>
+        <p:cNvPr id="1" name=""/>
+        <p:cNvGrpSpPr/>
+        <p:nvPr/>
+      </p:nvGrpSpPr>
+      <p:grpSpPr>
+        <a:xfrm>
+          <a:off x="0" y="0"/>
+          <a:ext cx="0" cy="0"/>
+          <a:chOff x="0" y="0"/>
+          <a:chExt cx="0" cy="0"/>
+        </a:xfrm>
+      </p:grpSpPr>
+      <p:pic>
+        <p:nvPicPr>
           <p:cNvPr id="2" name="Picture 1">
             <a:extLst>
               <a:ext uri="{FF2B5EF4-FFF2-40B4-BE49-F238E27FC236}">
@@ -4045,7 +5094,7 @@
 </p:sld>
 </file>
 
-<file path=ppt/slides/slide6.xml><?xml version="1.0" encoding="utf-8"?>
+<file path=ppt/slides/slide7.xml><?xml version="1.0" encoding="utf-8"?>
 <p:sld xmlns:a="http://schemas.openxmlformats.org/drawingml/2006/main" xmlns:r="http://schemas.openxmlformats.org/officeDocument/2006/relationships" xmlns:p="http://schemas.openxmlformats.org/presentationml/2006/main">
   <p:cSld>
     <p:spTree>

</xml_diff>

<commit_message>
Halfway through Section 5
</commit_message>
<xml_diff>
--- a/Final Submission/FTR images v1.pptx
+++ b/Final Submission/FTR images v1.pptx
@@ -5,13 +5,15 @@
     <p:sldMasterId id="2147483684" r:id="rId1"/>
   </p:sldMasterIdLst>
   <p:sldIdLst>
-    <p:sldId id="262" r:id="rId2"/>
-    <p:sldId id="261" r:id="rId3"/>
-    <p:sldId id="260" r:id="rId4"/>
-    <p:sldId id="258" r:id="rId5"/>
-    <p:sldId id="256" r:id="rId6"/>
-    <p:sldId id="257" r:id="rId7"/>
-    <p:sldId id="259" r:id="rId8"/>
+    <p:sldId id="263" r:id="rId2"/>
+    <p:sldId id="264" r:id="rId3"/>
+    <p:sldId id="262" r:id="rId4"/>
+    <p:sldId id="261" r:id="rId5"/>
+    <p:sldId id="260" r:id="rId6"/>
+    <p:sldId id="258" r:id="rId7"/>
+    <p:sldId id="256" r:id="rId8"/>
+    <p:sldId id="257" r:id="rId9"/>
+    <p:sldId id="259" r:id="rId10"/>
   </p:sldIdLst>
   <p:sldSz cx="12192000" cy="11887200"/>
   <p:notesSz cx="6858000" cy="9144000"/>
@@ -260,7 +262,7 @@
           <a:p>
             <a:fld id="{8EADFB48-D288-4E49-9720-234B31A154B5}" type="datetimeFigureOut">
               <a:rPr lang="en-US" smtClean="0"/>
-              <a:t>19-May-21</a:t>
+              <a:t>20-May-21</a:t>
             </a:fld>
             <a:endParaRPr lang="en-US"/>
           </a:p>
@@ -430,7 +432,7 @@
           <a:p>
             <a:fld id="{8EADFB48-D288-4E49-9720-234B31A154B5}" type="datetimeFigureOut">
               <a:rPr lang="en-US" smtClean="0"/>
-              <a:t>19-May-21</a:t>
+              <a:t>20-May-21</a:t>
             </a:fld>
             <a:endParaRPr lang="en-US"/>
           </a:p>
@@ -610,7 +612,7 @@
           <a:p>
             <a:fld id="{8EADFB48-D288-4E49-9720-234B31A154B5}" type="datetimeFigureOut">
               <a:rPr lang="en-US" smtClean="0"/>
-              <a:t>19-May-21</a:t>
+              <a:t>20-May-21</a:t>
             </a:fld>
             <a:endParaRPr lang="en-US"/>
           </a:p>
@@ -780,7 +782,7 @@
           <a:p>
             <a:fld id="{8EADFB48-D288-4E49-9720-234B31A154B5}" type="datetimeFigureOut">
               <a:rPr lang="en-US" smtClean="0"/>
-              <a:t>19-May-21</a:t>
+              <a:t>20-May-21</a:t>
             </a:fld>
             <a:endParaRPr lang="en-US"/>
           </a:p>
@@ -1024,7 +1026,7 @@
           <a:p>
             <a:fld id="{8EADFB48-D288-4E49-9720-234B31A154B5}" type="datetimeFigureOut">
               <a:rPr lang="en-US" smtClean="0"/>
-              <a:t>19-May-21</a:t>
+              <a:t>20-May-21</a:t>
             </a:fld>
             <a:endParaRPr lang="en-US"/>
           </a:p>
@@ -1256,7 +1258,7 @@
           <a:p>
             <a:fld id="{8EADFB48-D288-4E49-9720-234B31A154B5}" type="datetimeFigureOut">
               <a:rPr lang="en-US" smtClean="0"/>
-              <a:t>19-May-21</a:t>
+              <a:t>20-May-21</a:t>
             </a:fld>
             <a:endParaRPr lang="en-US"/>
           </a:p>
@@ -1623,7 +1625,7 @@
           <a:p>
             <a:fld id="{8EADFB48-D288-4E49-9720-234B31A154B5}" type="datetimeFigureOut">
               <a:rPr lang="en-US" smtClean="0"/>
-              <a:t>19-May-21</a:t>
+              <a:t>20-May-21</a:t>
             </a:fld>
             <a:endParaRPr lang="en-US"/>
           </a:p>
@@ -1741,7 +1743,7 @@
           <a:p>
             <a:fld id="{8EADFB48-D288-4E49-9720-234B31A154B5}" type="datetimeFigureOut">
               <a:rPr lang="en-US" smtClean="0"/>
-              <a:t>19-May-21</a:t>
+              <a:t>20-May-21</a:t>
             </a:fld>
             <a:endParaRPr lang="en-US"/>
           </a:p>
@@ -1836,7 +1838,7 @@
           <a:p>
             <a:fld id="{8EADFB48-D288-4E49-9720-234B31A154B5}" type="datetimeFigureOut">
               <a:rPr lang="en-US" smtClean="0"/>
-              <a:t>19-May-21</a:t>
+              <a:t>20-May-21</a:t>
             </a:fld>
             <a:endParaRPr lang="en-US"/>
           </a:p>
@@ -2113,7 +2115,7 @@
           <a:p>
             <a:fld id="{8EADFB48-D288-4E49-9720-234B31A154B5}" type="datetimeFigureOut">
               <a:rPr lang="en-US" smtClean="0"/>
-              <a:t>19-May-21</a:t>
+              <a:t>20-May-21</a:t>
             </a:fld>
             <a:endParaRPr lang="en-US"/>
           </a:p>
@@ -2370,7 +2372,7 @@
           <a:p>
             <a:fld id="{8EADFB48-D288-4E49-9720-234B31A154B5}" type="datetimeFigureOut">
               <a:rPr lang="en-US" smtClean="0"/>
-              <a:t>19-May-21</a:t>
+              <a:t>20-May-21</a:t>
             </a:fld>
             <a:endParaRPr lang="en-US"/>
           </a:p>
@@ -2583,7 +2585,7 @@
           <a:p>
             <a:fld id="{8EADFB48-D288-4E49-9720-234B31A154B5}" type="datetimeFigureOut">
               <a:rPr lang="en-US" smtClean="0"/>
-              <a:t>19-May-21</a:t>
+              <a:t>20-May-21</a:t>
             </a:fld>
             <a:endParaRPr lang="en-US"/>
           </a:p>
@@ -2988,132 +2990,12 @@
           <a:chExt cx="0" cy="0"/>
         </a:xfrm>
       </p:grpSpPr>
-      <p:pic>
-        <p:nvPicPr>
-          <p:cNvPr id="5" name="Picture 4">
-            <a:extLst>
-              <a:ext uri="{FF2B5EF4-FFF2-40B4-BE49-F238E27FC236}">
-                <a16:creationId xmlns:a16="http://schemas.microsoft.com/office/drawing/2014/main" id="{CA7DF210-ED84-4569-AB35-D7D13316FA68}"/>
-              </a:ext>
-            </a:extLst>
-          </p:cNvPr>
-          <p:cNvPicPr>
-            <a:picLocks noChangeAspect="1"/>
-          </p:cNvPicPr>
-          <p:nvPr/>
-        </p:nvPicPr>
-        <p:blipFill>
-          <a:blip r:embed="rId2"/>
-          <a:stretch>
-            <a:fillRect/>
-          </a:stretch>
-        </p:blipFill>
-        <p:spPr>
-          <a:xfrm>
-            <a:off x="399255" y="382884"/>
-            <a:ext cx="11393490" cy="2238687"/>
-          </a:xfrm>
-          <a:prstGeom prst="rect">
-            <a:avLst/>
-          </a:prstGeom>
-        </p:spPr>
-      </p:pic>
-      <p:pic>
-        <p:nvPicPr>
-          <p:cNvPr id="6" name="Picture 5">
-            <a:extLst>
-              <a:ext uri="{FF2B5EF4-FFF2-40B4-BE49-F238E27FC236}">
-                <a16:creationId xmlns:a16="http://schemas.microsoft.com/office/drawing/2014/main" id="{580CBA4D-1CEF-47F4-AA99-21BCADEF99C6}"/>
-              </a:ext>
-            </a:extLst>
-          </p:cNvPr>
-          <p:cNvPicPr>
-            <a:picLocks noChangeAspect="1"/>
-          </p:cNvPicPr>
-          <p:nvPr/>
-        </p:nvPicPr>
-        <p:blipFill>
-          <a:blip r:embed="rId3"/>
-          <a:stretch>
-            <a:fillRect/>
-          </a:stretch>
-        </p:blipFill>
-        <p:spPr>
-          <a:xfrm>
-            <a:off x="399255" y="3009971"/>
-            <a:ext cx="11374437" cy="2238687"/>
-          </a:xfrm>
-          <a:prstGeom prst="rect">
-            <a:avLst/>
-          </a:prstGeom>
-        </p:spPr>
-      </p:pic>
-      <p:pic>
-        <p:nvPicPr>
-          <p:cNvPr id="7" name="Picture 6">
-            <a:extLst>
-              <a:ext uri="{FF2B5EF4-FFF2-40B4-BE49-F238E27FC236}">
-                <a16:creationId xmlns:a16="http://schemas.microsoft.com/office/drawing/2014/main" id="{AB7E920E-5017-4E1E-8157-CD732C5D8A13}"/>
-              </a:ext>
-            </a:extLst>
-          </p:cNvPr>
-          <p:cNvPicPr>
-            <a:picLocks noChangeAspect="1"/>
-          </p:cNvPicPr>
-          <p:nvPr/>
-        </p:nvPicPr>
-        <p:blipFill>
-          <a:blip r:embed="rId4"/>
-          <a:stretch>
-            <a:fillRect/>
-          </a:stretch>
-        </p:blipFill>
-        <p:spPr>
-          <a:xfrm>
-            <a:off x="500855" y="5637058"/>
-            <a:ext cx="11393490" cy="2248214"/>
-          </a:xfrm>
-          <a:prstGeom prst="rect">
-            <a:avLst/>
-          </a:prstGeom>
-        </p:spPr>
-      </p:pic>
-      <p:pic>
-        <p:nvPicPr>
-          <p:cNvPr id="8" name="Picture 7">
-            <a:extLst>
-              <a:ext uri="{FF2B5EF4-FFF2-40B4-BE49-F238E27FC236}">
-                <a16:creationId xmlns:a16="http://schemas.microsoft.com/office/drawing/2014/main" id="{D671D7B9-A1F8-438A-87BA-FE273BF7E705}"/>
-              </a:ext>
-            </a:extLst>
-          </p:cNvPr>
-          <p:cNvPicPr>
-            <a:picLocks noChangeAspect="1"/>
-          </p:cNvPicPr>
-          <p:nvPr/>
-        </p:nvPicPr>
-        <p:blipFill>
-          <a:blip r:embed="rId5"/>
-          <a:stretch>
-            <a:fillRect/>
-          </a:stretch>
-        </p:blipFill>
-        <p:spPr>
-          <a:xfrm>
-            <a:off x="399255" y="8218110"/>
-            <a:ext cx="11393490" cy="2267266"/>
-          </a:xfrm>
-          <a:prstGeom prst="rect">
-            <a:avLst/>
-          </a:prstGeom>
-        </p:spPr>
-      </p:pic>
-      <p:sp>
-        <p:nvSpPr>
-          <p:cNvPr id="9" name="TextBox 8">
-            <a:extLst>
-              <a:ext uri="{FF2B5EF4-FFF2-40B4-BE49-F238E27FC236}">
-                <a16:creationId xmlns:a16="http://schemas.microsoft.com/office/drawing/2014/main" id="{2DBD4E90-A689-4B85-9E3A-23F7510802B8}"/>
+      <p:sp>
+        <p:nvSpPr>
+          <p:cNvPr id="5" name="TextBox 4">
+            <a:extLst>
+              <a:ext uri="{FF2B5EF4-FFF2-40B4-BE49-F238E27FC236}">
+                <a16:creationId xmlns:a16="http://schemas.microsoft.com/office/drawing/2014/main" id="{D64B482C-0C7E-4B6A-8C2F-039CB7FEEDA6}"/>
               </a:ext>
             </a:extLst>
           </p:cNvPr>
@@ -3122,8 +3004,8 @@
         </p:nvSpPr>
         <p:spPr>
           <a:xfrm>
-            <a:off x="1422400" y="50046"/>
-            <a:ext cx="885179" cy="369332"/>
+            <a:off x="3697719" y="1794200"/>
+            <a:ext cx="4796570" cy="369332"/>
           </a:xfrm>
           <a:prstGeom prst="rect">
             <a:avLst/>
@@ -3146,660 +3028,45 @@
                   </a:schemeClr>
                 </a:solidFill>
               </a:rPr>
-              <a:t>Gender</a:t>
-            </a:r>
-          </a:p>
-        </p:txBody>
-      </p:sp>
-      <p:sp>
-        <p:nvSpPr>
-          <p:cNvPr id="11" name="TextBox 10">
-            <a:extLst>
-              <a:ext uri="{FF2B5EF4-FFF2-40B4-BE49-F238E27FC236}">
-                <a16:creationId xmlns:a16="http://schemas.microsoft.com/office/drawing/2014/main" id="{5688BB2B-D973-409B-9810-2E54D22E3EEA}"/>
-              </a:ext>
-            </a:extLst>
-          </p:cNvPr>
-          <p:cNvSpPr txBox="1"/>
-          <p:nvPr/>
-        </p:nvSpPr>
-        <p:spPr>
-          <a:xfrm>
-            <a:off x="4362637" y="50046"/>
-            <a:ext cx="883447" cy="369332"/>
-          </a:xfrm>
-          <a:prstGeom prst="rect">
-            <a:avLst/>
-          </a:prstGeom>
-          <a:noFill/>
-        </p:spPr>
-        <p:txBody>
-          <a:bodyPr wrap="none" rtlCol="0">
-            <a:spAutoFit/>
-          </a:bodyPr>
-          <a:lstStyle/>
-          <a:p>
-            <a:pPr algn="ctr"/>
-            <a:r>
-              <a:rPr lang="en-US" dirty="0">
-                <a:solidFill>
-                  <a:schemeClr val="tx1">
-                    <a:lumMod val="50000"/>
-                    <a:lumOff val="50000"/>
-                  </a:schemeClr>
-                </a:solidFill>
-              </a:rPr>
-              <a:t>Partner</a:t>
-            </a:r>
-          </a:p>
-        </p:txBody>
-      </p:sp>
-      <p:sp>
-        <p:nvSpPr>
-          <p:cNvPr id="12" name="TextBox 11">
-            <a:extLst>
-              <a:ext uri="{FF2B5EF4-FFF2-40B4-BE49-F238E27FC236}">
-                <a16:creationId xmlns:a16="http://schemas.microsoft.com/office/drawing/2014/main" id="{29A460E5-E59D-46F1-9D36-6CB9D279F91F}"/>
-              </a:ext>
-            </a:extLst>
-          </p:cNvPr>
-          <p:cNvSpPr txBox="1"/>
-          <p:nvPr/>
-        </p:nvSpPr>
-        <p:spPr>
-          <a:xfrm>
-            <a:off x="6973222" y="50046"/>
-            <a:ext cx="1325491" cy="369332"/>
-          </a:xfrm>
-          <a:prstGeom prst="rect">
-            <a:avLst/>
-          </a:prstGeom>
-          <a:noFill/>
-        </p:spPr>
-        <p:txBody>
-          <a:bodyPr wrap="none" rtlCol="0">
-            <a:spAutoFit/>
-          </a:bodyPr>
-          <a:lstStyle/>
-          <a:p>
-            <a:pPr algn="ctr"/>
-            <a:r>
-              <a:rPr lang="en-US" dirty="0">
-                <a:solidFill>
-                  <a:schemeClr val="tx1">
-                    <a:lumMod val="50000"/>
-                    <a:lumOff val="50000"/>
-                  </a:schemeClr>
-                </a:solidFill>
-              </a:rPr>
-              <a:t>Dependents</a:t>
-            </a:r>
-          </a:p>
-        </p:txBody>
-      </p:sp>
-      <p:sp>
-        <p:nvSpPr>
-          <p:cNvPr id="14" name="TextBox 13">
-            <a:extLst>
-              <a:ext uri="{FF2B5EF4-FFF2-40B4-BE49-F238E27FC236}">
-                <a16:creationId xmlns:a16="http://schemas.microsoft.com/office/drawing/2014/main" id="{5010EB06-1ED9-4E15-ADBB-31045862AF28}"/>
-              </a:ext>
-            </a:extLst>
-          </p:cNvPr>
-          <p:cNvSpPr txBox="1"/>
-          <p:nvPr/>
-        </p:nvSpPr>
-        <p:spPr>
-          <a:xfrm>
-            <a:off x="9755954" y="50046"/>
-            <a:ext cx="1510863" cy="369332"/>
-          </a:xfrm>
-          <a:prstGeom prst="rect">
-            <a:avLst/>
-          </a:prstGeom>
-          <a:noFill/>
-        </p:spPr>
-        <p:txBody>
-          <a:bodyPr wrap="none" rtlCol="0">
-            <a:spAutoFit/>
-          </a:bodyPr>
-          <a:lstStyle/>
-          <a:p>
-            <a:pPr algn="ctr"/>
-            <a:r>
-              <a:rPr lang="en-US" dirty="0">
-                <a:solidFill>
-                  <a:schemeClr val="tx1">
-                    <a:lumMod val="50000"/>
-                    <a:lumOff val="50000"/>
-                  </a:schemeClr>
-                </a:solidFill>
-              </a:rPr>
-              <a:t>Phone Service</a:t>
-            </a:r>
-          </a:p>
-        </p:txBody>
-      </p:sp>
-      <p:sp>
-        <p:nvSpPr>
-          <p:cNvPr id="15" name="TextBox 14">
-            <a:extLst>
-              <a:ext uri="{FF2B5EF4-FFF2-40B4-BE49-F238E27FC236}">
-                <a16:creationId xmlns:a16="http://schemas.microsoft.com/office/drawing/2014/main" id="{F5FD9A1D-83CB-4BB8-AF2C-EA13B3F564D7}"/>
-              </a:ext>
-            </a:extLst>
-          </p:cNvPr>
-          <p:cNvSpPr txBox="1"/>
-          <p:nvPr/>
-        </p:nvSpPr>
-        <p:spPr>
-          <a:xfrm>
-            <a:off x="9744861" y="2699478"/>
-            <a:ext cx="1533048" cy="369332"/>
-          </a:xfrm>
-          <a:prstGeom prst="rect">
-            <a:avLst/>
-          </a:prstGeom>
-          <a:noFill/>
-        </p:spPr>
-        <p:txBody>
-          <a:bodyPr wrap="none" rtlCol="0">
-            <a:spAutoFit/>
-          </a:bodyPr>
-          <a:lstStyle/>
-          <a:p>
-            <a:pPr algn="ctr"/>
-            <a:r>
-              <a:rPr lang="en-US" dirty="0">
-                <a:solidFill>
-                  <a:schemeClr val="tx1">
-                    <a:lumMod val="50000"/>
-                    <a:lumOff val="50000"/>
-                  </a:schemeClr>
-                </a:solidFill>
-              </a:rPr>
-              <a:t>Online Backup</a:t>
-            </a:r>
-          </a:p>
-        </p:txBody>
-      </p:sp>
-      <p:sp>
-        <p:nvSpPr>
-          <p:cNvPr id="16" name="TextBox 15">
-            <a:extLst>
-              <a:ext uri="{FF2B5EF4-FFF2-40B4-BE49-F238E27FC236}">
-                <a16:creationId xmlns:a16="http://schemas.microsoft.com/office/drawing/2014/main" id="{BE5A0120-0A9B-4D3F-A5BC-EDA432805333}"/>
-              </a:ext>
-            </a:extLst>
-          </p:cNvPr>
-          <p:cNvSpPr txBox="1"/>
-          <p:nvPr/>
-        </p:nvSpPr>
-        <p:spPr>
-          <a:xfrm>
-            <a:off x="6831099" y="2699845"/>
-            <a:ext cx="1609736" cy="369332"/>
-          </a:xfrm>
-          <a:prstGeom prst="rect">
-            <a:avLst/>
-          </a:prstGeom>
-          <a:noFill/>
-        </p:spPr>
-        <p:txBody>
-          <a:bodyPr wrap="none" rtlCol="0">
-            <a:spAutoFit/>
-          </a:bodyPr>
-          <a:lstStyle/>
-          <a:p>
-            <a:pPr algn="ctr"/>
-            <a:r>
-              <a:rPr lang="en-US" dirty="0">
-                <a:solidFill>
-                  <a:schemeClr val="tx1">
-                    <a:lumMod val="50000"/>
-                    <a:lumOff val="50000"/>
-                  </a:schemeClr>
-                </a:solidFill>
-              </a:rPr>
-              <a:t>Online Security</a:t>
-            </a:r>
-          </a:p>
-        </p:txBody>
-      </p:sp>
-      <p:sp>
-        <p:nvSpPr>
-          <p:cNvPr id="17" name="TextBox 16">
-            <a:extLst>
-              <a:ext uri="{FF2B5EF4-FFF2-40B4-BE49-F238E27FC236}">
-                <a16:creationId xmlns:a16="http://schemas.microsoft.com/office/drawing/2014/main" id="{7A7982E2-3543-4769-BCAD-3BF6CB6E407A}"/>
-              </a:ext>
-            </a:extLst>
-          </p:cNvPr>
-          <p:cNvSpPr txBox="1"/>
-          <p:nvPr/>
-        </p:nvSpPr>
-        <p:spPr>
-          <a:xfrm>
-            <a:off x="3968489" y="2699478"/>
-            <a:ext cx="1671741" cy="369332"/>
-          </a:xfrm>
-          <a:prstGeom prst="rect">
-            <a:avLst/>
-          </a:prstGeom>
-          <a:noFill/>
-        </p:spPr>
-        <p:txBody>
-          <a:bodyPr wrap="none" rtlCol="0">
-            <a:spAutoFit/>
-          </a:bodyPr>
-          <a:lstStyle/>
-          <a:p>
-            <a:pPr algn="ctr"/>
-            <a:r>
-              <a:rPr lang="en-US" dirty="0">
-                <a:solidFill>
-                  <a:schemeClr val="tx1">
-                    <a:lumMod val="50000"/>
-                    <a:lumOff val="50000"/>
-                  </a:schemeClr>
-                </a:solidFill>
-              </a:rPr>
-              <a:t>Internet Service</a:t>
-            </a:r>
-          </a:p>
-        </p:txBody>
-      </p:sp>
-      <p:sp>
-        <p:nvSpPr>
-          <p:cNvPr id="18" name="TextBox 17">
-            <a:extLst>
-              <a:ext uri="{FF2B5EF4-FFF2-40B4-BE49-F238E27FC236}">
-                <a16:creationId xmlns:a16="http://schemas.microsoft.com/office/drawing/2014/main" id="{15246788-C13E-4329-B69A-9C06712CAD89}"/>
-              </a:ext>
-            </a:extLst>
-          </p:cNvPr>
-          <p:cNvSpPr txBox="1"/>
-          <p:nvPr/>
-        </p:nvSpPr>
-        <p:spPr>
-          <a:xfrm>
-            <a:off x="1111417" y="2703429"/>
-            <a:ext cx="1507144" cy="369332"/>
-          </a:xfrm>
-          <a:prstGeom prst="rect">
-            <a:avLst/>
-          </a:prstGeom>
-          <a:noFill/>
-        </p:spPr>
-        <p:txBody>
-          <a:bodyPr wrap="none" rtlCol="0">
-            <a:spAutoFit/>
-          </a:bodyPr>
-          <a:lstStyle/>
-          <a:p>
-            <a:pPr algn="ctr"/>
-            <a:r>
-              <a:rPr lang="en-US" dirty="0">
-                <a:solidFill>
-                  <a:schemeClr val="tx1">
-                    <a:lumMod val="50000"/>
-                    <a:lumOff val="50000"/>
-                  </a:schemeClr>
-                </a:solidFill>
-              </a:rPr>
-              <a:t>Multiple Lines</a:t>
-            </a:r>
-          </a:p>
-        </p:txBody>
-      </p:sp>
-      <p:sp>
-        <p:nvSpPr>
-          <p:cNvPr id="19" name="TextBox 18">
-            <a:extLst>
-              <a:ext uri="{FF2B5EF4-FFF2-40B4-BE49-F238E27FC236}">
-                <a16:creationId xmlns:a16="http://schemas.microsoft.com/office/drawing/2014/main" id="{359C9FE3-AAB3-4638-910F-1219CD0BA432}"/>
-              </a:ext>
-            </a:extLst>
-          </p:cNvPr>
-          <p:cNvSpPr txBox="1"/>
-          <p:nvPr/>
-        </p:nvSpPr>
-        <p:spPr>
-          <a:xfrm>
-            <a:off x="943583" y="5330516"/>
-            <a:ext cx="1842812" cy="369332"/>
-          </a:xfrm>
-          <a:prstGeom prst="rect">
-            <a:avLst/>
-          </a:prstGeom>
-          <a:noFill/>
-        </p:spPr>
-        <p:txBody>
-          <a:bodyPr wrap="none" rtlCol="0">
-            <a:spAutoFit/>
-          </a:bodyPr>
-          <a:lstStyle/>
-          <a:p>
-            <a:pPr algn="ctr"/>
-            <a:r>
-              <a:rPr lang="en-US" dirty="0">
-                <a:solidFill>
-                  <a:schemeClr val="tx1">
-                    <a:lumMod val="50000"/>
-                    <a:lumOff val="50000"/>
-                  </a:schemeClr>
-                </a:solidFill>
-              </a:rPr>
-              <a:t>Device Protection</a:t>
-            </a:r>
-          </a:p>
-        </p:txBody>
-      </p:sp>
-      <p:sp>
-        <p:nvSpPr>
-          <p:cNvPr id="20" name="TextBox 19">
-            <a:extLst>
-              <a:ext uri="{FF2B5EF4-FFF2-40B4-BE49-F238E27FC236}">
-                <a16:creationId xmlns:a16="http://schemas.microsoft.com/office/drawing/2014/main" id="{ADAD418F-9A6C-48B4-822F-FB469225734B}"/>
-              </a:ext>
-            </a:extLst>
-          </p:cNvPr>
-          <p:cNvSpPr txBox="1"/>
-          <p:nvPr/>
-        </p:nvSpPr>
-        <p:spPr>
-          <a:xfrm>
-            <a:off x="9575488" y="5330516"/>
-            <a:ext cx="1871794" cy="369332"/>
-          </a:xfrm>
-          <a:prstGeom prst="rect">
-            <a:avLst/>
-          </a:prstGeom>
-          <a:noFill/>
-        </p:spPr>
-        <p:txBody>
-          <a:bodyPr wrap="none" rtlCol="0">
-            <a:spAutoFit/>
-          </a:bodyPr>
-          <a:lstStyle/>
-          <a:p>
-            <a:pPr algn="ctr"/>
-            <a:r>
-              <a:rPr lang="en-US" dirty="0">
-                <a:solidFill>
-                  <a:schemeClr val="tx1">
-                    <a:lumMod val="50000"/>
-                    <a:lumOff val="50000"/>
-                  </a:schemeClr>
-                </a:solidFill>
-              </a:rPr>
-              <a:t>Streaming Movies</a:t>
-            </a:r>
-          </a:p>
-        </p:txBody>
-      </p:sp>
-      <p:sp>
-        <p:nvSpPr>
-          <p:cNvPr id="21" name="TextBox 20">
-            <a:extLst>
-              <a:ext uri="{FF2B5EF4-FFF2-40B4-BE49-F238E27FC236}">
-                <a16:creationId xmlns:a16="http://schemas.microsoft.com/office/drawing/2014/main" id="{95ECFB66-D5CD-4BB0-9568-09FEE29BD11D}"/>
-              </a:ext>
-            </a:extLst>
-          </p:cNvPr>
-          <p:cNvSpPr txBox="1"/>
-          <p:nvPr/>
-        </p:nvSpPr>
-        <p:spPr>
-          <a:xfrm>
-            <a:off x="6918366" y="5330516"/>
-            <a:ext cx="1435201" cy="369332"/>
-          </a:xfrm>
-          <a:prstGeom prst="rect">
-            <a:avLst/>
-          </a:prstGeom>
-          <a:noFill/>
-        </p:spPr>
-        <p:txBody>
-          <a:bodyPr wrap="none" rtlCol="0">
-            <a:spAutoFit/>
-          </a:bodyPr>
-          <a:lstStyle/>
-          <a:p>
-            <a:pPr algn="ctr"/>
-            <a:r>
-              <a:rPr lang="en-US" dirty="0">
-                <a:solidFill>
-                  <a:schemeClr val="tx1">
-                    <a:lumMod val="50000"/>
-                    <a:lumOff val="50000"/>
-                  </a:schemeClr>
-                </a:solidFill>
-              </a:rPr>
-              <a:t>Streaming TV</a:t>
-            </a:r>
-          </a:p>
-        </p:txBody>
-      </p:sp>
-      <p:sp>
-        <p:nvSpPr>
-          <p:cNvPr id="22" name="TextBox 21">
-            <a:extLst>
-              <a:ext uri="{FF2B5EF4-FFF2-40B4-BE49-F238E27FC236}">
-                <a16:creationId xmlns:a16="http://schemas.microsoft.com/office/drawing/2014/main" id="{2D76ED64-8856-433E-BE59-1D24EF8EB0EF}"/>
-              </a:ext>
-            </a:extLst>
-          </p:cNvPr>
-          <p:cNvSpPr txBox="1"/>
-          <p:nvPr/>
-        </p:nvSpPr>
-        <p:spPr>
-          <a:xfrm>
-            <a:off x="4097114" y="5330516"/>
-            <a:ext cx="1414490" cy="369332"/>
-          </a:xfrm>
-          <a:prstGeom prst="rect">
-            <a:avLst/>
-          </a:prstGeom>
-          <a:noFill/>
-        </p:spPr>
-        <p:txBody>
-          <a:bodyPr wrap="none" rtlCol="0">
-            <a:spAutoFit/>
-          </a:bodyPr>
-          <a:lstStyle/>
-          <a:p>
-            <a:pPr algn="ctr"/>
-            <a:r>
-              <a:rPr lang="en-US" dirty="0">
-                <a:solidFill>
-                  <a:schemeClr val="tx1">
-                    <a:lumMod val="50000"/>
-                    <a:lumOff val="50000"/>
-                  </a:schemeClr>
-                </a:solidFill>
-              </a:rPr>
-              <a:t>Tech Support</a:t>
-            </a:r>
-          </a:p>
-        </p:txBody>
-      </p:sp>
-      <p:sp>
-        <p:nvSpPr>
-          <p:cNvPr id="23" name="TextBox 22">
-            <a:extLst>
-              <a:ext uri="{FF2B5EF4-FFF2-40B4-BE49-F238E27FC236}">
-                <a16:creationId xmlns:a16="http://schemas.microsoft.com/office/drawing/2014/main" id="{2B7DE980-58F0-4F7A-8581-F01ACED23DBA}"/>
-              </a:ext>
-            </a:extLst>
-          </p:cNvPr>
-          <p:cNvSpPr txBox="1"/>
-          <p:nvPr/>
-        </p:nvSpPr>
-        <p:spPr>
-          <a:xfrm>
-            <a:off x="1371328" y="7875925"/>
-            <a:ext cx="987322" cy="369332"/>
-          </a:xfrm>
-          <a:prstGeom prst="rect">
-            <a:avLst/>
-          </a:prstGeom>
-          <a:noFill/>
-        </p:spPr>
-        <p:txBody>
-          <a:bodyPr wrap="none" rtlCol="0">
-            <a:spAutoFit/>
-          </a:bodyPr>
-          <a:lstStyle/>
-          <a:p>
-            <a:pPr algn="ctr"/>
-            <a:r>
-              <a:rPr lang="en-US" dirty="0">
-                <a:solidFill>
-                  <a:schemeClr val="tx1">
-                    <a:lumMod val="50000"/>
-                    <a:lumOff val="50000"/>
-                  </a:schemeClr>
-                </a:solidFill>
-              </a:rPr>
-              <a:t>Contract</a:t>
-            </a:r>
-          </a:p>
-        </p:txBody>
-      </p:sp>
-      <p:sp>
-        <p:nvSpPr>
-          <p:cNvPr id="24" name="TextBox 23">
-            <a:extLst>
-              <a:ext uri="{FF2B5EF4-FFF2-40B4-BE49-F238E27FC236}">
-                <a16:creationId xmlns:a16="http://schemas.microsoft.com/office/drawing/2014/main" id="{72E3288A-3A09-4D17-AC59-C9AD1DF75B10}"/>
-              </a:ext>
-            </a:extLst>
-          </p:cNvPr>
-          <p:cNvSpPr txBox="1"/>
-          <p:nvPr/>
-        </p:nvSpPr>
-        <p:spPr>
-          <a:xfrm>
-            <a:off x="3957076" y="7875925"/>
-            <a:ext cx="1694566" cy="369332"/>
-          </a:xfrm>
-          <a:prstGeom prst="rect">
-            <a:avLst/>
-          </a:prstGeom>
-          <a:noFill/>
-        </p:spPr>
-        <p:txBody>
-          <a:bodyPr wrap="none" rtlCol="0">
-            <a:spAutoFit/>
-          </a:bodyPr>
-          <a:lstStyle/>
-          <a:p>
-            <a:pPr algn="ctr"/>
-            <a:r>
-              <a:rPr lang="en-US" dirty="0">
-                <a:solidFill>
-                  <a:schemeClr val="tx1">
-                    <a:lumMod val="50000"/>
-                    <a:lumOff val="50000"/>
-                  </a:schemeClr>
-                </a:solidFill>
-              </a:rPr>
-              <a:t>Paperless Billing</a:t>
-            </a:r>
-          </a:p>
-        </p:txBody>
-      </p:sp>
-      <p:sp>
-        <p:nvSpPr>
-          <p:cNvPr id="25" name="TextBox 24">
-            <a:extLst>
-              <a:ext uri="{FF2B5EF4-FFF2-40B4-BE49-F238E27FC236}">
-                <a16:creationId xmlns:a16="http://schemas.microsoft.com/office/drawing/2014/main" id="{0D83CF02-B2D9-432D-A963-7024B27FBBF9}"/>
-              </a:ext>
-            </a:extLst>
-          </p:cNvPr>
-          <p:cNvSpPr txBox="1"/>
-          <p:nvPr/>
-        </p:nvSpPr>
-        <p:spPr>
-          <a:xfrm>
-            <a:off x="6729980" y="7875925"/>
-            <a:ext cx="1811971" cy="369332"/>
-          </a:xfrm>
-          <a:prstGeom prst="rect">
-            <a:avLst/>
-          </a:prstGeom>
-          <a:noFill/>
-        </p:spPr>
-        <p:txBody>
-          <a:bodyPr wrap="none" rtlCol="0">
-            <a:spAutoFit/>
-          </a:bodyPr>
-          <a:lstStyle/>
-          <a:p>
-            <a:pPr algn="ctr"/>
-            <a:r>
-              <a:rPr lang="en-US" dirty="0">
-                <a:solidFill>
-                  <a:schemeClr val="tx1">
-                    <a:lumMod val="50000"/>
-                    <a:lumOff val="50000"/>
-                  </a:schemeClr>
-                </a:solidFill>
-              </a:rPr>
-              <a:t>Payment Method</a:t>
-            </a:r>
-          </a:p>
-        </p:txBody>
-      </p:sp>
-      <p:sp>
-        <p:nvSpPr>
-          <p:cNvPr id="26" name="TextBox 25">
-            <a:extLst>
-              <a:ext uri="{FF2B5EF4-FFF2-40B4-BE49-F238E27FC236}">
-                <a16:creationId xmlns:a16="http://schemas.microsoft.com/office/drawing/2014/main" id="{17FF2D6A-C871-4E39-B07B-D60FCF5FB2F0}"/>
-              </a:ext>
-            </a:extLst>
-          </p:cNvPr>
-          <p:cNvSpPr txBox="1"/>
-          <p:nvPr/>
-        </p:nvSpPr>
-        <p:spPr>
-          <a:xfrm>
-            <a:off x="10134519" y="7875925"/>
-            <a:ext cx="753732" cy="369332"/>
-          </a:xfrm>
-          <a:prstGeom prst="rect">
-            <a:avLst/>
-          </a:prstGeom>
-          <a:noFill/>
-        </p:spPr>
-        <p:txBody>
-          <a:bodyPr wrap="none" rtlCol="0">
-            <a:spAutoFit/>
-          </a:bodyPr>
-          <a:lstStyle/>
-          <a:p>
-            <a:pPr algn="ctr"/>
-            <a:r>
-              <a:rPr lang="en-US" dirty="0">
-                <a:solidFill>
-                  <a:schemeClr val="tx1">
-                    <a:lumMod val="50000"/>
-                    <a:lumOff val="50000"/>
-                  </a:schemeClr>
-                </a:solidFill>
-              </a:rPr>
-              <a:t>Churn</a:t>
-            </a:r>
-          </a:p>
-        </p:txBody>
-      </p:sp>
+              <a:t>Feature Importance - Gradient Boosting Classifier</a:t>
+            </a:r>
+          </a:p>
+        </p:txBody>
+      </p:sp>
+      <p:pic>
+        <p:nvPicPr>
+          <p:cNvPr id="8" name="Picture 7">
+            <a:extLst>
+              <a:ext uri="{FF2B5EF4-FFF2-40B4-BE49-F238E27FC236}">
+                <a16:creationId xmlns:a16="http://schemas.microsoft.com/office/drawing/2014/main" id="{65569704-FB36-45EA-A7FF-2047CE201F3C}"/>
+              </a:ext>
+            </a:extLst>
+          </p:cNvPr>
+          <p:cNvPicPr>
+            <a:picLocks noChangeAspect="1"/>
+          </p:cNvPicPr>
+          <p:nvPr/>
+        </p:nvPicPr>
+        <p:blipFill>
+          <a:blip r:embed="rId2"/>
+          <a:stretch>
+            <a:fillRect/>
+          </a:stretch>
+        </p:blipFill>
+        <p:spPr>
+          <a:xfrm>
+            <a:off x="75360" y="2163532"/>
+            <a:ext cx="12041280" cy="6058746"/>
+          </a:xfrm>
+          <a:prstGeom prst="rect">
+            <a:avLst/>
+          </a:prstGeom>
+        </p:spPr>
+      </p:pic>
     </p:spTree>
     <p:extLst>
       <p:ext uri="{BB962C8B-B14F-4D97-AF65-F5344CB8AC3E}">
-        <p14:creationId xmlns:p14="http://schemas.microsoft.com/office/powerpoint/2010/main" val="905874030"/>
+        <p14:creationId xmlns:p14="http://schemas.microsoft.com/office/powerpoint/2010/main" val="1772311334"/>
       </p:ext>
     </p:extLst>
   </p:cSld>
@@ -3826,12 +3093,55 @@
           <a:chExt cx="0" cy="0"/>
         </a:xfrm>
       </p:grpSpPr>
+      <p:sp>
+        <p:nvSpPr>
+          <p:cNvPr id="5" name="TextBox 4">
+            <a:extLst>
+              <a:ext uri="{FF2B5EF4-FFF2-40B4-BE49-F238E27FC236}">
+                <a16:creationId xmlns:a16="http://schemas.microsoft.com/office/drawing/2014/main" id="{D64B482C-0C7E-4B6A-8C2F-039CB7FEEDA6}"/>
+              </a:ext>
+            </a:extLst>
+          </p:cNvPr>
+          <p:cNvSpPr txBox="1"/>
+          <p:nvPr/>
+        </p:nvSpPr>
+        <p:spPr>
+          <a:xfrm>
+            <a:off x="4476331" y="1794200"/>
+            <a:ext cx="3239349" cy="369332"/>
+          </a:xfrm>
+          <a:prstGeom prst="rect">
+            <a:avLst/>
+          </a:prstGeom>
+          <a:noFill/>
+        </p:spPr>
+        <p:txBody>
+          <a:bodyPr wrap="none" rtlCol="0">
+            <a:spAutoFit/>
+          </a:bodyPr>
+          <a:lstStyle/>
+          <a:p>
+            <a:pPr algn="ctr"/>
+            <a:r>
+              <a:rPr lang="en-US" dirty="0">
+                <a:solidFill>
+                  <a:schemeClr val="tx1">
+                    <a:lumMod val="50000"/>
+                    <a:lumOff val="50000"/>
+                  </a:schemeClr>
+                </a:solidFill>
+              </a:rPr>
+              <a:t>Feature Importance – Light GBM</a:t>
+            </a:r>
+          </a:p>
+        </p:txBody>
+      </p:sp>
       <p:pic>
         <p:nvPicPr>
           <p:cNvPr id="2" name="Picture 1">
             <a:extLst>
               <a:ext uri="{FF2B5EF4-FFF2-40B4-BE49-F238E27FC236}">
-                <a16:creationId xmlns:a16="http://schemas.microsoft.com/office/drawing/2014/main" id="{579D8CAB-BC2B-413F-870D-FB7F02970406}"/>
+                <a16:creationId xmlns:a16="http://schemas.microsoft.com/office/drawing/2014/main" id="{57ABF847-594E-4DCD-97F5-2DBA607B2A78}"/>
               </a:ext>
             </a:extLst>
           </p:cNvPr>
@@ -3848,183 +3158,18 @@
         </p:blipFill>
         <p:spPr>
           <a:xfrm>
-            <a:off x="1743488" y="506355"/>
-            <a:ext cx="8705021" cy="2652269"/>
+            <a:off x="0" y="2291942"/>
+            <a:ext cx="12192000" cy="6151281"/>
           </a:xfrm>
           <a:prstGeom prst="rect">
             <a:avLst/>
           </a:prstGeom>
         </p:spPr>
       </p:pic>
-      <p:pic>
-        <p:nvPicPr>
-          <p:cNvPr id="8" name="Picture 7">
-            <a:extLst>
-              <a:ext uri="{FF2B5EF4-FFF2-40B4-BE49-F238E27FC236}">
-                <a16:creationId xmlns:a16="http://schemas.microsoft.com/office/drawing/2014/main" id="{4FFD5FA7-21DE-4FA9-894E-2F02E5BB6F61}"/>
-              </a:ext>
-            </a:extLst>
-          </p:cNvPr>
-          <p:cNvPicPr>
-            <a:picLocks noChangeAspect="1"/>
-          </p:cNvPicPr>
-          <p:nvPr/>
-        </p:nvPicPr>
-        <p:blipFill>
-          <a:blip r:embed="rId3"/>
-          <a:stretch>
-            <a:fillRect/>
-          </a:stretch>
-        </p:blipFill>
-        <p:spPr>
-          <a:xfrm>
-            <a:off x="1743488" y="3555436"/>
-            <a:ext cx="8705021" cy="2648320"/>
-          </a:xfrm>
-          <a:prstGeom prst="rect">
-            <a:avLst/>
-          </a:prstGeom>
-        </p:spPr>
-      </p:pic>
-      <p:pic>
-        <p:nvPicPr>
-          <p:cNvPr id="9" name="Picture 8">
-            <a:extLst>
-              <a:ext uri="{FF2B5EF4-FFF2-40B4-BE49-F238E27FC236}">
-                <a16:creationId xmlns:a16="http://schemas.microsoft.com/office/drawing/2014/main" id="{A02E4B8D-193D-4578-B974-113EBA7EB8D7}"/>
-              </a:ext>
-            </a:extLst>
-          </p:cNvPr>
-          <p:cNvPicPr>
-            <a:picLocks noChangeAspect="1"/>
-          </p:cNvPicPr>
-          <p:nvPr/>
-        </p:nvPicPr>
-        <p:blipFill>
-          <a:blip r:embed="rId4"/>
-          <a:stretch>
-            <a:fillRect/>
-          </a:stretch>
-        </p:blipFill>
-        <p:spPr>
-          <a:xfrm>
-            <a:off x="1743490" y="6573088"/>
-            <a:ext cx="8705020" cy="2648320"/>
-          </a:xfrm>
-          <a:prstGeom prst="rect">
-            <a:avLst/>
-          </a:prstGeom>
-        </p:spPr>
-      </p:pic>
-      <p:sp>
-        <p:nvSpPr>
-          <p:cNvPr id="5" name="TextBox 4">
-            <a:extLst>
-              <a:ext uri="{FF2B5EF4-FFF2-40B4-BE49-F238E27FC236}">
-                <a16:creationId xmlns:a16="http://schemas.microsoft.com/office/drawing/2014/main" id="{CF7B87C7-497B-4704-A20F-B5E283BC22FF}"/>
-              </a:ext>
-            </a:extLst>
-          </p:cNvPr>
-          <p:cNvSpPr txBox="1"/>
-          <p:nvPr/>
-        </p:nvSpPr>
-        <p:spPr>
-          <a:xfrm>
-            <a:off x="5160103" y="3192728"/>
-            <a:ext cx="1871794" cy="369332"/>
-          </a:xfrm>
-          <a:prstGeom prst="rect">
-            <a:avLst/>
-          </a:prstGeom>
-          <a:noFill/>
-        </p:spPr>
-        <p:txBody>
-          <a:bodyPr wrap="none" rtlCol="0">
-            <a:spAutoFit/>
-          </a:bodyPr>
-          <a:lstStyle/>
-          <a:p>
-            <a:r>
-              <a:rPr lang="en-US" dirty="0"/>
-              <a:t>Streaming Movies</a:t>
-            </a:r>
-          </a:p>
-        </p:txBody>
-      </p:sp>
-      <p:sp>
-        <p:nvSpPr>
-          <p:cNvPr id="6" name="TextBox 5">
-            <a:extLst>
-              <a:ext uri="{FF2B5EF4-FFF2-40B4-BE49-F238E27FC236}">
-                <a16:creationId xmlns:a16="http://schemas.microsoft.com/office/drawing/2014/main" id="{37E0A454-E6A4-4608-9DFA-E29C5542B7F2}"/>
-              </a:ext>
-            </a:extLst>
-          </p:cNvPr>
-          <p:cNvSpPr txBox="1"/>
-          <p:nvPr/>
-        </p:nvSpPr>
-        <p:spPr>
-          <a:xfrm>
-            <a:off x="5260130" y="135482"/>
-            <a:ext cx="1671740" cy="369332"/>
-          </a:xfrm>
-          <a:prstGeom prst="rect">
-            <a:avLst/>
-          </a:prstGeom>
-          <a:noFill/>
-        </p:spPr>
-        <p:txBody>
-          <a:bodyPr wrap="none" rtlCol="0">
-            <a:spAutoFit/>
-          </a:bodyPr>
-          <a:lstStyle/>
-          <a:p>
-            <a:r>
-              <a:rPr lang="en-US" dirty="0"/>
-              <a:t>Internet Service</a:t>
-            </a:r>
-          </a:p>
-        </p:txBody>
-      </p:sp>
-      <p:sp>
-        <p:nvSpPr>
-          <p:cNvPr id="7" name="TextBox 6">
-            <a:extLst>
-              <a:ext uri="{FF2B5EF4-FFF2-40B4-BE49-F238E27FC236}">
-                <a16:creationId xmlns:a16="http://schemas.microsoft.com/office/drawing/2014/main" id="{1549E8BE-E23B-4C31-AEE0-ABF854074955}"/>
-              </a:ext>
-            </a:extLst>
-          </p:cNvPr>
-          <p:cNvSpPr txBox="1"/>
-          <p:nvPr/>
-        </p:nvSpPr>
-        <p:spPr>
-          <a:xfrm>
-            <a:off x="5602339" y="6203756"/>
-            <a:ext cx="987322" cy="369332"/>
-          </a:xfrm>
-          <a:prstGeom prst="rect">
-            <a:avLst/>
-          </a:prstGeom>
-          <a:noFill/>
-        </p:spPr>
-        <p:txBody>
-          <a:bodyPr wrap="none" rtlCol="0">
-            <a:spAutoFit/>
-          </a:bodyPr>
-          <a:lstStyle/>
-          <a:p>
-            <a:r>
-              <a:rPr lang="en-US" dirty="0"/>
-              <a:t>Contract</a:t>
-            </a:r>
-          </a:p>
-        </p:txBody>
-      </p:sp>
     </p:spTree>
     <p:extLst>
       <p:ext uri="{BB962C8B-B14F-4D97-AF65-F5344CB8AC3E}">
-        <p14:creationId xmlns:p14="http://schemas.microsoft.com/office/powerpoint/2010/main" val="1417333963"/>
+        <p14:creationId xmlns:p14="http://schemas.microsoft.com/office/powerpoint/2010/main" val="1302594125"/>
       </p:ext>
     </p:extLst>
   </p:cSld>
@@ -4053,10 +3198,10 @@
       </p:grpSpPr>
       <p:pic>
         <p:nvPicPr>
-          <p:cNvPr id="18" name="Picture 17">
-            <a:extLst>
-              <a:ext uri="{FF2B5EF4-FFF2-40B4-BE49-F238E27FC236}">
-                <a16:creationId xmlns:a16="http://schemas.microsoft.com/office/drawing/2014/main" id="{877FC9A4-FF47-497B-8085-00A164127C23}"/>
+          <p:cNvPr id="5" name="Picture 4">
+            <a:extLst>
+              <a:ext uri="{FF2B5EF4-FFF2-40B4-BE49-F238E27FC236}">
+                <a16:creationId xmlns:a16="http://schemas.microsoft.com/office/drawing/2014/main" id="{CA7DF210-ED84-4569-AB35-D7D13316FA68}"/>
               </a:ext>
             </a:extLst>
           </p:cNvPr>
@@ -4073,8 +3218,8 @@
         </p:blipFill>
         <p:spPr>
           <a:xfrm>
-            <a:off x="196852" y="704851"/>
-            <a:ext cx="5575300" cy="2551305"/>
+            <a:off x="399255" y="382884"/>
+            <a:ext cx="11393490" cy="2238687"/>
           </a:xfrm>
           <a:prstGeom prst="rect">
             <a:avLst/>
@@ -4083,10 +3228,10 @@
       </p:pic>
       <p:pic>
         <p:nvPicPr>
-          <p:cNvPr id="19" name="Picture 18">
-            <a:extLst>
-              <a:ext uri="{FF2B5EF4-FFF2-40B4-BE49-F238E27FC236}">
-                <a16:creationId xmlns:a16="http://schemas.microsoft.com/office/drawing/2014/main" id="{AFD2394A-D791-485C-AFBC-594C16C6FF0F}"/>
+          <p:cNvPr id="6" name="Picture 5">
+            <a:extLst>
+              <a:ext uri="{FF2B5EF4-FFF2-40B4-BE49-F238E27FC236}">
+                <a16:creationId xmlns:a16="http://schemas.microsoft.com/office/drawing/2014/main" id="{580CBA4D-1CEF-47F4-AA99-21BCADEF99C6}"/>
               </a:ext>
             </a:extLst>
           </p:cNvPr>
@@ -4103,8 +3248,8 @@
         </p:blipFill>
         <p:spPr>
           <a:xfrm>
-            <a:off x="6263174" y="704851"/>
-            <a:ext cx="5799703" cy="2641386"/>
+            <a:off x="399255" y="3009971"/>
+            <a:ext cx="11374437" cy="2238687"/>
           </a:xfrm>
           <a:prstGeom prst="rect">
             <a:avLst/>
@@ -4113,10 +3258,10 @@
       </p:pic>
       <p:pic>
         <p:nvPicPr>
-          <p:cNvPr id="20" name="Picture 19">
-            <a:extLst>
-              <a:ext uri="{FF2B5EF4-FFF2-40B4-BE49-F238E27FC236}">
-                <a16:creationId xmlns:a16="http://schemas.microsoft.com/office/drawing/2014/main" id="{D2CE30D4-2AA5-41DB-B172-DA1CF09CDFF4}"/>
+          <p:cNvPr id="7" name="Picture 6">
+            <a:extLst>
+              <a:ext uri="{FF2B5EF4-FFF2-40B4-BE49-F238E27FC236}">
+                <a16:creationId xmlns:a16="http://schemas.microsoft.com/office/drawing/2014/main" id="{AB7E920E-5017-4E1E-8157-CD732C5D8A13}"/>
               </a:ext>
             </a:extLst>
           </p:cNvPr>
@@ -4133,20 +3278,50 @@
         </p:blipFill>
         <p:spPr>
           <a:xfrm>
-            <a:off x="3028974" y="3703021"/>
-            <a:ext cx="6134052" cy="2806996"/>
+            <a:off x="500855" y="5637058"/>
+            <a:ext cx="11393490" cy="2248214"/>
           </a:xfrm>
           <a:prstGeom prst="rect">
             <a:avLst/>
           </a:prstGeom>
         </p:spPr>
       </p:pic>
-      <p:sp>
-        <p:nvSpPr>
-          <p:cNvPr id="2" name="TextBox 1">
-            <a:extLst>
-              <a:ext uri="{FF2B5EF4-FFF2-40B4-BE49-F238E27FC236}">
-                <a16:creationId xmlns:a16="http://schemas.microsoft.com/office/drawing/2014/main" id="{8C240D69-EFC6-4DEF-BA88-EE5E11E99E00}"/>
+      <p:pic>
+        <p:nvPicPr>
+          <p:cNvPr id="8" name="Picture 7">
+            <a:extLst>
+              <a:ext uri="{FF2B5EF4-FFF2-40B4-BE49-F238E27FC236}">
+                <a16:creationId xmlns:a16="http://schemas.microsoft.com/office/drawing/2014/main" id="{D671D7B9-A1F8-438A-87BA-FE273BF7E705}"/>
+              </a:ext>
+            </a:extLst>
+          </p:cNvPr>
+          <p:cNvPicPr>
+            <a:picLocks noChangeAspect="1"/>
+          </p:cNvPicPr>
+          <p:nvPr/>
+        </p:nvPicPr>
+        <p:blipFill>
+          <a:blip r:embed="rId5"/>
+          <a:stretch>
+            <a:fillRect/>
+          </a:stretch>
+        </p:blipFill>
+        <p:spPr>
+          <a:xfrm>
+            <a:off x="399255" y="8218110"/>
+            <a:ext cx="11393490" cy="2267266"/>
+          </a:xfrm>
+          <a:prstGeom prst="rect">
+            <a:avLst/>
+          </a:prstGeom>
+        </p:spPr>
+      </p:pic>
+      <p:sp>
+        <p:nvSpPr>
+          <p:cNvPr id="9" name="TextBox 8">
+            <a:extLst>
+              <a:ext uri="{FF2B5EF4-FFF2-40B4-BE49-F238E27FC236}">
+                <a16:creationId xmlns:a16="http://schemas.microsoft.com/office/drawing/2014/main" id="{2DBD4E90-A689-4B85-9E3A-23F7510802B8}"/>
               </a:ext>
             </a:extLst>
           </p:cNvPr>
@@ -4155,7 +3330,7 @@
         </p:nvSpPr>
         <p:spPr>
           <a:xfrm>
-            <a:off x="2443485" y="335519"/>
+            <a:off x="1422400" y="50046"/>
             <a:ext cx="885179" cy="369332"/>
           </a:xfrm>
           <a:prstGeom prst="rect">
@@ -4169,8 +3344,16 @@
           </a:bodyPr>
           <a:lstStyle/>
           <a:p>
-            <a:r>
-              <a:rPr lang="en-US" dirty="0"/>
+            <a:pPr algn="ctr"/>
+            <a:r>
+              <a:rPr lang="en-US" dirty="0">
+                <a:solidFill>
+                  <a:schemeClr val="tx1">
+                    <a:lumMod val="50000"/>
+                    <a:lumOff val="50000"/>
+                  </a:schemeClr>
+                </a:solidFill>
+              </a:rPr>
               <a:t>Gender</a:t>
             </a:r>
           </a:p>
@@ -4178,10 +3361,10 @@
       </p:sp>
       <p:sp>
         <p:nvSpPr>
-          <p:cNvPr id="6" name="TextBox 5">
-            <a:extLst>
-              <a:ext uri="{FF2B5EF4-FFF2-40B4-BE49-F238E27FC236}">
-                <a16:creationId xmlns:a16="http://schemas.microsoft.com/office/drawing/2014/main" id="{BE66E1ED-D342-42A7-985F-359BB754397E}"/>
+          <p:cNvPr id="11" name="TextBox 10">
+            <a:extLst>
+              <a:ext uri="{FF2B5EF4-FFF2-40B4-BE49-F238E27FC236}">
+                <a16:creationId xmlns:a16="http://schemas.microsoft.com/office/drawing/2014/main" id="{5688BB2B-D973-409B-9810-2E54D22E3EEA}"/>
               </a:ext>
             </a:extLst>
           </p:cNvPr>
@@ -4190,7 +3373,7 @@
         </p:nvSpPr>
         <p:spPr>
           <a:xfrm>
-            <a:off x="8721301" y="335519"/>
+            <a:off x="4362637" y="50046"/>
             <a:ext cx="883447" cy="369332"/>
           </a:xfrm>
           <a:prstGeom prst="rect">
@@ -4204,8 +3387,16 @@
           </a:bodyPr>
           <a:lstStyle/>
           <a:p>
-            <a:r>
-              <a:rPr lang="en-US" dirty="0"/>
+            <a:pPr algn="ctr"/>
+            <a:r>
+              <a:rPr lang="en-US" dirty="0">
+                <a:solidFill>
+                  <a:schemeClr val="tx1">
+                    <a:lumMod val="50000"/>
+                    <a:lumOff val="50000"/>
+                  </a:schemeClr>
+                </a:solidFill>
+              </a:rPr>
               <a:t>Partner</a:t>
             </a:r>
           </a:p>
@@ -4213,10 +3404,10 @@
       </p:sp>
       <p:sp>
         <p:nvSpPr>
-          <p:cNvPr id="7" name="TextBox 6">
-            <a:extLst>
-              <a:ext uri="{FF2B5EF4-FFF2-40B4-BE49-F238E27FC236}">
-                <a16:creationId xmlns:a16="http://schemas.microsoft.com/office/drawing/2014/main" id="{A91DF898-CD9A-4B22-B1AF-2CD2F282F467}"/>
+          <p:cNvPr id="12" name="TextBox 11">
+            <a:extLst>
+              <a:ext uri="{FF2B5EF4-FFF2-40B4-BE49-F238E27FC236}">
+                <a16:creationId xmlns:a16="http://schemas.microsoft.com/office/drawing/2014/main" id="{29A460E5-E59D-46F1-9D36-6CB9D279F91F}"/>
               </a:ext>
             </a:extLst>
           </p:cNvPr>
@@ -4225,7 +3416,7 @@
         </p:nvSpPr>
         <p:spPr>
           <a:xfrm>
-            <a:off x="5433255" y="3346237"/>
+            <a:off x="6973222" y="50046"/>
             <a:ext cx="1325491" cy="369332"/>
           </a:xfrm>
           <a:prstGeom prst="rect">
@@ -4239,9 +3430,576 @@
           </a:bodyPr>
           <a:lstStyle/>
           <a:p>
-            <a:r>
-              <a:rPr lang="en-US" dirty="0"/>
+            <a:pPr algn="ctr"/>
+            <a:r>
+              <a:rPr lang="en-US" dirty="0">
+                <a:solidFill>
+                  <a:schemeClr val="tx1">
+                    <a:lumMod val="50000"/>
+                    <a:lumOff val="50000"/>
+                  </a:schemeClr>
+                </a:solidFill>
+              </a:rPr>
               <a:t>Dependents</a:t>
+            </a:r>
+          </a:p>
+        </p:txBody>
+      </p:sp>
+      <p:sp>
+        <p:nvSpPr>
+          <p:cNvPr id="14" name="TextBox 13">
+            <a:extLst>
+              <a:ext uri="{FF2B5EF4-FFF2-40B4-BE49-F238E27FC236}">
+                <a16:creationId xmlns:a16="http://schemas.microsoft.com/office/drawing/2014/main" id="{5010EB06-1ED9-4E15-ADBB-31045862AF28}"/>
+              </a:ext>
+            </a:extLst>
+          </p:cNvPr>
+          <p:cNvSpPr txBox="1"/>
+          <p:nvPr/>
+        </p:nvSpPr>
+        <p:spPr>
+          <a:xfrm>
+            <a:off x="9755954" y="50046"/>
+            <a:ext cx="1510863" cy="369332"/>
+          </a:xfrm>
+          <a:prstGeom prst="rect">
+            <a:avLst/>
+          </a:prstGeom>
+          <a:noFill/>
+        </p:spPr>
+        <p:txBody>
+          <a:bodyPr wrap="none" rtlCol="0">
+            <a:spAutoFit/>
+          </a:bodyPr>
+          <a:lstStyle/>
+          <a:p>
+            <a:pPr algn="ctr"/>
+            <a:r>
+              <a:rPr lang="en-US" dirty="0">
+                <a:solidFill>
+                  <a:schemeClr val="tx1">
+                    <a:lumMod val="50000"/>
+                    <a:lumOff val="50000"/>
+                  </a:schemeClr>
+                </a:solidFill>
+              </a:rPr>
+              <a:t>Phone Service</a:t>
+            </a:r>
+          </a:p>
+        </p:txBody>
+      </p:sp>
+      <p:sp>
+        <p:nvSpPr>
+          <p:cNvPr id="15" name="TextBox 14">
+            <a:extLst>
+              <a:ext uri="{FF2B5EF4-FFF2-40B4-BE49-F238E27FC236}">
+                <a16:creationId xmlns:a16="http://schemas.microsoft.com/office/drawing/2014/main" id="{F5FD9A1D-83CB-4BB8-AF2C-EA13B3F564D7}"/>
+              </a:ext>
+            </a:extLst>
+          </p:cNvPr>
+          <p:cNvSpPr txBox="1"/>
+          <p:nvPr/>
+        </p:nvSpPr>
+        <p:spPr>
+          <a:xfrm>
+            <a:off x="9744861" y="2699478"/>
+            <a:ext cx="1533048" cy="369332"/>
+          </a:xfrm>
+          <a:prstGeom prst="rect">
+            <a:avLst/>
+          </a:prstGeom>
+          <a:noFill/>
+        </p:spPr>
+        <p:txBody>
+          <a:bodyPr wrap="none" rtlCol="0">
+            <a:spAutoFit/>
+          </a:bodyPr>
+          <a:lstStyle/>
+          <a:p>
+            <a:pPr algn="ctr"/>
+            <a:r>
+              <a:rPr lang="en-US" dirty="0">
+                <a:solidFill>
+                  <a:schemeClr val="tx1">
+                    <a:lumMod val="50000"/>
+                    <a:lumOff val="50000"/>
+                  </a:schemeClr>
+                </a:solidFill>
+              </a:rPr>
+              <a:t>Online Backup</a:t>
+            </a:r>
+          </a:p>
+        </p:txBody>
+      </p:sp>
+      <p:sp>
+        <p:nvSpPr>
+          <p:cNvPr id="16" name="TextBox 15">
+            <a:extLst>
+              <a:ext uri="{FF2B5EF4-FFF2-40B4-BE49-F238E27FC236}">
+                <a16:creationId xmlns:a16="http://schemas.microsoft.com/office/drawing/2014/main" id="{BE5A0120-0A9B-4D3F-A5BC-EDA432805333}"/>
+              </a:ext>
+            </a:extLst>
+          </p:cNvPr>
+          <p:cNvSpPr txBox="1"/>
+          <p:nvPr/>
+        </p:nvSpPr>
+        <p:spPr>
+          <a:xfrm>
+            <a:off x="6831099" y="2699845"/>
+            <a:ext cx="1609736" cy="369332"/>
+          </a:xfrm>
+          <a:prstGeom prst="rect">
+            <a:avLst/>
+          </a:prstGeom>
+          <a:noFill/>
+        </p:spPr>
+        <p:txBody>
+          <a:bodyPr wrap="none" rtlCol="0">
+            <a:spAutoFit/>
+          </a:bodyPr>
+          <a:lstStyle/>
+          <a:p>
+            <a:pPr algn="ctr"/>
+            <a:r>
+              <a:rPr lang="en-US" dirty="0">
+                <a:solidFill>
+                  <a:schemeClr val="tx1">
+                    <a:lumMod val="50000"/>
+                    <a:lumOff val="50000"/>
+                  </a:schemeClr>
+                </a:solidFill>
+              </a:rPr>
+              <a:t>Online Security</a:t>
+            </a:r>
+          </a:p>
+        </p:txBody>
+      </p:sp>
+      <p:sp>
+        <p:nvSpPr>
+          <p:cNvPr id="17" name="TextBox 16">
+            <a:extLst>
+              <a:ext uri="{FF2B5EF4-FFF2-40B4-BE49-F238E27FC236}">
+                <a16:creationId xmlns:a16="http://schemas.microsoft.com/office/drawing/2014/main" id="{7A7982E2-3543-4769-BCAD-3BF6CB6E407A}"/>
+              </a:ext>
+            </a:extLst>
+          </p:cNvPr>
+          <p:cNvSpPr txBox="1"/>
+          <p:nvPr/>
+        </p:nvSpPr>
+        <p:spPr>
+          <a:xfrm>
+            <a:off x="3968489" y="2699478"/>
+            <a:ext cx="1671741" cy="369332"/>
+          </a:xfrm>
+          <a:prstGeom prst="rect">
+            <a:avLst/>
+          </a:prstGeom>
+          <a:noFill/>
+        </p:spPr>
+        <p:txBody>
+          <a:bodyPr wrap="none" rtlCol="0">
+            <a:spAutoFit/>
+          </a:bodyPr>
+          <a:lstStyle/>
+          <a:p>
+            <a:pPr algn="ctr"/>
+            <a:r>
+              <a:rPr lang="en-US" dirty="0">
+                <a:solidFill>
+                  <a:schemeClr val="tx1">
+                    <a:lumMod val="50000"/>
+                    <a:lumOff val="50000"/>
+                  </a:schemeClr>
+                </a:solidFill>
+              </a:rPr>
+              <a:t>Internet Service</a:t>
+            </a:r>
+          </a:p>
+        </p:txBody>
+      </p:sp>
+      <p:sp>
+        <p:nvSpPr>
+          <p:cNvPr id="18" name="TextBox 17">
+            <a:extLst>
+              <a:ext uri="{FF2B5EF4-FFF2-40B4-BE49-F238E27FC236}">
+                <a16:creationId xmlns:a16="http://schemas.microsoft.com/office/drawing/2014/main" id="{15246788-C13E-4329-B69A-9C06712CAD89}"/>
+              </a:ext>
+            </a:extLst>
+          </p:cNvPr>
+          <p:cNvSpPr txBox="1"/>
+          <p:nvPr/>
+        </p:nvSpPr>
+        <p:spPr>
+          <a:xfrm>
+            <a:off x="1111417" y="2703429"/>
+            <a:ext cx="1507144" cy="369332"/>
+          </a:xfrm>
+          <a:prstGeom prst="rect">
+            <a:avLst/>
+          </a:prstGeom>
+          <a:noFill/>
+        </p:spPr>
+        <p:txBody>
+          <a:bodyPr wrap="none" rtlCol="0">
+            <a:spAutoFit/>
+          </a:bodyPr>
+          <a:lstStyle/>
+          <a:p>
+            <a:pPr algn="ctr"/>
+            <a:r>
+              <a:rPr lang="en-US" dirty="0">
+                <a:solidFill>
+                  <a:schemeClr val="tx1">
+                    <a:lumMod val="50000"/>
+                    <a:lumOff val="50000"/>
+                  </a:schemeClr>
+                </a:solidFill>
+              </a:rPr>
+              <a:t>Multiple Lines</a:t>
+            </a:r>
+          </a:p>
+        </p:txBody>
+      </p:sp>
+      <p:sp>
+        <p:nvSpPr>
+          <p:cNvPr id="19" name="TextBox 18">
+            <a:extLst>
+              <a:ext uri="{FF2B5EF4-FFF2-40B4-BE49-F238E27FC236}">
+                <a16:creationId xmlns:a16="http://schemas.microsoft.com/office/drawing/2014/main" id="{359C9FE3-AAB3-4638-910F-1219CD0BA432}"/>
+              </a:ext>
+            </a:extLst>
+          </p:cNvPr>
+          <p:cNvSpPr txBox="1"/>
+          <p:nvPr/>
+        </p:nvSpPr>
+        <p:spPr>
+          <a:xfrm>
+            <a:off x="943583" y="5330516"/>
+            <a:ext cx="1842812" cy="369332"/>
+          </a:xfrm>
+          <a:prstGeom prst="rect">
+            <a:avLst/>
+          </a:prstGeom>
+          <a:noFill/>
+        </p:spPr>
+        <p:txBody>
+          <a:bodyPr wrap="none" rtlCol="0">
+            <a:spAutoFit/>
+          </a:bodyPr>
+          <a:lstStyle/>
+          <a:p>
+            <a:pPr algn="ctr"/>
+            <a:r>
+              <a:rPr lang="en-US" dirty="0">
+                <a:solidFill>
+                  <a:schemeClr val="tx1">
+                    <a:lumMod val="50000"/>
+                    <a:lumOff val="50000"/>
+                  </a:schemeClr>
+                </a:solidFill>
+              </a:rPr>
+              <a:t>Device Protection</a:t>
+            </a:r>
+          </a:p>
+        </p:txBody>
+      </p:sp>
+      <p:sp>
+        <p:nvSpPr>
+          <p:cNvPr id="20" name="TextBox 19">
+            <a:extLst>
+              <a:ext uri="{FF2B5EF4-FFF2-40B4-BE49-F238E27FC236}">
+                <a16:creationId xmlns:a16="http://schemas.microsoft.com/office/drawing/2014/main" id="{ADAD418F-9A6C-48B4-822F-FB469225734B}"/>
+              </a:ext>
+            </a:extLst>
+          </p:cNvPr>
+          <p:cNvSpPr txBox="1"/>
+          <p:nvPr/>
+        </p:nvSpPr>
+        <p:spPr>
+          <a:xfrm>
+            <a:off x="9575488" y="5330516"/>
+            <a:ext cx="1871794" cy="369332"/>
+          </a:xfrm>
+          <a:prstGeom prst="rect">
+            <a:avLst/>
+          </a:prstGeom>
+          <a:noFill/>
+        </p:spPr>
+        <p:txBody>
+          <a:bodyPr wrap="none" rtlCol="0">
+            <a:spAutoFit/>
+          </a:bodyPr>
+          <a:lstStyle/>
+          <a:p>
+            <a:pPr algn="ctr"/>
+            <a:r>
+              <a:rPr lang="en-US" dirty="0">
+                <a:solidFill>
+                  <a:schemeClr val="tx1">
+                    <a:lumMod val="50000"/>
+                    <a:lumOff val="50000"/>
+                  </a:schemeClr>
+                </a:solidFill>
+              </a:rPr>
+              <a:t>Streaming Movies</a:t>
+            </a:r>
+          </a:p>
+        </p:txBody>
+      </p:sp>
+      <p:sp>
+        <p:nvSpPr>
+          <p:cNvPr id="21" name="TextBox 20">
+            <a:extLst>
+              <a:ext uri="{FF2B5EF4-FFF2-40B4-BE49-F238E27FC236}">
+                <a16:creationId xmlns:a16="http://schemas.microsoft.com/office/drawing/2014/main" id="{95ECFB66-D5CD-4BB0-9568-09FEE29BD11D}"/>
+              </a:ext>
+            </a:extLst>
+          </p:cNvPr>
+          <p:cNvSpPr txBox="1"/>
+          <p:nvPr/>
+        </p:nvSpPr>
+        <p:spPr>
+          <a:xfrm>
+            <a:off x="6918366" y="5330516"/>
+            <a:ext cx="1435201" cy="369332"/>
+          </a:xfrm>
+          <a:prstGeom prst="rect">
+            <a:avLst/>
+          </a:prstGeom>
+          <a:noFill/>
+        </p:spPr>
+        <p:txBody>
+          <a:bodyPr wrap="none" rtlCol="0">
+            <a:spAutoFit/>
+          </a:bodyPr>
+          <a:lstStyle/>
+          <a:p>
+            <a:pPr algn="ctr"/>
+            <a:r>
+              <a:rPr lang="en-US" dirty="0">
+                <a:solidFill>
+                  <a:schemeClr val="tx1">
+                    <a:lumMod val="50000"/>
+                    <a:lumOff val="50000"/>
+                  </a:schemeClr>
+                </a:solidFill>
+              </a:rPr>
+              <a:t>Streaming TV</a:t>
+            </a:r>
+          </a:p>
+        </p:txBody>
+      </p:sp>
+      <p:sp>
+        <p:nvSpPr>
+          <p:cNvPr id="22" name="TextBox 21">
+            <a:extLst>
+              <a:ext uri="{FF2B5EF4-FFF2-40B4-BE49-F238E27FC236}">
+                <a16:creationId xmlns:a16="http://schemas.microsoft.com/office/drawing/2014/main" id="{2D76ED64-8856-433E-BE59-1D24EF8EB0EF}"/>
+              </a:ext>
+            </a:extLst>
+          </p:cNvPr>
+          <p:cNvSpPr txBox="1"/>
+          <p:nvPr/>
+        </p:nvSpPr>
+        <p:spPr>
+          <a:xfrm>
+            <a:off x="4097114" y="5330516"/>
+            <a:ext cx="1414490" cy="369332"/>
+          </a:xfrm>
+          <a:prstGeom prst="rect">
+            <a:avLst/>
+          </a:prstGeom>
+          <a:noFill/>
+        </p:spPr>
+        <p:txBody>
+          <a:bodyPr wrap="none" rtlCol="0">
+            <a:spAutoFit/>
+          </a:bodyPr>
+          <a:lstStyle/>
+          <a:p>
+            <a:pPr algn="ctr"/>
+            <a:r>
+              <a:rPr lang="en-US" dirty="0">
+                <a:solidFill>
+                  <a:schemeClr val="tx1">
+                    <a:lumMod val="50000"/>
+                    <a:lumOff val="50000"/>
+                  </a:schemeClr>
+                </a:solidFill>
+              </a:rPr>
+              <a:t>Tech Support</a:t>
+            </a:r>
+          </a:p>
+        </p:txBody>
+      </p:sp>
+      <p:sp>
+        <p:nvSpPr>
+          <p:cNvPr id="23" name="TextBox 22">
+            <a:extLst>
+              <a:ext uri="{FF2B5EF4-FFF2-40B4-BE49-F238E27FC236}">
+                <a16:creationId xmlns:a16="http://schemas.microsoft.com/office/drawing/2014/main" id="{2B7DE980-58F0-4F7A-8581-F01ACED23DBA}"/>
+              </a:ext>
+            </a:extLst>
+          </p:cNvPr>
+          <p:cNvSpPr txBox="1"/>
+          <p:nvPr/>
+        </p:nvSpPr>
+        <p:spPr>
+          <a:xfrm>
+            <a:off x="1371328" y="7875925"/>
+            <a:ext cx="987322" cy="369332"/>
+          </a:xfrm>
+          <a:prstGeom prst="rect">
+            <a:avLst/>
+          </a:prstGeom>
+          <a:noFill/>
+        </p:spPr>
+        <p:txBody>
+          <a:bodyPr wrap="none" rtlCol="0">
+            <a:spAutoFit/>
+          </a:bodyPr>
+          <a:lstStyle/>
+          <a:p>
+            <a:pPr algn="ctr"/>
+            <a:r>
+              <a:rPr lang="en-US" dirty="0">
+                <a:solidFill>
+                  <a:schemeClr val="tx1">
+                    <a:lumMod val="50000"/>
+                    <a:lumOff val="50000"/>
+                  </a:schemeClr>
+                </a:solidFill>
+              </a:rPr>
+              <a:t>Contract</a:t>
+            </a:r>
+          </a:p>
+        </p:txBody>
+      </p:sp>
+      <p:sp>
+        <p:nvSpPr>
+          <p:cNvPr id="24" name="TextBox 23">
+            <a:extLst>
+              <a:ext uri="{FF2B5EF4-FFF2-40B4-BE49-F238E27FC236}">
+                <a16:creationId xmlns:a16="http://schemas.microsoft.com/office/drawing/2014/main" id="{72E3288A-3A09-4D17-AC59-C9AD1DF75B10}"/>
+              </a:ext>
+            </a:extLst>
+          </p:cNvPr>
+          <p:cNvSpPr txBox="1"/>
+          <p:nvPr/>
+        </p:nvSpPr>
+        <p:spPr>
+          <a:xfrm>
+            <a:off x="3957076" y="7875925"/>
+            <a:ext cx="1694566" cy="369332"/>
+          </a:xfrm>
+          <a:prstGeom prst="rect">
+            <a:avLst/>
+          </a:prstGeom>
+          <a:noFill/>
+        </p:spPr>
+        <p:txBody>
+          <a:bodyPr wrap="none" rtlCol="0">
+            <a:spAutoFit/>
+          </a:bodyPr>
+          <a:lstStyle/>
+          <a:p>
+            <a:pPr algn="ctr"/>
+            <a:r>
+              <a:rPr lang="en-US" dirty="0">
+                <a:solidFill>
+                  <a:schemeClr val="tx1">
+                    <a:lumMod val="50000"/>
+                    <a:lumOff val="50000"/>
+                  </a:schemeClr>
+                </a:solidFill>
+              </a:rPr>
+              <a:t>Paperless Billing</a:t>
+            </a:r>
+          </a:p>
+        </p:txBody>
+      </p:sp>
+      <p:sp>
+        <p:nvSpPr>
+          <p:cNvPr id="25" name="TextBox 24">
+            <a:extLst>
+              <a:ext uri="{FF2B5EF4-FFF2-40B4-BE49-F238E27FC236}">
+                <a16:creationId xmlns:a16="http://schemas.microsoft.com/office/drawing/2014/main" id="{0D83CF02-B2D9-432D-A963-7024B27FBBF9}"/>
+              </a:ext>
+            </a:extLst>
+          </p:cNvPr>
+          <p:cNvSpPr txBox="1"/>
+          <p:nvPr/>
+        </p:nvSpPr>
+        <p:spPr>
+          <a:xfrm>
+            <a:off x="6729980" y="7875925"/>
+            <a:ext cx="1811971" cy="369332"/>
+          </a:xfrm>
+          <a:prstGeom prst="rect">
+            <a:avLst/>
+          </a:prstGeom>
+          <a:noFill/>
+        </p:spPr>
+        <p:txBody>
+          <a:bodyPr wrap="none" rtlCol="0">
+            <a:spAutoFit/>
+          </a:bodyPr>
+          <a:lstStyle/>
+          <a:p>
+            <a:pPr algn="ctr"/>
+            <a:r>
+              <a:rPr lang="en-US" dirty="0">
+                <a:solidFill>
+                  <a:schemeClr val="tx1">
+                    <a:lumMod val="50000"/>
+                    <a:lumOff val="50000"/>
+                  </a:schemeClr>
+                </a:solidFill>
+              </a:rPr>
+              <a:t>Payment Method</a:t>
+            </a:r>
+          </a:p>
+        </p:txBody>
+      </p:sp>
+      <p:sp>
+        <p:nvSpPr>
+          <p:cNvPr id="26" name="TextBox 25">
+            <a:extLst>
+              <a:ext uri="{FF2B5EF4-FFF2-40B4-BE49-F238E27FC236}">
+                <a16:creationId xmlns:a16="http://schemas.microsoft.com/office/drawing/2014/main" id="{17FF2D6A-C871-4E39-B07B-D60FCF5FB2F0}"/>
+              </a:ext>
+            </a:extLst>
+          </p:cNvPr>
+          <p:cNvSpPr txBox="1"/>
+          <p:nvPr/>
+        </p:nvSpPr>
+        <p:spPr>
+          <a:xfrm>
+            <a:off x="10134519" y="7875925"/>
+            <a:ext cx="753732" cy="369332"/>
+          </a:xfrm>
+          <a:prstGeom prst="rect">
+            <a:avLst/>
+          </a:prstGeom>
+          <a:noFill/>
+        </p:spPr>
+        <p:txBody>
+          <a:bodyPr wrap="none" rtlCol="0">
+            <a:spAutoFit/>
+          </a:bodyPr>
+          <a:lstStyle/>
+          <a:p>
+            <a:pPr algn="ctr"/>
+            <a:r>
+              <a:rPr lang="en-US" dirty="0">
+                <a:solidFill>
+                  <a:schemeClr val="tx1">
+                    <a:lumMod val="50000"/>
+                    <a:lumOff val="50000"/>
+                  </a:schemeClr>
+                </a:solidFill>
+              </a:rPr>
+              <a:t>Churn</a:t>
             </a:r>
           </a:p>
         </p:txBody>
@@ -4249,7 +4007,7 @@
     </p:spTree>
     <p:extLst>
       <p:ext uri="{BB962C8B-B14F-4D97-AF65-F5344CB8AC3E}">
-        <p14:creationId xmlns:p14="http://schemas.microsoft.com/office/powerpoint/2010/main" val="2582423852"/>
+        <p14:creationId xmlns:p14="http://schemas.microsoft.com/office/powerpoint/2010/main" val="905874030"/>
       </p:ext>
     </p:extLst>
   </p:cSld>
@@ -4278,10 +4036,10 @@
       </p:grpSpPr>
       <p:pic>
         <p:nvPicPr>
-          <p:cNvPr id="5" name="Picture 4">
-            <a:extLst>
-              <a:ext uri="{FF2B5EF4-FFF2-40B4-BE49-F238E27FC236}">
-                <a16:creationId xmlns:a16="http://schemas.microsoft.com/office/drawing/2014/main" id="{0D3CBD2D-27C5-4787-B728-0466912C55C5}"/>
+          <p:cNvPr id="2" name="Picture 1">
+            <a:extLst>
+              <a:ext uri="{FF2B5EF4-FFF2-40B4-BE49-F238E27FC236}">
+                <a16:creationId xmlns:a16="http://schemas.microsoft.com/office/drawing/2014/main" id="{579D8CAB-BC2B-413F-870D-FB7F02970406}"/>
               </a:ext>
             </a:extLst>
           </p:cNvPr>
@@ -4298,8 +4056,8 @@
         </p:blipFill>
         <p:spPr>
           <a:xfrm>
-            <a:off x="1" y="2"/>
-            <a:ext cx="5283200" cy="756393"/>
+            <a:off x="1743488" y="506355"/>
+            <a:ext cx="8705021" cy="2652269"/>
           </a:xfrm>
           <a:prstGeom prst="rect">
             <a:avLst/>
@@ -4308,10 +4066,10 @@
       </p:pic>
       <p:pic>
         <p:nvPicPr>
-          <p:cNvPr id="6" name="Picture 5">
-            <a:extLst>
-              <a:ext uri="{FF2B5EF4-FFF2-40B4-BE49-F238E27FC236}">
-                <a16:creationId xmlns:a16="http://schemas.microsoft.com/office/drawing/2014/main" id="{FB9A7486-7CFD-426C-A8AF-2F85C02BD5A1}"/>
+          <p:cNvPr id="8" name="Picture 7">
+            <a:extLst>
+              <a:ext uri="{FF2B5EF4-FFF2-40B4-BE49-F238E27FC236}">
+                <a16:creationId xmlns:a16="http://schemas.microsoft.com/office/drawing/2014/main" id="{4FFD5FA7-21DE-4FA9-894E-2F02E5BB6F61}"/>
               </a:ext>
             </a:extLst>
           </p:cNvPr>
@@ -4328,8 +4086,8 @@
         </p:blipFill>
         <p:spPr>
           <a:xfrm>
-            <a:off x="0" y="833439"/>
-            <a:ext cx="5283200" cy="789311"/>
+            <a:off x="1743488" y="3555436"/>
+            <a:ext cx="8705021" cy="2648320"/>
           </a:xfrm>
           <a:prstGeom prst="rect">
             <a:avLst/>
@@ -4338,10 +4096,10 @@
       </p:pic>
       <p:pic>
         <p:nvPicPr>
-          <p:cNvPr id="7" name="Picture 6">
-            <a:extLst>
-              <a:ext uri="{FF2B5EF4-FFF2-40B4-BE49-F238E27FC236}">
-                <a16:creationId xmlns:a16="http://schemas.microsoft.com/office/drawing/2014/main" id="{16060771-0BA5-4591-A790-708B2A67B71D}"/>
+          <p:cNvPr id="9" name="Picture 8">
+            <a:extLst>
+              <a:ext uri="{FF2B5EF4-FFF2-40B4-BE49-F238E27FC236}">
+                <a16:creationId xmlns:a16="http://schemas.microsoft.com/office/drawing/2014/main" id="{A02E4B8D-193D-4578-B974-113EBA7EB8D7}"/>
               </a:ext>
             </a:extLst>
           </p:cNvPr>
@@ -4358,558 +4116,144 @@
         </p:blipFill>
         <p:spPr>
           <a:xfrm>
-            <a:off x="1" y="1699800"/>
-            <a:ext cx="5283200" cy="758849"/>
+            <a:off x="1743490" y="6573088"/>
+            <a:ext cx="8705020" cy="2648320"/>
           </a:xfrm>
           <a:prstGeom prst="rect">
             <a:avLst/>
           </a:prstGeom>
         </p:spPr>
       </p:pic>
-      <p:pic>
-        <p:nvPicPr>
-          <p:cNvPr id="8" name="Picture 7">
-            <a:extLst>
-              <a:ext uri="{FF2B5EF4-FFF2-40B4-BE49-F238E27FC236}">
-                <a16:creationId xmlns:a16="http://schemas.microsoft.com/office/drawing/2014/main" id="{D9B44983-88D0-4699-92C4-6F0A012A50A4}"/>
-              </a:ext>
-            </a:extLst>
-          </p:cNvPr>
-          <p:cNvPicPr>
-            <a:picLocks noChangeAspect="1"/>
-          </p:cNvPicPr>
-          <p:nvPr/>
-        </p:nvPicPr>
-        <p:blipFill>
-          <a:blip r:embed="rId5"/>
-          <a:stretch>
-            <a:fillRect/>
-          </a:stretch>
-        </p:blipFill>
-        <p:spPr>
-          <a:xfrm>
-            <a:off x="1" y="2535695"/>
-            <a:ext cx="5283200" cy="762167"/>
-          </a:xfrm>
-          <a:prstGeom prst="rect">
-            <a:avLst/>
-          </a:prstGeom>
-        </p:spPr>
-      </p:pic>
-      <p:pic>
-        <p:nvPicPr>
-          <p:cNvPr id="9" name="Picture 8">
-            <a:extLst>
-              <a:ext uri="{FF2B5EF4-FFF2-40B4-BE49-F238E27FC236}">
-                <a16:creationId xmlns:a16="http://schemas.microsoft.com/office/drawing/2014/main" id="{608C2047-6E80-4C4E-AEBB-18C795FC9DE8}"/>
-              </a:ext>
-            </a:extLst>
-          </p:cNvPr>
-          <p:cNvPicPr>
-            <a:picLocks noChangeAspect="1"/>
-          </p:cNvPicPr>
-          <p:nvPr/>
-        </p:nvPicPr>
-        <p:blipFill>
-          <a:blip r:embed="rId6"/>
-          <a:stretch>
-            <a:fillRect/>
-          </a:stretch>
-        </p:blipFill>
-        <p:spPr>
-          <a:xfrm>
-            <a:off x="1" y="3374906"/>
-            <a:ext cx="5283200" cy="773714"/>
-          </a:xfrm>
-          <a:prstGeom prst="rect">
-            <a:avLst/>
-          </a:prstGeom>
-        </p:spPr>
-      </p:pic>
-      <p:pic>
-        <p:nvPicPr>
-          <p:cNvPr id="10" name="Picture 9">
-            <a:extLst>
-              <a:ext uri="{FF2B5EF4-FFF2-40B4-BE49-F238E27FC236}">
-                <a16:creationId xmlns:a16="http://schemas.microsoft.com/office/drawing/2014/main" id="{CBE3AC01-C4AB-492E-99C8-93A1BCE688EF}"/>
-              </a:ext>
-            </a:extLst>
-          </p:cNvPr>
-          <p:cNvPicPr>
-            <a:picLocks noChangeAspect="1"/>
-          </p:cNvPicPr>
-          <p:nvPr/>
-        </p:nvPicPr>
-        <p:blipFill>
-          <a:blip r:embed="rId7"/>
-          <a:stretch>
-            <a:fillRect/>
-          </a:stretch>
-        </p:blipFill>
-        <p:spPr>
-          <a:xfrm>
-            <a:off x="0" y="4225669"/>
-            <a:ext cx="5283200" cy="1316393"/>
-          </a:xfrm>
-          <a:prstGeom prst="rect">
-            <a:avLst/>
-          </a:prstGeom>
-        </p:spPr>
-      </p:pic>
-      <p:pic>
-        <p:nvPicPr>
-          <p:cNvPr id="11" name="Picture 10">
-            <a:extLst>
-              <a:ext uri="{FF2B5EF4-FFF2-40B4-BE49-F238E27FC236}">
-                <a16:creationId xmlns:a16="http://schemas.microsoft.com/office/drawing/2014/main" id="{2422F2BA-37CD-473E-BAA0-B96BE915DB8E}"/>
-              </a:ext>
-            </a:extLst>
-          </p:cNvPr>
-          <p:cNvPicPr>
-            <a:picLocks noChangeAspect="1"/>
-          </p:cNvPicPr>
-          <p:nvPr/>
-        </p:nvPicPr>
-        <p:blipFill>
-          <a:blip r:embed="rId8"/>
-          <a:stretch>
-            <a:fillRect/>
-          </a:stretch>
-        </p:blipFill>
-        <p:spPr>
-          <a:xfrm>
-            <a:off x="6095999" y="0"/>
-            <a:ext cx="6095999" cy="886904"/>
-          </a:xfrm>
-          <a:prstGeom prst="rect">
-            <a:avLst/>
-          </a:prstGeom>
-        </p:spPr>
-      </p:pic>
-      <p:pic>
-        <p:nvPicPr>
-          <p:cNvPr id="12" name="Picture 11">
-            <a:extLst>
-              <a:ext uri="{FF2B5EF4-FFF2-40B4-BE49-F238E27FC236}">
-                <a16:creationId xmlns:a16="http://schemas.microsoft.com/office/drawing/2014/main" id="{944C271A-D62C-4887-A9AF-326A6BA36DF6}"/>
-              </a:ext>
-            </a:extLst>
-          </p:cNvPr>
-          <p:cNvPicPr>
-            <a:picLocks noChangeAspect="1"/>
-          </p:cNvPicPr>
-          <p:nvPr/>
-        </p:nvPicPr>
-        <p:blipFill>
-          <a:blip r:embed="rId9"/>
-          <a:stretch>
-            <a:fillRect/>
-          </a:stretch>
-        </p:blipFill>
-        <p:spPr>
-          <a:xfrm>
-            <a:off x="6095997" y="833439"/>
-            <a:ext cx="6095999" cy="925502"/>
-          </a:xfrm>
-          <a:prstGeom prst="rect">
-            <a:avLst/>
-          </a:prstGeom>
-        </p:spPr>
-      </p:pic>
-      <p:pic>
-        <p:nvPicPr>
-          <p:cNvPr id="13" name="Picture 12">
-            <a:extLst>
-              <a:ext uri="{FF2B5EF4-FFF2-40B4-BE49-F238E27FC236}">
-                <a16:creationId xmlns:a16="http://schemas.microsoft.com/office/drawing/2014/main" id="{9412FC29-0263-4FEB-9DF0-635B8E4B8692}"/>
-              </a:ext>
-            </a:extLst>
-          </p:cNvPr>
-          <p:cNvPicPr>
-            <a:picLocks noChangeAspect="1"/>
-          </p:cNvPicPr>
-          <p:nvPr/>
-        </p:nvPicPr>
-        <p:blipFill>
-          <a:blip r:embed="rId10"/>
-          <a:stretch>
-            <a:fillRect/>
-          </a:stretch>
-        </p:blipFill>
-        <p:spPr>
-          <a:xfrm>
-            <a:off x="6095995" y="1726952"/>
-            <a:ext cx="5948394" cy="865428"/>
-          </a:xfrm>
-          <a:prstGeom prst="rect">
-            <a:avLst/>
-          </a:prstGeom>
-        </p:spPr>
-      </p:pic>
-      <p:pic>
-        <p:nvPicPr>
-          <p:cNvPr id="14" name="Picture 13">
-            <a:extLst>
-              <a:ext uri="{FF2B5EF4-FFF2-40B4-BE49-F238E27FC236}">
-                <a16:creationId xmlns:a16="http://schemas.microsoft.com/office/drawing/2014/main" id="{46663BE5-A5F2-4B44-9A36-107F88C2978C}"/>
-              </a:ext>
-            </a:extLst>
-          </p:cNvPr>
-          <p:cNvPicPr>
-            <a:picLocks noChangeAspect="1"/>
-          </p:cNvPicPr>
-          <p:nvPr/>
-        </p:nvPicPr>
-        <p:blipFill>
-          <a:blip r:embed="rId11"/>
-          <a:stretch>
-            <a:fillRect/>
-          </a:stretch>
-        </p:blipFill>
-        <p:spPr>
-          <a:xfrm>
-            <a:off x="6097007" y="2535695"/>
-            <a:ext cx="5947382" cy="865428"/>
-          </a:xfrm>
-          <a:prstGeom prst="rect">
-            <a:avLst/>
-          </a:prstGeom>
-        </p:spPr>
-      </p:pic>
-      <p:pic>
-        <p:nvPicPr>
-          <p:cNvPr id="15" name="Picture 14">
-            <a:extLst>
-              <a:ext uri="{FF2B5EF4-FFF2-40B4-BE49-F238E27FC236}">
-                <a16:creationId xmlns:a16="http://schemas.microsoft.com/office/drawing/2014/main" id="{57E44CBB-0B23-47FA-A80C-FD0FF2332A74}"/>
-              </a:ext>
-            </a:extLst>
-          </p:cNvPr>
-          <p:cNvPicPr>
-            <a:picLocks noChangeAspect="1"/>
-          </p:cNvPicPr>
-          <p:nvPr/>
-        </p:nvPicPr>
-        <p:blipFill>
-          <a:blip r:embed="rId12"/>
-          <a:stretch>
-            <a:fillRect/>
-          </a:stretch>
-        </p:blipFill>
-        <p:spPr>
-          <a:xfrm>
-            <a:off x="6095994" y="3366481"/>
-            <a:ext cx="6056096" cy="886904"/>
-          </a:xfrm>
-          <a:prstGeom prst="rect">
-            <a:avLst/>
-          </a:prstGeom>
-        </p:spPr>
-      </p:pic>
-      <p:pic>
-        <p:nvPicPr>
-          <p:cNvPr id="16" name="Picture 15">
-            <a:extLst>
-              <a:ext uri="{FF2B5EF4-FFF2-40B4-BE49-F238E27FC236}">
-                <a16:creationId xmlns:a16="http://schemas.microsoft.com/office/drawing/2014/main" id="{6274D63D-C7DB-4FFF-83F6-D6E967946B0C}"/>
-              </a:ext>
-            </a:extLst>
-          </p:cNvPr>
-          <p:cNvPicPr>
-            <a:picLocks noChangeAspect="1"/>
-          </p:cNvPicPr>
-          <p:nvPr/>
-        </p:nvPicPr>
-        <p:blipFill>
-          <a:blip r:embed="rId13"/>
-          <a:stretch>
-            <a:fillRect/>
-          </a:stretch>
-        </p:blipFill>
-        <p:spPr>
-          <a:xfrm>
-            <a:off x="6095992" y="4249965"/>
-            <a:ext cx="6075951" cy="886904"/>
-          </a:xfrm>
-          <a:prstGeom prst="rect">
-            <a:avLst/>
-          </a:prstGeom>
-        </p:spPr>
-      </p:pic>
-      <p:pic>
-        <p:nvPicPr>
-          <p:cNvPr id="17" name="Picture 16">
-            <a:extLst>
-              <a:ext uri="{FF2B5EF4-FFF2-40B4-BE49-F238E27FC236}">
-                <a16:creationId xmlns:a16="http://schemas.microsoft.com/office/drawing/2014/main" id="{BB23CCA7-3F1A-4675-8C57-57DE0A4C8D72}"/>
-              </a:ext>
-            </a:extLst>
-          </p:cNvPr>
-          <p:cNvPicPr>
-            <a:picLocks noChangeAspect="1"/>
-          </p:cNvPicPr>
-          <p:nvPr/>
-        </p:nvPicPr>
-        <p:blipFill>
-          <a:blip r:embed="rId14"/>
-          <a:stretch>
-            <a:fillRect/>
-          </a:stretch>
-        </p:blipFill>
-        <p:spPr>
-          <a:xfrm>
-            <a:off x="6095992" y="5136049"/>
-            <a:ext cx="5993735" cy="849662"/>
-          </a:xfrm>
-          <a:prstGeom prst="rect">
-            <a:avLst/>
-          </a:prstGeom>
-        </p:spPr>
-      </p:pic>
-      <p:pic>
-        <p:nvPicPr>
-          <p:cNvPr id="18" name="Picture 17">
-            <a:extLst>
-              <a:ext uri="{FF2B5EF4-FFF2-40B4-BE49-F238E27FC236}">
-                <a16:creationId xmlns:a16="http://schemas.microsoft.com/office/drawing/2014/main" id="{36996910-50B0-4536-A0C8-A9A30A5C83F0}"/>
-              </a:ext>
-            </a:extLst>
-          </p:cNvPr>
-          <p:cNvPicPr>
-            <a:picLocks noChangeAspect="1"/>
-          </p:cNvPicPr>
-          <p:nvPr/>
-        </p:nvPicPr>
-        <p:blipFill>
-          <a:blip r:embed="rId15"/>
-          <a:stretch>
-            <a:fillRect/>
-          </a:stretch>
-        </p:blipFill>
-        <p:spPr>
-          <a:xfrm>
-            <a:off x="6095992" y="5910970"/>
-            <a:ext cx="6039358" cy="883484"/>
-          </a:xfrm>
-          <a:prstGeom prst="rect">
-            <a:avLst/>
-          </a:prstGeom>
-        </p:spPr>
-      </p:pic>
-      <p:pic>
-        <p:nvPicPr>
-          <p:cNvPr id="19" name="Picture 18">
-            <a:extLst>
-              <a:ext uri="{FF2B5EF4-FFF2-40B4-BE49-F238E27FC236}">
-                <a16:creationId xmlns:a16="http://schemas.microsoft.com/office/drawing/2014/main" id="{D2F1BD85-4EB2-487C-93DF-131042C7E093}"/>
-              </a:ext>
-            </a:extLst>
-          </p:cNvPr>
-          <p:cNvPicPr>
-            <a:picLocks noChangeAspect="1"/>
-          </p:cNvPicPr>
-          <p:nvPr/>
-        </p:nvPicPr>
-        <p:blipFill>
-          <a:blip r:embed="rId16"/>
-          <a:stretch>
-            <a:fillRect/>
-          </a:stretch>
-        </p:blipFill>
-        <p:spPr>
-          <a:xfrm>
-            <a:off x="6107207" y="6961191"/>
-            <a:ext cx="6084789" cy="858794"/>
-          </a:xfrm>
-          <a:prstGeom prst="rect">
-            <a:avLst/>
-          </a:prstGeom>
-        </p:spPr>
-      </p:pic>
-      <p:pic>
-        <p:nvPicPr>
-          <p:cNvPr id="20" name="Picture 19">
-            <a:extLst>
-              <a:ext uri="{FF2B5EF4-FFF2-40B4-BE49-F238E27FC236}">
-                <a16:creationId xmlns:a16="http://schemas.microsoft.com/office/drawing/2014/main" id="{6986FFEC-3343-41DC-844E-60163861FC98}"/>
-              </a:ext>
-            </a:extLst>
-          </p:cNvPr>
-          <p:cNvPicPr>
-            <a:picLocks noChangeAspect="1"/>
-          </p:cNvPicPr>
-          <p:nvPr/>
-        </p:nvPicPr>
-        <p:blipFill>
-          <a:blip r:embed="rId17"/>
-          <a:stretch>
-            <a:fillRect/>
-          </a:stretch>
-        </p:blipFill>
-        <p:spPr>
-          <a:xfrm>
-            <a:off x="6095992" y="7819985"/>
-            <a:ext cx="6078134" cy="858794"/>
-          </a:xfrm>
-          <a:prstGeom prst="rect">
-            <a:avLst/>
-          </a:prstGeom>
-        </p:spPr>
-      </p:pic>
-      <p:pic>
-        <p:nvPicPr>
-          <p:cNvPr id="21" name="Picture 20">
-            <a:extLst>
-              <a:ext uri="{FF2B5EF4-FFF2-40B4-BE49-F238E27FC236}">
-                <a16:creationId xmlns:a16="http://schemas.microsoft.com/office/drawing/2014/main" id="{D7919166-4D19-4FCA-B964-44313F736CE9}"/>
-              </a:ext>
-            </a:extLst>
-          </p:cNvPr>
-          <p:cNvPicPr>
-            <a:picLocks noChangeAspect="1"/>
-          </p:cNvPicPr>
-          <p:nvPr/>
-        </p:nvPicPr>
-        <p:blipFill>
-          <a:blip r:embed="rId18"/>
-          <a:stretch>
-            <a:fillRect/>
-          </a:stretch>
-        </p:blipFill>
-        <p:spPr>
-          <a:xfrm>
-            <a:off x="6095992" y="8634069"/>
-            <a:ext cx="5986597" cy="886904"/>
-          </a:xfrm>
-          <a:prstGeom prst="rect">
-            <a:avLst/>
-          </a:prstGeom>
-        </p:spPr>
-      </p:pic>
-      <p:pic>
-        <p:nvPicPr>
-          <p:cNvPr id="22" name="Picture 21">
-            <a:extLst>
-              <a:ext uri="{FF2B5EF4-FFF2-40B4-BE49-F238E27FC236}">
-                <a16:creationId xmlns:a16="http://schemas.microsoft.com/office/drawing/2014/main" id="{E599947A-B421-4913-B0E9-B5C63AB0F47C}"/>
-              </a:ext>
-            </a:extLst>
-          </p:cNvPr>
-          <p:cNvPicPr>
-            <a:picLocks noChangeAspect="1"/>
-          </p:cNvPicPr>
-          <p:nvPr/>
-        </p:nvPicPr>
-        <p:blipFill>
-          <a:blip r:embed="rId19"/>
-          <a:stretch>
-            <a:fillRect/>
-          </a:stretch>
-        </p:blipFill>
-        <p:spPr>
-          <a:xfrm>
-            <a:off x="19108" y="8564706"/>
-            <a:ext cx="5193264" cy="765383"/>
-          </a:xfrm>
-          <a:prstGeom prst="rect">
-            <a:avLst/>
-          </a:prstGeom>
-        </p:spPr>
-      </p:pic>
-      <p:pic>
-        <p:nvPicPr>
-          <p:cNvPr id="23" name="Picture 22">
-            <a:extLst>
-              <a:ext uri="{FF2B5EF4-FFF2-40B4-BE49-F238E27FC236}">
-                <a16:creationId xmlns:a16="http://schemas.microsoft.com/office/drawing/2014/main" id="{5DA03EA8-150C-4524-B854-D11666AFD5B5}"/>
-              </a:ext>
-            </a:extLst>
-          </p:cNvPr>
-          <p:cNvPicPr>
-            <a:picLocks noChangeAspect="1"/>
-          </p:cNvPicPr>
-          <p:nvPr/>
-        </p:nvPicPr>
-        <p:blipFill>
-          <a:blip r:embed="rId20"/>
-          <a:stretch>
-            <a:fillRect/>
-          </a:stretch>
-        </p:blipFill>
-        <p:spPr>
-          <a:xfrm>
-            <a:off x="2" y="5623912"/>
-            <a:ext cx="5341969" cy="1316393"/>
-          </a:xfrm>
-          <a:prstGeom prst="rect">
-            <a:avLst/>
-          </a:prstGeom>
-        </p:spPr>
-      </p:pic>
-      <p:pic>
-        <p:nvPicPr>
-          <p:cNvPr id="24" name="Picture 23">
-            <a:extLst>
-              <a:ext uri="{FF2B5EF4-FFF2-40B4-BE49-F238E27FC236}">
-                <a16:creationId xmlns:a16="http://schemas.microsoft.com/office/drawing/2014/main" id="{AE152FE5-C3ED-4229-8109-6C86D9E51B65}"/>
-              </a:ext>
-            </a:extLst>
-          </p:cNvPr>
-          <p:cNvPicPr>
-            <a:picLocks noChangeAspect="1"/>
-          </p:cNvPicPr>
-          <p:nvPr/>
-        </p:nvPicPr>
-        <p:blipFill>
-          <a:blip r:embed="rId21"/>
-          <a:stretch>
-            <a:fillRect/>
-          </a:stretch>
-        </p:blipFill>
-        <p:spPr>
-          <a:xfrm>
-            <a:off x="19108" y="7024507"/>
-            <a:ext cx="5264092" cy="766726"/>
-          </a:xfrm>
-          <a:prstGeom prst="rect">
-            <a:avLst/>
-          </a:prstGeom>
-        </p:spPr>
-      </p:pic>
-      <p:pic>
-        <p:nvPicPr>
-          <p:cNvPr id="25" name="Picture 24">
-            <a:extLst>
-              <a:ext uri="{FF2B5EF4-FFF2-40B4-BE49-F238E27FC236}">
-                <a16:creationId xmlns:a16="http://schemas.microsoft.com/office/drawing/2014/main" id="{8C1D73B0-74D4-4674-9CAE-95A9823C715D}"/>
-              </a:ext>
-            </a:extLst>
-          </p:cNvPr>
-          <p:cNvPicPr>
-            <a:picLocks noChangeAspect="1"/>
-          </p:cNvPicPr>
-          <p:nvPr/>
-        </p:nvPicPr>
-        <p:blipFill>
-          <a:blip r:embed="rId22"/>
-          <a:stretch>
-            <a:fillRect/>
-          </a:stretch>
-        </p:blipFill>
-        <p:spPr>
-          <a:xfrm>
-            <a:off x="0" y="7864696"/>
-            <a:ext cx="5356470" cy="769373"/>
-          </a:xfrm>
-          <a:prstGeom prst="rect">
-            <a:avLst/>
-          </a:prstGeom>
-        </p:spPr>
-      </p:pic>
+      <p:sp>
+        <p:nvSpPr>
+          <p:cNvPr id="5" name="TextBox 4">
+            <a:extLst>
+              <a:ext uri="{FF2B5EF4-FFF2-40B4-BE49-F238E27FC236}">
+                <a16:creationId xmlns:a16="http://schemas.microsoft.com/office/drawing/2014/main" id="{CF7B87C7-497B-4704-A20F-B5E283BC22FF}"/>
+              </a:ext>
+            </a:extLst>
+          </p:cNvPr>
+          <p:cNvSpPr txBox="1"/>
+          <p:nvPr/>
+        </p:nvSpPr>
+        <p:spPr>
+          <a:xfrm>
+            <a:off x="5160103" y="3192728"/>
+            <a:ext cx="1871794" cy="369332"/>
+          </a:xfrm>
+          <a:prstGeom prst="rect">
+            <a:avLst/>
+          </a:prstGeom>
+          <a:noFill/>
+        </p:spPr>
+        <p:txBody>
+          <a:bodyPr wrap="none" rtlCol="0">
+            <a:spAutoFit/>
+          </a:bodyPr>
+          <a:lstStyle/>
+          <a:p>
+            <a:r>
+              <a:rPr lang="en-US" dirty="0">
+                <a:solidFill>
+                  <a:schemeClr val="tx1">
+                    <a:lumMod val="50000"/>
+                    <a:lumOff val="50000"/>
+                  </a:schemeClr>
+                </a:solidFill>
+              </a:rPr>
+              <a:t>Streaming Movies</a:t>
+            </a:r>
+          </a:p>
+        </p:txBody>
+      </p:sp>
+      <p:sp>
+        <p:nvSpPr>
+          <p:cNvPr id="6" name="TextBox 5">
+            <a:extLst>
+              <a:ext uri="{FF2B5EF4-FFF2-40B4-BE49-F238E27FC236}">
+                <a16:creationId xmlns:a16="http://schemas.microsoft.com/office/drawing/2014/main" id="{37E0A454-E6A4-4608-9DFA-E29C5542B7F2}"/>
+              </a:ext>
+            </a:extLst>
+          </p:cNvPr>
+          <p:cNvSpPr txBox="1"/>
+          <p:nvPr/>
+        </p:nvSpPr>
+        <p:spPr>
+          <a:xfrm>
+            <a:off x="5260130" y="135482"/>
+            <a:ext cx="1671740" cy="369332"/>
+          </a:xfrm>
+          <a:prstGeom prst="rect">
+            <a:avLst/>
+          </a:prstGeom>
+          <a:noFill/>
+        </p:spPr>
+        <p:txBody>
+          <a:bodyPr wrap="none" rtlCol="0">
+            <a:spAutoFit/>
+          </a:bodyPr>
+          <a:lstStyle/>
+          <a:p>
+            <a:r>
+              <a:rPr lang="en-US" dirty="0">
+                <a:solidFill>
+                  <a:schemeClr val="tx1">
+                    <a:lumMod val="50000"/>
+                    <a:lumOff val="50000"/>
+                  </a:schemeClr>
+                </a:solidFill>
+              </a:rPr>
+              <a:t>Internet Service</a:t>
+            </a:r>
+          </a:p>
+        </p:txBody>
+      </p:sp>
+      <p:sp>
+        <p:nvSpPr>
+          <p:cNvPr id="7" name="TextBox 6">
+            <a:extLst>
+              <a:ext uri="{FF2B5EF4-FFF2-40B4-BE49-F238E27FC236}">
+                <a16:creationId xmlns:a16="http://schemas.microsoft.com/office/drawing/2014/main" id="{1549E8BE-E23B-4C31-AEE0-ABF854074955}"/>
+              </a:ext>
+            </a:extLst>
+          </p:cNvPr>
+          <p:cNvSpPr txBox="1"/>
+          <p:nvPr/>
+        </p:nvSpPr>
+        <p:spPr>
+          <a:xfrm>
+            <a:off x="5602339" y="6203756"/>
+            <a:ext cx="987322" cy="369332"/>
+          </a:xfrm>
+          <a:prstGeom prst="rect">
+            <a:avLst/>
+          </a:prstGeom>
+          <a:noFill/>
+        </p:spPr>
+        <p:txBody>
+          <a:bodyPr wrap="none" rtlCol="0">
+            <a:spAutoFit/>
+          </a:bodyPr>
+          <a:lstStyle/>
+          <a:p>
+            <a:r>
+              <a:rPr lang="en-US" dirty="0">
+                <a:solidFill>
+                  <a:schemeClr val="tx1">
+                    <a:lumMod val="50000"/>
+                    <a:lumOff val="50000"/>
+                  </a:schemeClr>
+                </a:solidFill>
+              </a:rPr>
+              <a:t>Contract</a:t>
+            </a:r>
+          </a:p>
+        </p:txBody>
+      </p:sp>
     </p:spTree>
     <p:extLst>
       <p:ext uri="{BB962C8B-B14F-4D97-AF65-F5344CB8AC3E}">
-        <p14:creationId xmlns:p14="http://schemas.microsoft.com/office/powerpoint/2010/main" val="863806302"/>
+        <p14:creationId xmlns:p14="http://schemas.microsoft.com/office/powerpoint/2010/main" val="1417333963"/>
       </p:ext>
     </p:extLst>
   </p:cSld>
@@ -4938,14 +4282,16 @@
       </p:grpSpPr>
       <p:pic>
         <p:nvPicPr>
-          <p:cNvPr id="4" name="Picture 3">
-            <a:extLst>
-              <a:ext uri="{FF2B5EF4-FFF2-40B4-BE49-F238E27FC236}">
-                <a16:creationId xmlns:a16="http://schemas.microsoft.com/office/drawing/2014/main" id="{4F37C541-3B5D-4ECC-9680-D81D953C9014}"/>
-              </a:ext>
-            </a:extLst>
-          </p:cNvPr>
-          <p:cNvPicPr/>
+          <p:cNvPr id="18" name="Picture 17">
+            <a:extLst>
+              <a:ext uri="{FF2B5EF4-FFF2-40B4-BE49-F238E27FC236}">
+                <a16:creationId xmlns:a16="http://schemas.microsoft.com/office/drawing/2014/main" id="{877FC9A4-FF47-497B-8085-00A164127C23}"/>
+              </a:ext>
+            </a:extLst>
+          </p:cNvPr>
+          <p:cNvPicPr>
+            <a:picLocks noChangeAspect="1"/>
+          </p:cNvPicPr>
           <p:nvPr/>
         </p:nvPicPr>
         <p:blipFill>
@@ -4956,8 +4302,8 @@
         </p:blipFill>
         <p:spPr>
           <a:xfrm>
-            <a:off x="992431" y="2971800"/>
-            <a:ext cx="7636756" cy="2829154"/>
+            <a:off x="196852" y="704851"/>
+            <a:ext cx="5575300" cy="2551305"/>
           </a:xfrm>
           <a:prstGeom prst="rect">
             <a:avLst/>
@@ -4966,35 +4312,194 @@
       </p:pic>
       <p:pic>
         <p:nvPicPr>
-          <p:cNvPr id="5" name="Picture 4">
-            <a:extLst>
-              <a:ext uri="{FF2B5EF4-FFF2-40B4-BE49-F238E27FC236}">
-                <a16:creationId xmlns:a16="http://schemas.microsoft.com/office/drawing/2014/main" id="{997900C6-EE62-4B9A-A591-F4F18C189053}"/>
-              </a:ext>
-            </a:extLst>
-          </p:cNvPr>
-          <p:cNvPicPr/>
+          <p:cNvPr id="19" name="Picture 18">
+            <a:extLst>
+              <a:ext uri="{FF2B5EF4-FFF2-40B4-BE49-F238E27FC236}">
+                <a16:creationId xmlns:a16="http://schemas.microsoft.com/office/drawing/2014/main" id="{AFD2394A-D791-485C-AFBC-594C16C6FF0F}"/>
+              </a:ext>
+            </a:extLst>
+          </p:cNvPr>
+          <p:cNvPicPr>
+            <a:picLocks noChangeAspect="1"/>
+          </p:cNvPicPr>
           <p:nvPr/>
         </p:nvPicPr>
-        <p:blipFill rotWithShape="1">
+        <p:blipFill>
           <a:blip r:embed="rId3"/>
-          <a:srcRect/>
-          <a:stretch/>
+          <a:stretch>
+            <a:fillRect/>
+          </a:stretch>
         </p:blipFill>
         <p:spPr>
           <a:xfrm>
-            <a:off x="812802" y="5943600"/>
-            <a:ext cx="7816384" cy="2829154"/>
+            <a:off x="6263174" y="704851"/>
+            <a:ext cx="5799703" cy="2641386"/>
           </a:xfrm>
           <a:prstGeom prst="rect">
             <a:avLst/>
           </a:prstGeom>
         </p:spPr>
       </p:pic>
+      <p:pic>
+        <p:nvPicPr>
+          <p:cNvPr id="20" name="Picture 19">
+            <a:extLst>
+              <a:ext uri="{FF2B5EF4-FFF2-40B4-BE49-F238E27FC236}">
+                <a16:creationId xmlns:a16="http://schemas.microsoft.com/office/drawing/2014/main" id="{D2CE30D4-2AA5-41DB-B172-DA1CF09CDFF4}"/>
+              </a:ext>
+            </a:extLst>
+          </p:cNvPr>
+          <p:cNvPicPr>
+            <a:picLocks noChangeAspect="1"/>
+          </p:cNvPicPr>
+          <p:nvPr/>
+        </p:nvPicPr>
+        <p:blipFill>
+          <a:blip r:embed="rId4"/>
+          <a:stretch>
+            <a:fillRect/>
+          </a:stretch>
+        </p:blipFill>
+        <p:spPr>
+          <a:xfrm>
+            <a:off x="3028974" y="3703021"/>
+            <a:ext cx="6134052" cy="2806996"/>
+          </a:xfrm>
+          <a:prstGeom prst="rect">
+            <a:avLst/>
+          </a:prstGeom>
+        </p:spPr>
+      </p:pic>
+      <p:sp>
+        <p:nvSpPr>
+          <p:cNvPr id="2" name="TextBox 1">
+            <a:extLst>
+              <a:ext uri="{FF2B5EF4-FFF2-40B4-BE49-F238E27FC236}">
+                <a16:creationId xmlns:a16="http://schemas.microsoft.com/office/drawing/2014/main" id="{8C240D69-EFC6-4DEF-BA88-EE5E11E99E00}"/>
+              </a:ext>
+            </a:extLst>
+          </p:cNvPr>
+          <p:cNvSpPr txBox="1"/>
+          <p:nvPr/>
+        </p:nvSpPr>
+        <p:spPr>
+          <a:xfrm>
+            <a:off x="2443485" y="335519"/>
+            <a:ext cx="885179" cy="369332"/>
+          </a:xfrm>
+          <a:prstGeom prst="rect">
+            <a:avLst/>
+          </a:prstGeom>
+          <a:noFill/>
+        </p:spPr>
+        <p:txBody>
+          <a:bodyPr wrap="none" rtlCol="0">
+            <a:spAutoFit/>
+          </a:bodyPr>
+          <a:lstStyle/>
+          <a:p>
+            <a:r>
+              <a:rPr lang="en-US" dirty="0">
+                <a:solidFill>
+                  <a:schemeClr val="tx1">
+                    <a:lumMod val="50000"/>
+                    <a:lumOff val="50000"/>
+                  </a:schemeClr>
+                </a:solidFill>
+              </a:rPr>
+              <a:t>Gender</a:t>
+            </a:r>
+          </a:p>
+        </p:txBody>
+      </p:sp>
+      <p:sp>
+        <p:nvSpPr>
+          <p:cNvPr id="6" name="TextBox 5">
+            <a:extLst>
+              <a:ext uri="{FF2B5EF4-FFF2-40B4-BE49-F238E27FC236}">
+                <a16:creationId xmlns:a16="http://schemas.microsoft.com/office/drawing/2014/main" id="{BE66E1ED-D342-42A7-985F-359BB754397E}"/>
+              </a:ext>
+            </a:extLst>
+          </p:cNvPr>
+          <p:cNvSpPr txBox="1"/>
+          <p:nvPr/>
+        </p:nvSpPr>
+        <p:spPr>
+          <a:xfrm>
+            <a:off x="8721301" y="335519"/>
+            <a:ext cx="883447" cy="369332"/>
+          </a:xfrm>
+          <a:prstGeom prst="rect">
+            <a:avLst/>
+          </a:prstGeom>
+          <a:noFill/>
+        </p:spPr>
+        <p:txBody>
+          <a:bodyPr wrap="none" rtlCol="0">
+            <a:spAutoFit/>
+          </a:bodyPr>
+          <a:lstStyle/>
+          <a:p>
+            <a:r>
+              <a:rPr lang="en-US" dirty="0">
+                <a:solidFill>
+                  <a:schemeClr val="tx1">
+                    <a:lumMod val="50000"/>
+                    <a:lumOff val="50000"/>
+                  </a:schemeClr>
+                </a:solidFill>
+              </a:rPr>
+              <a:t>Partner</a:t>
+            </a:r>
+          </a:p>
+        </p:txBody>
+      </p:sp>
+      <p:sp>
+        <p:nvSpPr>
+          <p:cNvPr id="7" name="TextBox 6">
+            <a:extLst>
+              <a:ext uri="{FF2B5EF4-FFF2-40B4-BE49-F238E27FC236}">
+                <a16:creationId xmlns:a16="http://schemas.microsoft.com/office/drawing/2014/main" id="{A91DF898-CD9A-4B22-B1AF-2CD2F282F467}"/>
+              </a:ext>
+            </a:extLst>
+          </p:cNvPr>
+          <p:cNvSpPr txBox="1"/>
+          <p:nvPr/>
+        </p:nvSpPr>
+        <p:spPr>
+          <a:xfrm>
+            <a:off x="5433255" y="3346237"/>
+            <a:ext cx="1325491" cy="369332"/>
+          </a:xfrm>
+          <a:prstGeom prst="rect">
+            <a:avLst/>
+          </a:prstGeom>
+          <a:noFill/>
+        </p:spPr>
+        <p:txBody>
+          <a:bodyPr wrap="none" rtlCol="0">
+            <a:spAutoFit/>
+          </a:bodyPr>
+          <a:lstStyle/>
+          <a:p>
+            <a:r>
+              <a:rPr lang="en-US" dirty="0">
+                <a:solidFill>
+                  <a:schemeClr val="tx1">
+                    <a:lumMod val="50000"/>
+                    <a:lumOff val="50000"/>
+                  </a:schemeClr>
+                </a:solidFill>
+              </a:rPr>
+              <a:t>Dependents</a:t>
+            </a:r>
+          </a:p>
+        </p:txBody>
+      </p:sp>
     </p:spTree>
     <p:extLst>
       <p:ext uri="{BB962C8B-B14F-4D97-AF65-F5344CB8AC3E}">
-        <p14:creationId xmlns:p14="http://schemas.microsoft.com/office/powerpoint/2010/main" val="2895962183"/>
+        <p14:creationId xmlns:p14="http://schemas.microsoft.com/office/powerpoint/2010/main" val="2582423852"/>
       </p:ext>
     </p:extLst>
   </p:cSld>
@@ -5023,6 +4528,751 @@
       </p:grpSpPr>
       <p:pic>
         <p:nvPicPr>
+          <p:cNvPr id="5" name="Picture 4">
+            <a:extLst>
+              <a:ext uri="{FF2B5EF4-FFF2-40B4-BE49-F238E27FC236}">
+                <a16:creationId xmlns:a16="http://schemas.microsoft.com/office/drawing/2014/main" id="{0D3CBD2D-27C5-4787-B728-0466912C55C5}"/>
+              </a:ext>
+            </a:extLst>
+          </p:cNvPr>
+          <p:cNvPicPr>
+            <a:picLocks noChangeAspect="1"/>
+          </p:cNvPicPr>
+          <p:nvPr/>
+        </p:nvPicPr>
+        <p:blipFill>
+          <a:blip r:embed="rId2"/>
+          <a:stretch>
+            <a:fillRect/>
+          </a:stretch>
+        </p:blipFill>
+        <p:spPr>
+          <a:xfrm>
+            <a:off x="1" y="2"/>
+            <a:ext cx="5283200" cy="756393"/>
+          </a:xfrm>
+          <a:prstGeom prst="rect">
+            <a:avLst/>
+          </a:prstGeom>
+        </p:spPr>
+      </p:pic>
+      <p:pic>
+        <p:nvPicPr>
+          <p:cNvPr id="6" name="Picture 5">
+            <a:extLst>
+              <a:ext uri="{FF2B5EF4-FFF2-40B4-BE49-F238E27FC236}">
+                <a16:creationId xmlns:a16="http://schemas.microsoft.com/office/drawing/2014/main" id="{FB9A7486-7CFD-426C-A8AF-2F85C02BD5A1}"/>
+              </a:ext>
+            </a:extLst>
+          </p:cNvPr>
+          <p:cNvPicPr>
+            <a:picLocks noChangeAspect="1"/>
+          </p:cNvPicPr>
+          <p:nvPr/>
+        </p:nvPicPr>
+        <p:blipFill>
+          <a:blip r:embed="rId3"/>
+          <a:stretch>
+            <a:fillRect/>
+          </a:stretch>
+        </p:blipFill>
+        <p:spPr>
+          <a:xfrm>
+            <a:off x="0" y="833439"/>
+            <a:ext cx="5283200" cy="789311"/>
+          </a:xfrm>
+          <a:prstGeom prst="rect">
+            <a:avLst/>
+          </a:prstGeom>
+        </p:spPr>
+      </p:pic>
+      <p:pic>
+        <p:nvPicPr>
+          <p:cNvPr id="7" name="Picture 6">
+            <a:extLst>
+              <a:ext uri="{FF2B5EF4-FFF2-40B4-BE49-F238E27FC236}">
+                <a16:creationId xmlns:a16="http://schemas.microsoft.com/office/drawing/2014/main" id="{16060771-0BA5-4591-A790-708B2A67B71D}"/>
+              </a:ext>
+            </a:extLst>
+          </p:cNvPr>
+          <p:cNvPicPr>
+            <a:picLocks noChangeAspect="1"/>
+          </p:cNvPicPr>
+          <p:nvPr/>
+        </p:nvPicPr>
+        <p:blipFill>
+          <a:blip r:embed="rId4"/>
+          <a:stretch>
+            <a:fillRect/>
+          </a:stretch>
+        </p:blipFill>
+        <p:spPr>
+          <a:xfrm>
+            <a:off x="1" y="1699800"/>
+            <a:ext cx="5283200" cy="758849"/>
+          </a:xfrm>
+          <a:prstGeom prst="rect">
+            <a:avLst/>
+          </a:prstGeom>
+        </p:spPr>
+      </p:pic>
+      <p:pic>
+        <p:nvPicPr>
+          <p:cNvPr id="8" name="Picture 7">
+            <a:extLst>
+              <a:ext uri="{FF2B5EF4-FFF2-40B4-BE49-F238E27FC236}">
+                <a16:creationId xmlns:a16="http://schemas.microsoft.com/office/drawing/2014/main" id="{D9B44983-88D0-4699-92C4-6F0A012A50A4}"/>
+              </a:ext>
+            </a:extLst>
+          </p:cNvPr>
+          <p:cNvPicPr>
+            <a:picLocks noChangeAspect="1"/>
+          </p:cNvPicPr>
+          <p:nvPr/>
+        </p:nvPicPr>
+        <p:blipFill>
+          <a:blip r:embed="rId5"/>
+          <a:stretch>
+            <a:fillRect/>
+          </a:stretch>
+        </p:blipFill>
+        <p:spPr>
+          <a:xfrm>
+            <a:off x="1" y="2535695"/>
+            <a:ext cx="5283200" cy="762167"/>
+          </a:xfrm>
+          <a:prstGeom prst="rect">
+            <a:avLst/>
+          </a:prstGeom>
+        </p:spPr>
+      </p:pic>
+      <p:pic>
+        <p:nvPicPr>
+          <p:cNvPr id="9" name="Picture 8">
+            <a:extLst>
+              <a:ext uri="{FF2B5EF4-FFF2-40B4-BE49-F238E27FC236}">
+                <a16:creationId xmlns:a16="http://schemas.microsoft.com/office/drawing/2014/main" id="{608C2047-6E80-4C4E-AEBB-18C795FC9DE8}"/>
+              </a:ext>
+            </a:extLst>
+          </p:cNvPr>
+          <p:cNvPicPr>
+            <a:picLocks noChangeAspect="1"/>
+          </p:cNvPicPr>
+          <p:nvPr/>
+        </p:nvPicPr>
+        <p:blipFill>
+          <a:blip r:embed="rId6"/>
+          <a:stretch>
+            <a:fillRect/>
+          </a:stretch>
+        </p:blipFill>
+        <p:spPr>
+          <a:xfrm>
+            <a:off x="1" y="3374906"/>
+            <a:ext cx="5283200" cy="773714"/>
+          </a:xfrm>
+          <a:prstGeom prst="rect">
+            <a:avLst/>
+          </a:prstGeom>
+        </p:spPr>
+      </p:pic>
+      <p:pic>
+        <p:nvPicPr>
+          <p:cNvPr id="10" name="Picture 9">
+            <a:extLst>
+              <a:ext uri="{FF2B5EF4-FFF2-40B4-BE49-F238E27FC236}">
+                <a16:creationId xmlns:a16="http://schemas.microsoft.com/office/drawing/2014/main" id="{CBE3AC01-C4AB-492E-99C8-93A1BCE688EF}"/>
+              </a:ext>
+            </a:extLst>
+          </p:cNvPr>
+          <p:cNvPicPr>
+            <a:picLocks noChangeAspect="1"/>
+          </p:cNvPicPr>
+          <p:nvPr/>
+        </p:nvPicPr>
+        <p:blipFill>
+          <a:blip r:embed="rId7"/>
+          <a:stretch>
+            <a:fillRect/>
+          </a:stretch>
+        </p:blipFill>
+        <p:spPr>
+          <a:xfrm>
+            <a:off x="0" y="4225669"/>
+            <a:ext cx="5283200" cy="1316393"/>
+          </a:xfrm>
+          <a:prstGeom prst="rect">
+            <a:avLst/>
+          </a:prstGeom>
+        </p:spPr>
+      </p:pic>
+      <p:pic>
+        <p:nvPicPr>
+          <p:cNvPr id="11" name="Picture 10">
+            <a:extLst>
+              <a:ext uri="{FF2B5EF4-FFF2-40B4-BE49-F238E27FC236}">
+                <a16:creationId xmlns:a16="http://schemas.microsoft.com/office/drawing/2014/main" id="{2422F2BA-37CD-473E-BAA0-B96BE915DB8E}"/>
+              </a:ext>
+            </a:extLst>
+          </p:cNvPr>
+          <p:cNvPicPr>
+            <a:picLocks noChangeAspect="1"/>
+          </p:cNvPicPr>
+          <p:nvPr/>
+        </p:nvPicPr>
+        <p:blipFill>
+          <a:blip r:embed="rId8"/>
+          <a:stretch>
+            <a:fillRect/>
+          </a:stretch>
+        </p:blipFill>
+        <p:spPr>
+          <a:xfrm>
+            <a:off x="6095999" y="0"/>
+            <a:ext cx="6095999" cy="886904"/>
+          </a:xfrm>
+          <a:prstGeom prst="rect">
+            <a:avLst/>
+          </a:prstGeom>
+        </p:spPr>
+      </p:pic>
+      <p:pic>
+        <p:nvPicPr>
+          <p:cNvPr id="12" name="Picture 11">
+            <a:extLst>
+              <a:ext uri="{FF2B5EF4-FFF2-40B4-BE49-F238E27FC236}">
+                <a16:creationId xmlns:a16="http://schemas.microsoft.com/office/drawing/2014/main" id="{944C271A-D62C-4887-A9AF-326A6BA36DF6}"/>
+              </a:ext>
+            </a:extLst>
+          </p:cNvPr>
+          <p:cNvPicPr>
+            <a:picLocks noChangeAspect="1"/>
+          </p:cNvPicPr>
+          <p:nvPr/>
+        </p:nvPicPr>
+        <p:blipFill>
+          <a:blip r:embed="rId9"/>
+          <a:stretch>
+            <a:fillRect/>
+          </a:stretch>
+        </p:blipFill>
+        <p:spPr>
+          <a:xfrm>
+            <a:off x="6095997" y="833439"/>
+            <a:ext cx="6095999" cy="925502"/>
+          </a:xfrm>
+          <a:prstGeom prst="rect">
+            <a:avLst/>
+          </a:prstGeom>
+        </p:spPr>
+      </p:pic>
+      <p:pic>
+        <p:nvPicPr>
+          <p:cNvPr id="13" name="Picture 12">
+            <a:extLst>
+              <a:ext uri="{FF2B5EF4-FFF2-40B4-BE49-F238E27FC236}">
+                <a16:creationId xmlns:a16="http://schemas.microsoft.com/office/drawing/2014/main" id="{9412FC29-0263-4FEB-9DF0-635B8E4B8692}"/>
+              </a:ext>
+            </a:extLst>
+          </p:cNvPr>
+          <p:cNvPicPr>
+            <a:picLocks noChangeAspect="1"/>
+          </p:cNvPicPr>
+          <p:nvPr/>
+        </p:nvPicPr>
+        <p:blipFill>
+          <a:blip r:embed="rId10"/>
+          <a:stretch>
+            <a:fillRect/>
+          </a:stretch>
+        </p:blipFill>
+        <p:spPr>
+          <a:xfrm>
+            <a:off x="6095995" y="1726952"/>
+            <a:ext cx="5948394" cy="865428"/>
+          </a:xfrm>
+          <a:prstGeom prst="rect">
+            <a:avLst/>
+          </a:prstGeom>
+        </p:spPr>
+      </p:pic>
+      <p:pic>
+        <p:nvPicPr>
+          <p:cNvPr id="14" name="Picture 13">
+            <a:extLst>
+              <a:ext uri="{FF2B5EF4-FFF2-40B4-BE49-F238E27FC236}">
+                <a16:creationId xmlns:a16="http://schemas.microsoft.com/office/drawing/2014/main" id="{46663BE5-A5F2-4B44-9A36-107F88C2978C}"/>
+              </a:ext>
+            </a:extLst>
+          </p:cNvPr>
+          <p:cNvPicPr>
+            <a:picLocks noChangeAspect="1"/>
+          </p:cNvPicPr>
+          <p:nvPr/>
+        </p:nvPicPr>
+        <p:blipFill>
+          <a:blip r:embed="rId11"/>
+          <a:stretch>
+            <a:fillRect/>
+          </a:stretch>
+        </p:blipFill>
+        <p:spPr>
+          <a:xfrm>
+            <a:off x="6097007" y="2535695"/>
+            <a:ext cx="5947382" cy="865428"/>
+          </a:xfrm>
+          <a:prstGeom prst="rect">
+            <a:avLst/>
+          </a:prstGeom>
+        </p:spPr>
+      </p:pic>
+      <p:pic>
+        <p:nvPicPr>
+          <p:cNvPr id="15" name="Picture 14">
+            <a:extLst>
+              <a:ext uri="{FF2B5EF4-FFF2-40B4-BE49-F238E27FC236}">
+                <a16:creationId xmlns:a16="http://schemas.microsoft.com/office/drawing/2014/main" id="{57E44CBB-0B23-47FA-A80C-FD0FF2332A74}"/>
+              </a:ext>
+            </a:extLst>
+          </p:cNvPr>
+          <p:cNvPicPr>
+            <a:picLocks noChangeAspect="1"/>
+          </p:cNvPicPr>
+          <p:nvPr/>
+        </p:nvPicPr>
+        <p:blipFill>
+          <a:blip r:embed="rId12"/>
+          <a:stretch>
+            <a:fillRect/>
+          </a:stretch>
+        </p:blipFill>
+        <p:spPr>
+          <a:xfrm>
+            <a:off x="6095994" y="3366481"/>
+            <a:ext cx="6056096" cy="886904"/>
+          </a:xfrm>
+          <a:prstGeom prst="rect">
+            <a:avLst/>
+          </a:prstGeom>
+        </p:spPr>
+      </p:pic>
+      <p:pic>
+        <p:nvPicPr>
+          <p:cNvPr id="16" name="Picture 15">
+            <a:extLst>
+              <a:ext uri="{FF2B5EF4-FFF2-40B4-BE49-F238E27FC236}">
+                <a16:creationId xmlns:a16="http://schemas.microsoft.com/office/drawing/2014/main" id="{6274D63D-C7DB-4FFF-83F6-D6E967946B0C}"/>
+              </a:ext>
+            </a:extLst>
+          </p:cNvPr>
+          <p:cNvPicPr>
+            <a:picLocks noChangeAspect="1"/>
+          </p:cNvPicPr>
+          <p:nvPr/>
+        </p:nvPicPr>
+        <p:blipFill>
+          <a:blip r:embed="rId13"/>
+          <a:stretch>
+            <a:fillRect/>
+          </a:stretch>
+        </p:blipFill>
+        <p:spPr>
+          <a:xfrm>
+            <a:off x="6095992" y="4249965"/>
+            <a:ext cx="6075951" cy="886904"/>
+          </a:xfrm>
+          <a:prstGeom prst="rect">
+            <a:avLst/>
+          </a:prstGeom>
+        </p:spPr>
+      </p:pic>
+      <p:pic>
+        <p:nvPicPr>
+          <p:cNvPr id="17" name="Picture 16">
+            <a:extLst>
+              <a:ext uri="{FF2B5EF4-FFF2-40B4-BE49-F238E27FC236}">
+                <a16:creationId xmlns:a16="http://schemas.microsoft.com/office/drawing/2014/main" id="{BB23CCA7-3F1A-4675-8C57-57DE0A4C8D72}"/>
+              </a:ext>
+            </a:extLst>
+          </p:cNvPr>
+          <p:cNvPicPr>
+            <a:picLocks noChangeAspect="1"/>
+          </p:cNvPicPr>
+          <p:nvPr/>
+        </p:nvPicPr>
+        <p:blipFill>
+          <a:blip r:embed="rId14"/>
+          <a:stretch>
+            <a:fillRect/>
+          </a:stretch>
+        </p:blipFill>
+        <p:spPr>
+          <a:xfrm>
+            <a:off x="6095992" y="5136049"/>
+            <a:ext cx="5993735" cy="849662"/>
+          </a:xfrm>
+          <a:prstGeom prst="rect">
+            <a:avLst/>
+          </a:prstGeom>
+        </p:spPr>
+      </p:pic>
+      <p:pic>
+        <p:nvPicPr>
+          <p:cNvPr id="18" name="Picture 17">
+            <a:extLst>
+              <a:ext uri="{FF2B5EF4-FFF2-40B4-BE49-F238E27FC236}">
+                <a16:creationId xmlns:a16="http://schemas.microsoft.com/office/drawing/2014/main" id="{36996910-50B0-4536-A0C8-A9A30A5C83F0}"/>
+              </a:ext>
+            </a:extLst>
+          </p:cNvPr>
+          <p:cNvPicPr>
+            <a:picLocks noChangeAspect="1"/>
+          </p:cNvPicPr>
+          <p:nvPr/>
+        </p:nvPicPr>
+        <p:blipFill>
+          <a:blip r:embed="rId15"/>
+          <a:stretch>
+            <a:fillRect/>
+          </a:stretch>
+        </p:blipFill>
+        <p:spPr>
+          <a:xfrm>
+            <a:off x="6095992" y="5910970"/>
+            <a:ext cx="6039358" cy="883484"/>
+          </a:xfrm>
+          <a:prstGeom prst="rect">
+            <a:avLst/>
+          </a:prstGeom>
+        </p:spPr>
+      </p:pic>
+      <p:pic>
+        <p:nvPicPr>
+          <p:cNvPr id="19" name="Picture 18">
+            <a:extLst>
+              <a:ext uri="{FF2B5EF4-FFF2-40B4-BE49-F238E27FC236}">
+                <a16:creationId xmlns:a16="http://schemas.microsoft.com/office/drawing/2014/main" id="{D2F1BD85-4EB2-487C-93DF-131042C7E093}"/>
+              </a:ext>
+            </a:extLst>
+          </p:cNvPr>
+          <p:cNvPicPr>
+            <a:picLocks noChangeAspect="1"/>
+          </p:cNvPicPr>
+          <p:nvPr/>
+        </p:nvPicPr>
+        <p:blipFill>
+          <a:blip r:embed="rId16"/>
+          <a:stretch>
+            <a:fillRect/>
+          </a:stretch>
+        </p:blipFill>
+        <p:spPr>
+          <a:xfrm>
+            <a:off x="6107207" y="6961191"/>
+            <a:ext cx="6084789" cy="858794"/>
+          </a:xfrm>
+          <a:prstGeom prst="rect">
+            <a:avLst/>
+          </a:prstGeom>
+        </p:spPr>
+      </p:pic>
+      <p:pic>
+        <p:nvPicPr>
+          <p:cNvPr id="20" name="Picture 19">
+            <a:extLst>
+              <a:ext uri="{FF2B5EF4-FFF2-40B4-BE49-F238E27FC236}">
+                <a16:creationId xmlns:a16="http://schemas.microsoft.com/office/drawing/2014/main" id="{6986FFEC-3343-41DC-844E-60163861FC98}"/>
+              </a:ext>
+            </a:extLst>
+          </p:cNvPr>
+          <p:cNvPicPr>
+            <a:picLocks noChangeAspect="1"/>
+          </p:cNvPicPr>
+          <p:nvPr/>
+        </p:nvPicPr>
+        <p:blipFill>
+          <a:blip r:embed="rId17"/>
+          <a:stretch>
+            <a:fillRect/>
+          </a:stretch>
+        </p:blipFill>
+        <p:spPr>
+          <a:xfrm>
+            <a:off x="6095992" y="7819985"/>
+            <a:ext cx="6078134" cy="858794"/>
+          </a:xfrm>
+          <a:prstGeom prst="rect">
+            <a:avLst/>
+          </a:prstGeom>
+        </p:spPr>
+      </p:pic>
+      <p:pic>
+        <p:nvPicPr>
+          <p:cNvPr id="21" name="Picture 20">
+            <a:extLst>
+              <a:ext uri="{FF2B5EF4-FFF2-40B4-BE49-F238E27FC236}">
+                <a16:creationId xmlns:a16="http://schemas.microsoft.com/office/drawing/2014/main" id="{D7919166-4D19-4FCA-B964-44313F736CE9}"/>
+              </a:ext>
+            </a:extLst>
+          </p:cNvPr>
+          <p:cNvPicPr>
+            <a:picLocks noChangeAspect="1"/>
+          </p:cNvPicPr>
+          <p:nvPr/>
+        </p:nvPicPr>
+        <p:blipFill>
+          <a:blip r:embed="rId18"/>
+          <a:stretch>
+            <a:fillRect/>
+          </a:stretch>
+        </p:blipFill>
+        <p:spPr>
+          <a:xfrm>
+            <a:off x="6095992" y="8634069"/>
+            <a:ext cx="5986597" cy="886904"/>
+          </a:xfrm>
+          <a:prstGeom prst="rect">
+            <a:avLst/>
+          </a:prstGeom>
+        </p:spPr>
+      </p:pic>
+      <p:pic>
+        <p:nvPicPr>
+          <p:cNvPr id="22" name="Picture 21">
+            <a:extLst>
+              <a:ext uri="{FF2B5EF4-FFF2-40B4-BE49-F238E27FC236}">
+                <a16:creationId xmlns:a16="http://schemas.microsoft.com/office/drawing/2014/main" id="{E599947A-B421-4913-B0E9-B5C63AB0F47C}"/>
+              </a:ext>
+            </a:extLst>
+          </p:cNvPr>
+          <p:cNvPicPr>
+            <a:picLocks noChangeAspect="1"/>
+          </p:cNvPicPr>
+          <p:nvPr/>
+        </p:nvPicPr>
+        <p:blipFill>
+          <a:blip r:embed="rId19"/>
+          <a:stretch>
+            <a:fillRect/>
+          </a:stretch>
+        </p:blipFill>
+        <p:spPr>
+          <a:xfrm>
+            <a:off x="19108" y="8564706"/>
+            <a:ext cx="5193264" cy="765383"/>
+          </a:xfrm>
+          <a:prstGeom prst="rect">
+            <a:avLst/>
+          </a:prstGeom>
+        </p:spPr>
+      </p:pic>
+      <p:pic>
+        <p:nvPicPr>
+          <p:cNvPr id="23" name="Picture 22">
+            <a:extLst>
+              <a:ext uri="{FF2B5EF4-FFF2-40B4-BE49-F238E27FC236}">
+                <a16:creationId xmlns:a16="http://schemas.microsoft.com/office/drawing/2014/main" id="{5DA03EA8-150C-4524-B854-D11666AFD5B5}"/>
+              </a:ext>
+            </a:extLst>
+          </p:cNvPr>
+          <p:cNvPicPr>
+            <a:picLocks noChangeAspect="1"/>
+          </p:cNvPicPr>
+          <p:nvPr/>
+        </p:nvPicPr>
+        <p:blipFill>
+          <a:blip r:embed="rId20"/>
+          <a:stretch>
+            <a:fillRect/>
+          </a:stretch>
+        </p:blipFill>
+        <p:spPr>
+          <a:xfrm>
+            <a:off x="2" y="5623912"/>
+            <a:ext cx="5341969" cy="1316393"/>
+          </a:xfrm>
+          <a:prstGeom prst="rect">
+            <a:avLst/>
+          </a:prstGeom>
+        </p:spPr>
+      </p:pic>
+      <p:pic>
+        <p:nvPicPr>
+          <p:cNvPr id="24" name="Picture 23">
+            <a:extLst>
+              <a:ext uri="{FF2B5EF4-FFF2-40B4-BE49-F238E27FC236}">
+                <a16:creationId xmlns:a16="http://schemas.microsoft.com/office/drawing/2014/main" id="{AE152FE5-C3ED-4229-8109-6C86D9E51B65}"/>
+              </a:ext>
+            </a:extLst>
+          </p:cNvPr>
+          <p:cNvPicPr>
+            <a:picLocks noChangeAspect="1"/>
+          </p:cNvPicPr>
+          <p:nvPr/>
+        </p:nvPicPr>
+        <p:blipFill>
+          <a:blip r:embed="rId21"/>
+          <a:stretch>
+            <a:fillRect/>
+          </a:stretch>
+        </p:blipFill>
+        <p:spPr>
+          <a:xfrm>
+            <a:off x="19108" y="7024507"/>
+            <a:ext cx="5264092" cy="766726"/>
+          </a:xfrm>
+          <a:prstGeom prst="rect">
+            <a:avLst/>
+          </a:prstGeom>
+        </p:spPr>
+      </p:pic>
+      <p:pic>
+        <p:nvPicPr>
+          <p:cNvPr id="25" name="Picture 24">
+            <a:extLst>
+              <a:ext uri="{FF2B5EF4-FFF2-40B4-BE49-F238E27FC236}">
+                <a16:creationId xmlns:a16="http://schemas.microsoft.com/office/drawing/2014/main" id="{8C1D73B0-74D4-4674-9CAE-95A9823C715D}"/>
+              </a:ext>
+            </a:extLst>
+          </p:cNvPr>
+          <p:cNvPicPr>
+            <a:picLocks noChangeAspect="1"/>
+          </p:cNvPicPr>
+          <p:nvPr/>
+        </p:nvPicPr>
+        <p:blipFill>
+          <a:blip r:embed="rId22"/>
+          <a:stretch>
+            <a:fillRect/>
+          </a:stretch>
+        </p:blipFill>
+        <p:spPr>
+          <a:xfrm>
+            <a:off x="0" y="7864696"/>
+            <a:ext cx="5356470" cy="769373"/>
+          </a:xfrm>
+          <a:prstGeom prst="rect">
+            <a:avLst/>
+          </a:prstGeom>
+        </p:spPr>
+      </p:pic>
+    </p:spTree>
+    <p:extLst>
+      <p:ext uri="{BB962C8B-B14F-4D97-AF65-F5344CB8AC3E}">
+        <p14:creationId xmlns:p14="http://schemas.microsoft.com/office/powerpoint/2010/main" val="863806302"/>
+      </p:ext>
+    </p:extLst>
+  </p:cSld>
+  <p:clrMapOvr>
+    <a:masterClrMapping/>
+  </p:clrMapOvr>
+</p:sld>
+</file>
+
+<file path=ppt/slides/slide7.xml><?xml version="1.0" encoding="utf-8"?>
+<p:sld xmlns:a="http://schemas.openxmlformats.org/drawingml/2006/main" xmlns:r="http://schemas.openxmlformats.org/officeDocument/2006/relationships" xmlns:p="http://schemas.openxmlformats.org/presentationml/2006/main">
+  <p:cSld>
+    <p:spTree>
+      <p:nvGrpSpPr>
+        <p:cNvPr id="1" name=""/>
+        <p:cNvGrpSpPr/>
+        <p:nvPr/>
+      </p:nvGrpSpPr>
+      <p:grpSpPr>
+        <a:xfrm>
+          <a:off x="0" y="0"/>
+          <a:ext cx="0" cy="0"/>
+          <a:chOff x="0" y="0"/>
+          <a:chExt cx="0" cy="0"/>
+        </a:xfrm>
+      </p:grpSpPr>
+      <p:pic>
+        <p:nvPicPr>
+          <p:cNvPr id="4" name="Picture 3">
+            <a:extLst>
+              <a:ext uri="{FF2B5EF4-FFF2-40B4-BE49-F238E27FC236}">
+                <a16:creationId xmlns:a16="http://schemas.microsoft.com/office/drawing/2014/main" id="{4F37C541-3B5D-4ECC-9680-D81D953C9014}"/>
+              </a:ext>
+            </a:extLst>
+          </p:cNvPr>
+          <p:cNvPicPr/>
+          <p:nvPr/>
+        </p:nvPicPr>
+        <p:blipFill>
+          <a:blip r:embed="rId2"/>
+          <a:stretch>
+            <a:fillRect/>
+          </a:stretch>
+        </p:blipFill>
+        <p:spPr>
+          <a:xfrm>
+            <a:off x="992431" y="2971800"/>
+            <a:ext cx="7636756" cy="2829154"/>
+          </a:xfrm>
+          <a:prstGeom prst="rect">
+            <a:avLst/>
+          </a:prstGeom>
+        </p:spPr>
+      </p:pic>
+      <p:pic>
+        <p:nvPicPr>
+          <p:cNvPr id="5" name="Picture 4">
+            <a:extLst>
+              <a:ext uri="{FF2B5EF4-FFF2-40B4-BE49-F238E27FC236}">
+                <a16:creationId xmlns:a16="http://schemas.microsoft.com/office/drawing/2014/main" id="{997900C6-EE62-4B9A-A591-F4F18C189053}"/>
+              </a:ext>
+            </a:extLst>
+          </p:cNvPr>
+          <p:cNvPicPr/>
+          <p:nvPr/>
+        </p:nvPicPr>
+        <p:blipFill rotWithShape="1">
+          <a:blip r:embed="rId3"/>
+          <a:srcRect/>
+          <a:stretch/>
+        </p:blipFill>
+        <p:spPr>
+          <a:xfrm>
+            <a:off x="812802" y="5943600"/>
+            <a:ext cx="7816384" cy="2829154"/>
+          </a:xfrm>
+          <a:prstGeom prst="rect">
+            <a:avLst/>
+          </a:prstGeom>
+        </p:spPr>
+      </p:pic>
+    </p:spTree>
+    <p:extLst>
+      <p:ext uri="{BB962C8B-B14F-4D97-AF65-F5344CB8AC3E}">
+        <p14:creationId xmlns:p14="http://schemas.microsoft.com/office/powerpoint/2010/main" val="2895962183"/>
+      </p:ext>
+    </p:extLst>
+  </p:cSld>
+  <p:clrMapOvr>
+    <a:masterClrMapping/>
+  </p:clrMapOvr>
+</p:sld>
+</file>
+
+<file path=ppt/slides/slide8.xml><?xml version="1.0" encoding="utf-8"?>
+<p:sld xmlns:a="http://schemas.openxmlformats.org/drawingml/2006/main" xmlns:r="http://schemas.openxmlformats.org/officeDocument/2006/relationships" xmlns:p="http://schemas.openxmlformats.org/presentationml/2006/main">
+  <p:cSld>
+    <p:spTree>
+      <p:nvGrpSpPr>
+        <p:cNvPr id="1" name=""/>
+        <p:cNvGrpSpPr/>
+        <p:nvPr/>
+      </p:nvGrpSpPr>
+      <p:grpSpPr>
+        <a:xfrm>
+          <a:off x="0" y="0"/>
+          <a:ext cx="0" cy="0"/>
+          <a:chOff x="0" y="0"/>
+          <a:chExt cx="0" cy="0"/>
+        </a:xfrm>
+      </p:grpSpPr>
+      <p:pic>
+        <p:nvPicPr>
           <p:cNvPr id="2" name="Picture 1">
             <a:extLst>
               <a:ext uri="{FF2B5EF4-FFF2-40B4-BE49-F238E27FC236}">
@@ -5094,7 +5344,7 @@
 </p:sld>
 </file>
 
-<file path=ppt/slides/slide7.xml><?xml version="1.0" encoding="utf-8"?>
+<file path=ppt/slides/slide9.xml><?xml version="1.0" encoding="utf-8"?>
 <p:sld xmlns:a="http://schemas.openxmlformats.org/drawingml/2006/main" xmlns:r="http://schemas.openxmlformats.org/officeDocument/2006/relationships" xmlns:p="http://schemas.openxmlformats.org/presentationml/2006/main">
   <p:cSld>
     <p:spTree>

</xml_diff>